<commit_message>
Add workflow. Change compo / features presentation. Update LOV state
</commit_message>
<xml_diff>
--- a/1 First Review/LOV.pptx
+++ b/1 First Review/LOV.pptx
@@ -5,14 +5,16 @@
     <p:sldMasterId id="2147483648" r:id="rId1"/>
   </p:sldMasterIdLst>
   <p:notesMasterIdLst>
-    <p:notesMasterId r:id="rId7"/>
+    <p:notesMasterId r:id="rId9"/>
   </p:notesMasterIdLst>
   <p:sldIdLst>
     <p:sldId id="256" r:id="rId2"/>
     <p:sldId id="257" r:id="rId3"/>
     <p:sldId id="258" r:id="rId4"/>
     <p:sldId id="259" r:id="rId5"/>
-    <p:sldId id="260" r:id="rId6"/>
+    <p:sldId id="261" r:id="rId6"/>
+    <p:sldId id="262" r:id="rId7"/>
+    <p:sldId id="260" r:id="rId8"/>
   </p:sldIdLst>
   <p:sldSz cx="9144000" cy="6858000" type="screen4x3"/>
   <p:notesSz cx="6858000" cy="9144000"/>
@@ -212,7 +214,7 @@
           <a:p>
             <a:fld id="{29CB55F6-373B-4E47-BA05-6C58FA55415D}" type="datetimeFigureOut">
               <a:rPr lang="en-GB" smtClean="0"/>
-              <a:t>13/05/2015</a:t>
+              <a:t>25/05/2015</a:t>
             </a:fld>
             <a:endParaRPr lang="en-GB"/>
           </a:p>
@@ -524,6 +526,90 @@
           <a:bodyPr/>
           <a:lstStyle/>
           <a:p>
+            <a:endParaRPr lang="en-GB"/>
+          </a:p>
+        </p:txBody>
+      </p:sp>
+      <p:sp>
+        <p:nvSpPr>
+          <p:cNvPr id="4" name="Slide Number Placeholder 3"/>
+          <p:cNvSpPr>
+            <a:spLocks noGrp="1"/>
+          </p:cNvSpPr>
+          <p:nvPr>
+            <p:ph type="sldNum" sz="quarter" idx="10"/>
+          </p:nvPr>
+        </p:nvSpPr>
+        <p:spPr/>
+        <p:txBody>
+          <a:bodyPr/>
+          <a:lstStyle/>
+          <a:p>
+            <a:fld id="{021EE582-E181-4549-9D8F-9BE43EA00A41}" type="slidenum">
+              <a:rPr lang="en-GB" smtClean="0"/>
+              <a:t>6</a:t>
+            </a:fld>
+            <a:endParaRPr lang="en-GB"/>
+          </a:p>
+        </p:txBody>
+      </p:sp>
+    </p:spTree>
+    <p:extLst>
+      <p:ext uri="{BB962C8B-B14F-4D97-AF65-F5344CB8AC3E}">
+        <p14:creationId xmlns:p14="http://schemas.microsoft.com/office/powerpoint/2010/main" val="2542734508"/>
+      </p:ext>
+    </p:extLst>
+  </p:cSld>
+  <p:clrMapOvr>
+    <a:masterClrMapping/>
+  </p:clrMapOvr>
+</p:notes>
+</file>
+
+<file path=ppt/notesSlides/notesSlide2.xml><?xml version="1.0" encoding="utf-8"?>
+<p:notes xmlns:a="http://schemas.openxmlformats.org/drawingml/2006/main" xmlns:r="http://schemas.openxmlformats.org/officeDocument/2006/relationships" xmlns:p="http://schemas.openxmlformats.org/presentationml/2006/main">
+  <p:cSld>
+    <p:spTree>
+      <p:nvGrpSpPr>
+        <p:cNvPr id="1" name=""/>
+        <p:cNvGrpSpPr/>
+        <p:nvPr/>
+      </p:nvGrpSpPr>
+      <p:grpSpPr>
+        <a:xfrm>
+          <a:off x="0" y="0"/>
+          <a:ext cx="0" cy="0"/>
+          <a:chOff x="0" y="0"/>
+          <a:chExt cx="0" cy="0"/>
+        </a:xfrm>
+      </p:grpSpPr>
+      <p:sp>
+        <p:nvSpPr>
+          <p:cNvPr id="2" name="Slide Image Placeholder 1"/>
+          <p:cNvSpPr>
+            <a:spLocks noGrp="1" noRot="1" noChangeAspect="1"/>
+          </p:cNvSpPr>
+          <p:nvPr>
+            <p:ph type="sldImg"/>
+          </p:nvPr>
+        </p:nvSpPr>
+        <p:spPr/>
+      </p:sp>
+      <p:sp>
+        <p:nvSpPr>
+          <p:cNvPr id="3" name="Notes Placeholder 2"/>
+          <p:cNvSpPr>
+            <a:spLocks noGrp="1"/>
+          </p:cNvSpPr>
+          <p:nvPr>
+            <p:ph type="body" idx="1"/>
+          </p:nvPr>
+        </p:nvSpPr>
+        <p:spPr/>
+        <p:txBody>
+          <a:bodyPr/>
+          <a:lstStyle/>
+          <a:p>
             <a:r>
               <a:rPr lang="en-GB" sz="1200" dirty="0" smtClean="0"/>
               <a:t>(page 57 numbered, 50 in the browser)</a:t>
@@ -581,7 +667,7 @@
               <a:pPr>
                 <a:defRPr/>
               </a:pPr>
-              <a:t>5</a:t>
+              <a:t>7</a:t>
             </a:fld>
             <a:endParaRPr lang="en-US" altLang="ja-JP"/>
           </a:p>
@@ -782,7 +868,7 @@
             <a:fld id="{2A017CCA-B3A6-42C9-8558-E7F32D7F76FB}" type="datetimeFigureOut">
               <a:rPr lang="fr-FR" smtClean="0"/>
               <a:pPr/>
-              <a:t>13/05/2015</a:t>
+              <a:t>25/05/2015</a:t>
             </a:fld>
             <a:endParaRPr lang="fr-FR"/>
           </a:p>
@@ -949,7 +1035,7 @@
             <a:fld id="{2A017CCA-B3A6-42C9-8558-E7F32D7F76FB}" type="datetimeFigureOut">
               <a:rPr lang="fr-FR" smtClean="0"/>
               <a:pPr/>
-              <a:t>13/05/2015</a:t>
+              <a:t>25/05/2015</a:t>
             </a:fld>
             <a:endParaRPr lang="fr-FR"/>
           </a:p>
@@ -1126,7 +1212,7 @@
             <a:fld id="{2A017CCA-B3A6-42C9-8558-E7F32D7F76FB}" type="datetimeFigureOut">
               <a:rPr lang="fr-FR" smtClean="0"/>
               <a:pPr/>
-              <a:t>13/05/2015</a:t>
+              <a:t>25/05/2015</a:t>
             </a:fld>
             <a:endParaRPr lang="fr-FR"/>
           </a:p>
@@ -1293,7 +1379,7 @@
             <a:fld id="{2A017CCA-B3A6-42C9-8558-E7F32D7F76FB}" type="datetimeFigureOut">
               <a:rPr lang="fr-FR" smtClean="0"/>
               <a:pPr/>
-              <a:t>13/05/2015</a:t>
+              <a:t>25/05/2015</a:t>
             </a:fld>
             <a:endParaRPr lang="fr-FR"/>
           </a:p>
@@ -1536,7 +1622,7 @@
             <a:fld id="{2A017CCA-B3A6-42C9-8558-E7F32D7F76FB}" type="datetimeFigureOut">
               <a:rPr lang="fr-FR" smtClean="0"/>
               <a:pPr/>
-              <a:t>13/05/2015</a:t>
+              <a:t>25/05/2015</a:t>
             </a:fld>
             <a:endParaRPr lang="fr-FR"/>
           </a:p>
@@ -1821,7 +1907,7 @@
             <a:fld id="{2A017CCA-B3A6-42C9-8558-E7F32D7F76FB}" type="datetimeFigureOut">
               <a:rPr lang="fr-FR" smtClean="0"/>
               <a:pPr/>
-              <a:t>13/05/2015</a:t>
+              <a:t>25/05/2015</a:t>
             </a:fld>
             <a:endParaRPr lang="fr-FR"/>
           </a:p>
@@ -2240,7 +2326,7 @@
             <a:fld id="{2A017CCA-B3A6-42C9-8558-E7F32D7F76FB}" type="datetimeFigureOut">
               <a:rPr lang="fr-FR" smtClean="0"/>
               <a:pPr/>
-              <a:t>13/05/2015</a:t>
+              <a:t>25/05/2015</a:t>
             </a:fld>
             <a:endParaRPr lang="fr-FR"/>
           </a:p>
@@ -2355,7 +2441,7 @@
             <a:fld id="{2A017CCA-B3A6-42C9-8558-E7F32D7F76FB}" type="datetimeFigureOut">
               <a:rPr lang="fr-FR" smtClean="0"/>
               <a:pPr/>
-              <a:t>13/05/2015</a:t>
+              <a:t>25/05/2015</a:t>
             </a:fld>
             <a:endParaRPr lang="fr-FR"/>
           </a:p>
@@ -2447,7 +2533,7 @@
             <a:fld id="{2A017CCA-B3A6-42C9-8558-E7F32D7F76FB}" type="datetimeFigureOut">
               <a:rPr lang="fr-FR" smtClean="0"/>
               <a:pPr/>
-              <a:t>13/05/2015</a:t>
+              <a:t>25/05/2015</a:t>
             </a:fld>
             <a:endParaRPr lang="fr-FR"/>
           </a:p>
@@ -2721,7 +2807,7 @@
             <a:fld id="{2A017CCA-B3A6-42C9-8558-E7F32D7F76FB}" type="datetimeFigureOut">
               <a:rPr lang="fr-FR" smtClean="0"/>
               <a:pPr/>
-              <a:t>13/05/2015</a:t>
+              <a:t>25/05/2015</a:t>
             </a:fld>
             <a:endParaRPr lang="fr-FR"/>
           </a:p>
@@ -2971,7 +3057,7 @@
             <a:fld id="{2A017CCA-B3A6-42C9-8558-E7F32D7F76FB}" type="datetimeFigureOut">
               <a:rPr lang="fr-FR" smtClean="0"/>
               <a:pPr/>
-              <a:t>13/05/2015</a:t>
+              <a:t>25/05/2015</a:t>
             </a:fld>
             <a:endParaRPr lang="fr-FR"/>
           </a:p>
@@ -3181,7 +3267,7 @@
             <a:fld id="{2A017CCA-B3A6-42C9-8558-E7F32D7F76FB}" type="datetimeFigureOut">
               <a:rPr lang="fr-FR" smtClean="0"/>
               <a:pPr/>
-              <a:t>13/05/2015</a:t>
+              <a:t>25/05/2015</a:t>
             </a:fld>
             <a:endParaRPr lang="fr-FR"/>
           </a:p>
@@ -8147,11 +8233,7 @@
             <a:pPr algn="ctr"/>
             <a:r>
               <a:rPr lang="fr-FR" sz="1400" dirty="0" smtClean="0"/>
-              <a:t>LOV </a:t>
-            </a:r>
-            <a:r>
-              <a:rPr lang="fr-FR" sz="1400" dirty="0" smtClean="0"/>
-              <a:t>APIs</a:t>
+              <a:t>LOV APIs</a:t>
             </a:r>
             <a:endParaRPr lang="fr-FR" sz="1400" dirty="0"/>
           </a:p>
@@ -8237,7 +8319,6 @@
               <a:rPr lang="fr-FR" sz="1400" b="1" dirty="0" smtClean="0"/>
               <a:t>Tracking and</a:t>
             </a:r>
-            <a:endParaRPr lang="fr-FR" sz="1400" b="1" dirty="0" smtClean="0"/>
           </a:p>
           <a:p>
             <a:pPr algn="ctr"/>
@@ -8287,7 +8368,6 @@
               <a:rPr lang="fr-FR" sz="1400" b="1" dirty="0"/>
               <a:t>Curation</a:t>
             </a:r>
-            <a:endParaRPr lang="fr-FR" sz="1400" b="1" dirty="0"/>
           </a:p>
         </p:txBody>
       </p:sp>
@@ -8329,7 +8409,6 @@
               <a:rPr lang="fr-FR" sz="1400" b="1" dirty="0"/>
               <a:t>Data Access</a:t>
             </a:r>
-            <a:endParaRPr lang="fr-FR" sz="1400" b="1" dirty="0"/>
           </a:p>
         </p:txBody>
       </p:sp>
@@ -8371,7 +8450,6 @@
               <a:rPr lang="fr-FR" sz="1100" b="1" dirty="0" smtClean="0"/>
               <a:t>LOV Catalogue</a:t>
             </a:r>
-            <a:endParaRPr lang="fr-FR" sz="1100" b="1" dirty="0" smtClean="0"/>
           </a:p>
         </p:txBody>
       </p:sp>
@@ -8413,7 +8491,6 @@
               <a:rPr lang="fr-FR" sz="1100" b="1" dirty="0" smtClean="0"/>
               <a:t>RDF Store</a:t>
             </a:r>
-            <a:endParaRPr lang="fr-FR" sz="1100" b="1" dirty="0" smtClean="0"/>
           </a:p>
         </p:txBody>
       </p:sp>
@@ -8455,7 +8532,6 @@
               <a:rPr lang="fr-FR" sz="1100" b="1" dirty="0" smtClean="0"/>
               <a:t>Full Text Index</a:t>
             </a:r>
-            <a:endParaRPr lang="fr-FR" sz="1100" b="1" dirty="0" smtClean="0"/>
           </a:p>
         </p:txBody>
       </p:sp>
@@ -9286,6 +9362,2731 @@
       </p:grpSpPr>
       <p:sp>
         <p:nvSpPr>
+          <p:cNvPr id="2" name="Title 1"/>
+          <p:cNvSpPr>
+            <a:spLocks noGrp="1"/>
+          </p:cNvSpPr>
+          <p:nvPr>
+            <p:ph type="title"/>
+          </p:nvPr>
+        </p:nvSpPr>
+        <p:spPr/>
+        <p:txBody>
+          <a:bodyPr/>
+          <a:lstStyle/>
+          <a:p>
+            <a:r>
+              <a:rPr lang="en-GB" dirty="0" smtClean="0"/>
+              <a:t>Curation Workflow 1 - Suggestion</a:t>
+            </a:r>
+            <a:endParaRPr lang="en-GB" dirty="0"/>
+          </a:p>
+        </p:txBody>
+      </p:sp>
+      <p:sp>
+        <p:nvSpPr>
+          <p:cNvPr id="4" name="Rectangle 3"/>
+          <p:cNvSpPr/>
+          <p:nvPr/>
+        </p:nvSpPr>
+        <p:spPr>
+          <a:xfrm>
+            <a:off x="3923928" y="1556792"/>
+            <a:ext cx="1080000" cy="360000"/>
+          </a:xfrm>
+          <a:prstGeom prst="rect">
+            <a:avLst/>
+          </a:prstGeom>
+          <a:solidFill>
+            <a:schemeClr val="accent1">
+              <a:lumMod val="20000"/>
+              <a:lumOff val="80000"/>
+            </a:schemeClr>
+          </a:solidFill>
+          <a:ln w="9525">
+            <a:solidFill>
+              <a:schemeClr val="tx1"/>
+            </a:solidFill>
+          </a:ln>
+        </p:spPr>
+        <p:style>
+          <a:lnRef idx="2">
+            <a:schemeClr val="accent1">
+              <a:shade val="50000"/>
+            </a:schemeClr>
+          </a:lnRef>
+          <a:fillRef idx="1">
+            <a:schemeClr val="accent1"/>
+          </a:fillRef>
+          <a:effectRef idx="0">
+            <a:schemeClr val="accent1"/>
+          </a:effectRef>
+          <a:fontRef idx="minor">
+            <a:schemeClr val="lt1"/>
+          </a:fontRef>
+        </p:style>
+        <p:txBody>
+          <a:bodyPr rtlCol="0" anchor="ctr"/>
+          <a:lstStyle/>
+          <a:p>
+            <a:pPr algn="ctr"/>
+            <a:r>
+              <a:rPr lang="en-GB" sz="900" dirty="0" smtClean="0">
+                <a:solidFill>
+                  <a:schemeClr val="tx1"/>
+                </a:solidFill>
+              </a:rPr>
+              <a:t>Vocabulary author designs vocabulary </a:t>
+            </a:r>
+            <a:endParaRPr lang="en-GB" sz="900" dirty="0">
+              <a:solidFill>
+                <a:schemeClr val="tx1"/>
+              </a:solidFill>
+            </a:endParaRPr>
+          </a:p>
+        </p:txBody>
+      </p:sp>
+      <p:sp>
+        <p:nvSpPr>
+          <p:cNvPr id="5" name="Rectangle 4"/>
+          <p:cNvSpPr/>
+          <p:nvPr/>
+        </p:nvSpPr>
+        <p:spPr>
+          <a:xfrm>
+            <a:off x="3923928" y="2132856"/>
+            <a:ext cx="1080000" cy="360000"/>
+          </a:xfrm>
+          <a:prstGeom prst="rect">
+            <a:avLst/>
+          </a:prstGeom>
+          <a:solidFill>
+            <a:schemeClr val="accent1">
+              <a:lumMod val="20000"/>
+              <a:lumOff val="80000"/>
+            </a:schemeClr>
+          </a:solidFill>
+          <a:ln w="9525">
+            <a:solidFill>
+              <a:schemeClr val="tx1"/>
+            </a:solidFill>
+          </a:ln>
+        </p:spPr>
+        <p:style>
+          <a:lnRef idx="2">
+            <a:schemeClr val="accent1">
+              <a:shade val="50000"/>
+            </a:schemeClr>
+          </a:lnRef>
+          <a:fillRef idx="1">
+            <a:schemeClr val="accent1"/>
+          </a:fillRef>
+          <a:effectRef idx="0">
+            <a:schemeClr val="accent1"/>
+          </a:effectRef>
+          <a:fontRef idx="minor">
+            <a:schemeClr val="lt1"/>
+          </a:fontRef>
+        </p:style>
+        <p:txBody>
+          <a:bodyPr rtlCol="0" anchor="ctr"/>
+          <a:lstStyle/>
+          <a:p>
+            <a:pPr algn="ctr"/>
+            <a:r>
+              <a:rPr lang="en-GB" sz="900" dirty="0" smtClean="0">
+                <a:solidFill>
+                  <a:schemeClr val="tx1"/>
+                </a:solidFill>
+              </a:rPr>
+              <a:t>Author suggests a vocabulary</a:t>
+            </a:r>
+            <a:endParaRPr lang="en-GB" sz="900" dirty="0">
+              <a:solidFill>
+                <a:schemeClr val="tx1"/>
+              </a:solidFill>
+            </a:endParaRPr>
+          </a:p>
+        </p:txBody>
+      </p:sp>
+      <p:sp>
+        <p:nvSpPr>
+          <p:cNvPr id="7" name="Rectangle 6"/>
+          <p:cNvSpPr/>
+          <p:nvPr/>
+        </p:nvSpPr>
+        <p:spPr>
+          <a:xfrm>
+            <a:off x="2627784" y="2708920"/>
+            <a:ext cx="1080000" cy="540000"/>
+          </a:xfrm>
+          <a:prstGeom prst="rect">
+            <a:avLst/>
+          </a:prstGeom>
+          <a:solidFill>
+            <a:schemeClr val="accent1">
+              <a:lumMod val="20000"/>
+              <a:lumOff val="80000"/>
+            </a:schemeClr>
+          </a:solidFill>
+          <a:ln w="9525">
+            <a:solidFill>
+              <a:schemeClr val="tx1"/>
+            </a:solidFill>
+          </a:ln>
+        </p:spPr>
+        <p:style>
+          <a:lnRef idx="2">
+            <a:schemeClr val="accent1">
+              <a:shade val="50000"/>
+            </a:schemeClr>
+          </a:lnRef>
+          <a:fillRef idx="1">
+            <a:schemeClr val="accent1"/>
+          </a:fillRef>
+          <a:effectRef idx="0">
+            <a:schemeClr val="accent1"/>
+          </a:effectRef>
+          <a:fontRef idx="minor">
+            <a:schemeClr val="lt1"/>
+          </a:fontRef>
+        </p:style>
+        <p:txBody>
+          <a:bodyPr rtlCol="0" anchor="ctr"/>
+          <a:lstStyle/>
+          <a:p>
+            <a:pPr algn="ctr"/>
+            <a:r>
+              <a:rPr lang="en-GB" sz="900" dirty="0" smtClean="0">
+                <a:solidFill>
+                  <a:schemeClr val="tx1"/>
+                </a:solidFill>
+              </a:rPr>
+              <a:t>LOV Robot suggests a vocabulary</a:t>
+            </a:r>
+            <a:endParaRPr lang="en-GB" sz="900" dirty="0">
+              <a:solidFill>
+                <a:schemeClr val="tx1"/>
+              </a:solidFill>
+            </a:endParaRPr>
+          </a:p>
+        </p:txBody>
+      </p:sp>
+      <p:sp>
+        <p:nvSpPr>
+          <p:cNvPr id="8" name="Rectangle 7"/>
+          <p:cNvSpPr/>
+          <p:nvPr/>
+        </p:nvSpPr>
+        <p:spPr>
+          <a:xfrm>
+            <a:off x="3923928" y="2708920"/>
+            <a:ext cx="1080000" cy="540000"/>
+          </a:xfrm>
+          <a:prstGeom prst="rect">
+            <a:avLst/>
+          </a:prstGeom>
+          <a:solidFill>
+            <a:schemeClr val="accent6">
+              <a:lumMod val="40000"/>
+              <a:lumOff val="60000"/>
+            </a:schemeClr>
+          </a:solidFill>
+          <a:ln w="9525">
+            <a:solidFill>
+              <a:schemeClr val="tx1"/>
+            </a:solidFill>
+          </a:ln>
+        </p:spPr>
+        <p:style>
+          <a:lnRef idx="2">
+            <a:schemeClr val="accent1">
+              <a:shade val="50000"/>
+            </a:schemeClr>
+          </a:lnRef>
+          <a:fillRef idx="1">
+            <a:schemeClr val="accent1"/>
+          </a:fillRef>
+          <a:effectRef idx="0">
+            <a:schemeClr val="accent1"/>
+          </a:effectRef>
+          <a:fontRef idx="minor">
+            <a:schemeClr val="lt1"/>
+          </a:fontRef>
+        </p:style>
+        <p:txBody>
+          <a:bodyPr rtlCol="0" anchor="ctr"/>
+          <a:lstStyle/>
+          <a:p>
+            <a:pPr algn="ctr"/>
+            <a:r>
+              <a:rPr lang="en-GB" sz="900" dirty="0" smtClean="0">
+                <a:solidFill>
+                  <a:schemeClr val="tx1"/>
+                </a:solidFill>
+              </a:rPr>
+              <a:t>Curator looks if the vocabulary is a good fit for LOV</a:t>
+            </a:r>
+            <a:endParaRPr lang="en-GB" sz="900" dirty="0">
+              <a:solidFill>
+                <a:schemeClr val="tx1"/>
+              </a:solidFill>
+            </a:endParaRPr>
+          </a:p>
+        </p:txBody>
+      </p:sp>
+      <p:sp>
+        <p:nvSpPr>
+          <p:cNvPr id="9" name="Flowchart: Decision 8"/>
+          <p:cNvSpPr/>
+          <p:nvPr/>
+        </p:nvSpPr>
+        <p:spPr>
+          <a:xfrm>
+            <a:off x="3923928" y="3429000"/>
+            <a:ext cx="1080000" cy="540000"/>
+          </a:xfrm>
+          <a:prstGeom prst="flowChartDecision">
+            <a:avLst/>
+          </a:prstGeom>
+          <a:solidFill>
+            <a:schemeClr val="bg1"/>
+          </a:solidFill>
+          <a:ln w="9525">
+            <a:solidFill>
+              <a:schemeClr val="tx1"/>
+            </a:solidFill>
+          </a:ln>
+        </p:spPr>
+        <p:style>
+          <a:lnRef idx="2">
+            <a:schemeClr val="accent1">
+              <a:shade val="50000"/>
+            </a:schemeClr>
+          </a:lnRef>
+          <a:fillRef idx="1">
+            <a:schemeClr val="accent1"/>
+          </a:fillRef>
+          <a:effectRef idx="0">
+            <a:schemeClr val="accent1"/>
+          </a:effectRef>
+          <a:fontRef idx="minor">
+            <a:schemeClr val="lt1"/>
+          </a:fontRef>
+        </p:style>
+        <p:txBody>
+          <a:bodyPr rtlCol="0" anchor="ctr"/>
+          <a:lstStyle/>
+          <a:p>
+            <a:pPr algn="ctr"/>
+            <a:r>
+              <a:rPr lang="en-GB" sz="800" dirty="0" smtClean="0">
+                <a:solidFill>
+                  <a:schemeClr val="tx1"/>
+                </a:solidFill>
+              </a:rPr>
+              <a:t>Is a good fit?</a:t>
+            </a:r>
+            <a:endParaRPr lang="en-GB" sz="800" dirty="0">
+              <a:solidFill>
+                <a:schemeClr val="tx1"/>
+              </a:solidFill>
+            </a:endParaRPr>
+          </a:p>
+        </p:txBody>
+      </p:sp>
+      <p:sp>
+        <p:nvSpPr>
+          <p:cNvPr id="10" name="Rectangle 9"/>
+          <p:cNvSpPr/>
+          <p:nvPr/>
+        </p:nvSpPr>
+        <p:spPr>
+          <a:xfrm>
+            <a:off x="3923928" y="4149080"/>
+            <a:ext cx="1080000" cy="540000"/>
+          </a:xfrm>
+          <a:prstGeom prst="rect">
+            <a:avLst/>
+          </a:prstGeom>
+          <a:solidFill>
+            <a:schemeClr val="accent6">
+              <a:lumMod val="40000"/>
+              <a:lumOff val="60000"/>
+            </a:schemeClr>
+          </a:solidFill>
+          <a:ln w="9525">
+            <a:solidFill>
+              <a:schemeClr val="tx1"/>
+            </a:solidFill>
+          </a:ln>
+        </p:spPr>
+        <p:style>
+          <a:lnRef idx="2">
+            <a:schemeClr val="accent1">
+              <a:shade val="50000"/>
+            </a:schemeClr>
+          </a:lnRef>
+          <a:fillRef idx="1">
+            <a:schemeClr val="accent1"/>
+          </a:fillRef>
+          <a:effectRef idx="0">
+            <a:schemeClr val="accent1"/>
+          </a:effectRef>
+          <a:fontRef idx="minor">
+            <a:schemeClr val="lt1"/>
+          </a:fontRef>
+        </p:style>
+        <p:txBody>
+          <a:bodyPr rtlCol="0" anchor="ctr"/>
+          <a:lstStyle/>
+          <a:p>
+            <a:pPr algn="ctr"/>
+            <a:r>
+              <a:rPr lang="en-GB" sz="900" dirty="0" smtClean="0">
+                <a:solidFill>
+                  <a:schemeClr val="tx1"/>
+                </a:solidFill>
+              </a:rPr>
+              <a:t>Curator looks if the vocabulary meets LOV quality</a:t>
+            </a:r>
+            <a:endParaRPr lang="en-GB" sz="900" dirty="0">
+              <a:solidFill>
+                <a:schemeClr val="tx1"/>
+              </a:solidFill>
+            </a:endParaRPr>
+          </a:p>
+        </p:txBody>
+      </p:sp>
+      <p:sp>
+        <p:nvSpPr>
+          <p:cNvPr id="11" name="Flowchart: Decision 10"/>
+          <p:cNvSpPr/>
+          <p:nvPr/>
+        </p:nvSpPr>
+        <p:spPr>
+          <a:xfrm>
+            <a:off x="3923928" y="4869160"/>
+            <a:ext cx="1080000" cy="540000"/>
+          </a:xfrm>
+          <a:prstGeom prst="flowChartDecision">
+            <a:avLst/>
+          </a:prstGeom>
+          <a:solidFill>
+            <a:schemeClr val="bg1"/>
+          </a:solidFill>
+          <a:ln w="9525">
+            <a:solidFill>
+              <a:schemeClr val="tx1"/>
+            </a:solidFill>
+          </a:ln>
+        </p:spPr>
+        <p:style>
+          <a:lnRef idx="2">
+            <a:schemeClr val="accent1">
+              <a:shade val="50000"/>
+            </a:schemeClr>
+          </a:lnRef>
+          <a:fillRef idx="1">
+            <a:schemeClr val="accent1"/>
+          </a:fillRef>
+          <a:effectRef idx="0">
+            <a:schemeClr val="accent1"/>
+          </a:effectRef>
+          <a:fontRef idx="minor">
+            <a:schemeClr val="lt1"/>
+          </a:fontRef>
+        </p:style>
+        <p:txBody>
+          <a:bodyPr rtlCol="0" anchor="ctr"/>
+          <a:lstStyle/>
+          <a:p>
+            <a:pPr algn="ctr"/>
+            <a:r>
+              <a:rPr lang="en-GB" sz="800" dirty="0">
+                <a:solidFill>
+                  <a:schemeClr val="tx1"/>
+                </a:solidFill>
+              </a:rPr>
+              <a:t>Does meet quality?</a:t>
+            </a:r>
+          </a:p>
+        </p:txBody>
+      </p:sp>
+      <p:sp>
+        <p:nvSpPr>
+          <p:cNvPr id="12" name="Flowchart: Punched Tape 11"/>
+          <p:cNvSpPr/>
+          <p:nvPr/>
+        </p:nvSpPr>
+        <p:spPr>
+          <a:xfrm>
+            <a:off x="5148064" y="3340950"/>
+            <a:ext cx="864096" cy="720000"/>
+          </a:xfrm>
+          <a:prstGeom prst="flowChartPunchedTape">
+            <a:avLst/>
+          </a:prstGeom>
+          <a:solidFill>
+            <a:schemeClr val="accent6">
+              <a:lumMod val="40000"/>
+              <a:lumOff val="60000"/>
+            </a:schemeClr>
+          </a:solidFill>
+          <a:ln w="9525">
+            <a:solidFill>
+              <a:schemeClr val="tx1"/>
+            </a:solidFill>
+          </a:ln>
+        </p:spPr>
+        <p:style>
+          <a:lnRef idx="2">
+            <a:schemeClr val="accent1">
+              <a:shade val="50000"/>
+            </a:schemeClr>
+          </a:lnRef>
+          <a:fillRef idx="1">
+            <a:schemeClr val="accent1"/>
+          </a:fillRef>
+          <a:effectRef idx="0">
+            <a:schemeClr val="accent1"/>
+          </a:effectRef>
+          <a:fontRef idx="minor">
+            <a:schemeClr val="lt1"/>
+          </a:fontRef>
+        </p:style>
+        <p:txBody>
+          <a:bodyPr rtlCol="0" anchor="ctr"/>
+          <a:lstStyle/>
+          <a:p>
+            <a:pPr algn="ctr"/>
+            <a:r>
+              <a:rPr lang="en-GB" sz="900" dirty="0" smtClean="0">
+                <a:solidFill>
+                  <a:schemeClr val="tx1"/>
+                </a:solidFill>
+              </a:rPr>
+              <a:t>Curator sends an email to the Author  </a:t>
+            </a:r>
+            <a:endParaRPr lang="en-GB" sz="900" dirty="0">
+              <a:solidFill>
+                <a:schemeClr val="tx1"/>
+              </a:solidFill>
+            </a:endParaRPr>
+          </a:p>
+        </p:txBody>
+      </p:sp>
+      <p:cxnSp>
+        <p:nvCxnSpPr>
+          <p:cNvPr id="14" name="Straight Arrow Connector 13"/>
+          <p:cNvCxnSpPr>
+            <a:stCxn id="9" idx="3"/>
+            <a:endCxn id="12" idx="1"/>
+          </p:cNvCxnSpPr>
+          <p:nvPr/>
+        </p:nvCxnSpPr>
+        <p:spPr>
+          <a:xfrm>
+            <a:off x="5003928" y="3699000"/>
+            <a:ext cx="144136" cy="1950"/>
+          </a:xfrm>
+          <a:prstGeom prst="straightConnector1">
+            <a:avLst/>
+          </a:prstGeom>
+          <a:ln>
+            <a:tailEnd type="triangle"/>
+          </a:ln>
+        </p:spPr>
+        <p:style>
+          <a:lnRef idx="1">
+            <a:schemeClr val="dk1"/>
+          </a:lnRef>
+          <a:fillRef idx="0">
+            <a:schemeClr val="dk1"/>
+          </a:fillRef>
+          <a:effectRef idx="0">
+            <a:schemeClr val="dk1"/>
+          </a:effectRef>
+          <a:fontRef idx="minor">
+            <a:schemeClr val="tx1"/>
+          </a:fontRef>
+        </p:style>
+      </p:cxnSp>
+      <p:cxnSp>
+        <p:nvCxnSpPr>
+          <p:cNvPr id="15" name="Straight Arrow Connector 14"/>
+          <p:cNvCxnSpPr>
+            <a:stCxn id="11" idx="3"/>
+            <a:endCxn id="12" idx="2"/>
+          </p:cNvCxnSpPr>
+          <p:nvPr/>
+        </p:nvCxnSpPr>
+        <p:spPr>
+          <a:xfrm flipV="1">
+            <a:off x="5003928" y="3988950"/>
+            <a:ext cx="576184" cy="1150210"/>
+          </a:xfrm>
+          <a:prstGeom prst="bentConnector2">
+            <a:avLst/>
+          </a:prstGeom>
+          <a:ln>
+            <a:tailEnd type="triangle"/>
+          </a:ln>
+        </p:spPr>
+        <p:style>
+          <a:lnRef idx="1">
+            <a:schemeClr val="dk1"/>
+          </a:lnRef>
+          <a:fillRef idx="0">
+            <a:schemeClr val="dk1"/>
+          </a:fillRef>
+          <a:effectRef idx="0">
+            <a:schemeClr val="dk1"/>
+          </a:effectRef>
+          <a:fontRef idx="minor">
+            <a:schemeClr val="tx1"/>
+          </a:fontRef>
+        </p:style>
+      </p:cxnSp>
+      <p:cxnSp>
+        <p:nvCxnSpPr>
+          <p:cNvPr id="18" name="Straight Arrow Connector 14"/>
+          <p:cNvCxnSpPr>
+            <a:stCxn id="12" idx="0"/>
+            <a:endCxn id="4" idx="3"/>
+          </p:cNvCxnSpPr>
+          <p:nvPr/>
+        </p:nvCxnSpPr>
+        <p:spPr>
+          <a:xfrm rot="16200000" flipV="1">
+            <a:off x="4453941" y="2286779"/>
+            <a:ext cx="1676158" cy="576184"/>
+          </a:xfrm>
+          <a:prstGeom prst="bentConnector2">
+            <a:avLst/>
+          </a:prstGeom>
+          <a:ln>
+            <a:tailEnd type="triangle"/>
+          </a:ln>
+        </p:spPr>
+        <p:style>
+          <a:lnRef idx="1">
+            <a:schemeClr val="dk1"/>
+          </a:lnRef>
+          <a:fillRef idx="0">
+            <a:schemeClr val="dk1"/>
+          </a:fillRef>
+          <a:effectRef idx="0">
+            <a:schemeClr val="dk1"/>
+          </a:effectRef>
+          <a:fontRef idx="minor">
+            <a:schemeClr val="tx1"/>
+          </a:fontRef>
+        </p:style>
+      </p:cxnSp>
+      <p:cxnSp>
+        <p:nvCxnSpPr>
+          <p:cNvPr id="21" name="Straight Arrow Connector 20"/>
+          <p:cNvCxnSpPr>
+            <a:stCxn id="4" idx="2"/>
+            <a:endCxn id="5" idx="0"/>
+          </p:cNvCxnSpPr>
+          <p:nvPr/>
+        </p:nvCxnSpPr>
+        <p:spPr>
+          <a:xfrm>
+            <a:off x="4463928" y="1916792"/>
+            <a:ext cx="0" cy="216064"/>
+          </a:xfrm>
+          <a:prstGeom prst="straightConnector1">
+            <a:avLst/>
+          </a:prstGeom>
+          <a:ln>
+            <a:tailEnd type="triangle"/>
+          </a:ln>
+        </p:spPr>
+        <p:style>
+          <a:lnRef idx="1">
+            <a:schemeClr val="dk1"/>
+          </a:lnRef>
+          <a:fillRef idx="0">
+            <a:schemeClr val="dk1"/>
+          </a:fillRef>
+          <a:effectRef idx="0">
+            <a:schemeClr val="dk1"/>
+          </a:effectRef>
+          <a:fontRef idx="minor">
+            <a:schemeClr val="tx1"/>
+          </a:fontRef>
+        </p:style>
+      </p:cxnSp>
+      <p:cxnSp>
+        <p:nvCxnSpPr>
+          <p:cNvPr id="24" name="Straight Arrow Connector 23"/>
+          <p:cNvCxnSpPr>
+            <a:stCxn id="5" idx="2"/>
+            <a:endCxn id="8" idx="0"/>
+          </p:cNvCxnSpPr>
+          <p:nvPr/>
+        </p:nvCxnSpPr>
+        <p:spPr>
+          <a:xfrm>
+            <a:off x="4463928" y="2492856"/>
+            <a:ext cx="0" cy="216064"/>
+          </a:xfrm>
+          <a:prstGeom prst="straightConnector1">
+            <a:avLst/>
+          </a:prstGeom>
+          <a:ln>
+            <a:tailEnd type="triangle"/>
+          </a:ln>
+        </p:spPr>
+        <p:style>
+          <a:lnRef idx="1">
+            <a:schemeClr val="dk1"/>
+          </a:lnRef>
+          <a:fillRef idx="0">
+            <a:schemeClr val="dk1"/>
+          </a:fillRef>
+          <a:effectRef idx="0">
+            <a:schemeClr val="dk1"/>
+          </a:effectRef>
+          <a:fontRef idx="minor">
+            <a:schemeClr val="tx1"/>
+          </a:fontRef>
+        </p:style>
+      </p:cxnSp>
+      <p:cxnSp>
+        <p:nvCxnSpPr>
+          <p:cNvPr id="27" name="Straight Arrow Connector 26"/>
+          <p:cNvCxnSpPr>
+            <a:stCxn id="8" idx="2"/>
+            <a:endCxn id="9" idx="0"/>
+          </p:cNvCxnSpPr>
+          <p:nvPr/>
+        </p:nvCxnSpPr>
+        <p:spPr>
+          <a:xfrm>
+            <a:off x="4463928" y="3248920"/>
+            <a:ext cx="0" cy="180080"/>
+          </a:xfrm>
+          <a:prstGeom prst="straightConnector1">
+            <a:avLst/>
+          </a:prstGeom>
+          <a:ln>
+            <a:tailEnd type="triangle"/>
+          </a:ln>
+        </p:spPr>
+        <p:style>
+          <a:lnRef idx="1">
+            <a:schemeClr val="dk1"/>
+          </a:lnRef>
+          <a:fillRef idx="0">
+            <a:schemeClr val="dk1"/>
+          </a:fillRef>
+          <a:effectRef idx="0">
+            <a:schemeClr val="dk1"/>
+          </a:effectRef>
+          <a:fontRef idx="minor">
+            <a:schemeClr val="tx1"/>
+          </a:fontRef>
+        </p:style>
+      </p:cxnSp>
+      <p:cxnSp>
+        <p:nvCxnSpPr>
+          <p:cNvPr id="30" name="Straight Arrow Connector 29"/>
+          <p:cNvCxnSpPr>
+            <a:stCxn id="9" idx="2"/>
+            <a:endCxn id="10" idx="0"/>
+          </p:cNvCxnSpPr>
+          <p:nvPr/>
+        </p:nvCxnSpPr>
+        <p:spPr>
+          <a:xfrm>
+            <a:off x="4463928" y="3969000"/>
+            <a:ext cx="0" cy="180080"/>
+          </a:xfrm>
+          <a:prstGeom prst="straightConnector1">
+            <a:avLst/>
+          </a:prstGeom>
+          <a:ln>
+            <a:tailEnd type="triangle"/>
+          </a:ln>
+        </p:spPr>
+        <p:style>
+          <a:lnRef idx="1">
+            <a:schemeClr val="dk1"/>
+          </a:lnRef>
+          <a:fillRef idx="0">
+            <a:schemeClr val="dk1"/>
+          </a:fillRef>
+          <a:effectRef idx="0">
+            <a:schemeClr val="dk1"/>
+          </a:effectRef>
+          <a:fontRef idx="minor">
+            <a:schemeClr val="tx1"/>
+          </a:fontRef>
+        </p:style>
+      </p:cxnSp>
+      <p:cxnSp>
+        <p:nvCxnSpPr>
+          <p:cNvPr id="33" name="Straight Arrow Connector 32"/>
+          <p:cNvCxnSpPr>
+            <a:stCxn id="10" idx="2"/>
+            <a:endCxn id="11" idx="0"/>
+          </p:cNvCxnSpPr>
+          <p:nvPr/>
+        </p:nvCxnSpPr>
+        <p:spPr>
+          <a:xfrm>
+            <a:off x="4463928" y="4689080"/>
+            <a:ext cx="0" cy="180080"/>
+          </a:xfrm>
+          <a:prstGeom prst="straightConnector1">
+            <a:avLst/>
+          </a:prstGeom>
+          <a:ln>
+            <a:tailEnd type="triangle"/>
+          </a:ln>
+        </p:spPr>
+        <p:style>
+          <a:lnRef idx="1">
+            <a:schemeClr val="dk1"/>
+          </a:lnRef>
+          <a:fillRef idx="0">
+            <a:schemeClr val="dk1"/>
+          </a:fillRef>
+          <a:effectRef idx="0">
+            <a:schemeClr val="dk1"/>
+          </a:effectRef>
+          <a:fontRef idx="minor">
+            <a:schemeClr val="tx1"/>
+          </a:fontRef>
+        </p:style>
+      </p:cxnSp>
+      <p:cxnSp>
+        <p:nvCxnSpPr>
+          <p:cNvPr id="36" name="Straight Arrow Connector 35"/>
+          <p:cNvCxnSpPr>
+            <a:stCxn id="7" idx="3"/>
+            <a:endCxn id="8" idx="1"/>
+          </p:cNvCxnSpPr>
+          <p:nvPr/>
+        </p:nvCxnSpPr>
+        <p:spPr>
+          <a:xfrm>
+            <a:off x="3707784" y="2978920"/>
+            <a:ext cx="216144" cy="0"/>
+          </a:xfrm>
+          <a:prstGeom prst="straightConnector1">
+            <a:avLst/>
+          </a:prstGeom>
+          <a:ln>
+            <a:tailEnd type="triangle"/>
+          </a:ln>
+        </p:spPr>
+        <p:style>
+          <a:lnRef idx="1">
+            <a:schemeClr val="dk1"/>
+          </a:lnRef>
+          <a:fillRef idx="0">
+            <a:schemeClr val="dk1"/>
+          </a:fillRef>
+          <a:effectRef idx="0">
+            <a:schemeClr val="dk1"/>
+          </a:effectRef>
+          <a:fontRef idx="minor">
+            <a:schemeClr val="tx1"/>
+          </a:fontRef>
+        </p:style>
+      </p:cxnSp>
+      <p:sp>
+        <p:nvSpPr>
+          <p:cNvPr id="45" name="TextBox 44"/>
+          <p:cNvSpPr txBox="1"/>
+          <p:nvPr/>
+        </p:nvSpPr>
+        <p:spPr>
+          <a:xfrm>
+            <a:off x="4918589" y="3518210"/>
+            <a:ext cx="320922" cy="215444"/>
+          </a:xfrm>
+          <a:prstGeom prst="rect">
+            <a:avLst/>
+          </a:prstGeom>
+          <a:noFill/>
+        </p:spPr>
+        <p:txBody>
+          <a:bodyPr wrap="none" rtlCol="0">
+            <a:spAutoFit/>
+          </a:bodyPr>
+          <a:lstStyle/>
+          <a:p>
+            <a:r>
+              <a:rPr lang="en-GB" sz="800" b="1" dirty="0" smtClean="0">
+                <a:solidFill>
+                  <a:srgbClr val="FF0000"/>
+                </a:solidFill>
+              </a:rPr>
+              <a:t>NO</a:t>
+            </a:r>
+            <a:endParaRPr lang="en-GB" sz="800" b="1" dirty="0">
+              <a:solidFill>
+                <a:srgbClr val="FF0000"/>
+              </a:solidFill>
+            </a:endParaRPr>
+          </a:p>
+        </p:txBody>
+      </p:sp>
+      <p:sp>
+        <p:nvSpPr>
+          <p:cNvPr id="46" name="TextBox 45"/>
+          <p:cNvSpPr txBox="1"/>
+          <p:nvPr/>
+        </p:nvSpPr>
+        <p:spPr>
+          <a:xfrm>
+            <a:off x="4918589" y="4950994"/>
+            <a:ext cx="320922" cy="215444"/>
+          </a:xfrm>
+          <a:prstGeom prst="rect">
+            <a:avLst/>
+          </a:prstGeom>
+          <a:noFill/>
+        </p:spPr>
+        <p:txBody>
+          <a:bodyPr wrap="none" rtlCol="0">
+            <a:spAutoFit/>
+          </a:bodyPr>
+          <a:lstStyle/>
+          <a:p>
+            <a:r>
+              <a:rPr lang="en-GB" sz="800" b="1" dirty="0" smtClean="0">
+                <a:solidFill>
+                  <a:srgbClr val="FF0000"/>
+                </a:solidFill>
+              </a:rPr>
+              <a:t>NO</a:t>
+            </a:r>
+            <a:endParaRPr lang="en-GB" sz="800" b="1" dirty="0">
+              <a:solidFill>
+                <a:srgbClr val="FF0000"/>
+              </a:solidFill>
+            </a:endParaRPr>
+          </a:p>
+        </p:txBody>
+      </p:sp>
+      <p:sp>
+        <p:nvSpPr>
+          <p:cNvPr id="47" name="TextBox 46"/>
+          <p:cNvSpPr txBox="1"/>
+          <p:nvPr/>
+        </p:nvSpPr>
+        <p:spPr>
+          <a:xfrm>
+            <a:off x="4446757" y="3928321"/>
+            <a:ext cx="335348" cy="215444"/>
+          </a:xfrm>
+          <a:prstGeom prst="rect">
+            <a:avLst/>
+          </a:prstGeom>
+          <a:noFill/>
+        </p:spPr>
+        <p:txBody>
+          <a:bodyPr wrap="none" rtlCol="0">
+            <a:spAutoFit/>
+          </a:bodyPr>
+          <a:lstStyle/>
+          <a:p>
+            <a:r>
+              <a:rPr lang="en-GB" sz="800" b="1" dirty="0" smtClean="0">
+                <a:solidFill>
+                  <a:srgbClr val="FF0000"/>
+                </a:solidFill>
+              </a:rPr>
+              <a:t>YES</a:t>
+            </a:r>
+            <a:endParaRPr lang="en-GB" sz="800" b="1" dirty="0">
+              <a:solidFill>
+                <a:srgbClr val="FF0000"/>
+              </a:solidFill>
+            </a:endParaRPr>
+          </a:p>
+        </p:txBody>
+      </p:sp>
+      <p:sp>
+        <p:nvSpPr>
+          <p:cNvPr id="48" name="TextBox 47"/>
+          <p:cNvSpPr txBox="1"/>
+          <p:nvPr/>
+        </p:nvSpPr>
+        <p:spPr>
+          <a:xfrm>
+            <a:off x="4446757" y="5385097"/>
+            <a:ext cx="335348" cy="215444"/>
+          </a:xfrm>
+          <a:prstGeom prst="rect">
+            <a:avLst/>
+          </a:prstGeom>
+          <a:noFill/>
+        </p:spPr>
+        <p:txBody>
+          <a:bodyPr wrap="none" rtlCol="0">
+            <a:spAutoFit/>
+          </a:bodyPr>
+          <a:lstStyle/>
+          <a:p>
+            <a:r>
+              <a:rPr lang="en-GB" sz="800" b="1" dirty="0" smtClean="0">
+                <a:solidFill>
+                  <a:srgbClr val="FF0000"/>
+                </a:solidFill>
+              </a:rPr>
+              <a:t>YES</a:t>
+            </a:r>
+            <a:endParaRPr lang="en-GB" sz="800" b="1" dirty="0">
+              <a:solidFill>
+                <a:srgbClr val="FF0000"/>
+              </a:solidFill>
+            </a:endParaRPr>
+          </a:p>
+        </p:txBody>
+      </p:sp>
+      <p:sp>
+        <p:nvSpPr>
+          <p:cNvPr id="49" name="Rectangle 48"/>
+          <p:cNvSpPr/>
+          <p:nvPr/>
+        </p:nvSpPr>
+        <p:spPr>
+          <a:xfrm>
+            <a:off x="3923928" y="5679160"/>
+            <a:ext cx="1080000" cy="360000"/>
+          </a:xfrm>
+          <a:prstGeom prst="rect">
+            <a:avLst/>
+          </a:prstGeom>
+          <a:solidFill>
+            <a:schemeClr val="accent6">
+              <a:lumMod val="40000"/>
+              <a:lumOff val="60000"/>
+            </a:schemeClr>
+          </a:solidFill>
+          <a:ln w="9525">
+            <a:solidFill>
+              <a:schemeClr val="tx1"/>
+            </a:solidFill>
+          </a:ln>
+        </p:spPr>
+        <p:style>
+          <a:lnRef idx="2">
+            <a:schemeClr val="accent1">
+              <a:shade val="50000"/>
+            </a:schemeClr>
+          </a:lnRef>
+          <a:fillRef idx="1">
+            <a:schemeClr val="accent1"/>
+          </a:fillRef>
+          <a:effectRef idx="0">
+            <a:schemeClr val="accent1"/>
+          </a:effectRef>
+          <a:fontRef idx="minor">
+            <a:schemeClr val="lt1"/>
+          </a:fontRef>
+        </p:style>
+        <p:txBody>
+          <a:bodyPr rtlCol="0" anchor="ctr"/>
+          <a:lstStyle/>
+          <a:p>
+            <a:pPr algn="ctr"/>
+            <a:r>
+              <a:rPr lang="en-GB" sz="900" dirty="0" smtClean="0">
+                <a:solidFill>
+                  <a:schemeClr val="tx1"/>
+                </a:solidFill>
+              </a:rPr>
+              <a:t>Curator inserts the vocabulary in LOV</a:t>
+            </a:r>
+            <a:endParaRPr lang="en-GB" sz="900" dirty="0">
+              <a:solidFill>
+                <a:schemeClr val="tx1"/>
+              </a:solidFill>
+            </a:endParaRPr>
+          </a:p>
+        </p:txBody>
+      </p:sp>
+      <p:cxnSp>
+        <p:nvCxnSpPr>
+          <p:cNvPr id="50" name="Straight Arrow Connector 49"/>
+          <p:cNvCxnSpPr>
+            <a:stCxn id="11" idx="2"/>
+            <a:endCxn id="49" idx="0"/>
+          </p:cNvCxnSpPr>
+          <p:nvPr/>
+        </p:nvCxnSpPr>
+        <p:spPr>
+          <a:xfrm>
+            <a:off x="4463928" y="5409160"/>
+            <a:ext cx="0" cy="270000"/>
+          </a:xfrm>
+          <a:prstGeom prst="straightConnector1">
+            <a:avLst/>
+          </a:prstGeom>
+          <a:ln>
+            <a:tailEnd type="triangle"/>
+          </a:ln>
+        </p:spPr>
+        <p:style>
+          <a:lnRef idx="1">
+            <a:schemeClr val="dk1"/>
+          </a:lnRef>
+          <a:fillRef idx="0">
+            <a:schemeClr val="dk1"/>
+          </a:fillRef>
+          <a:effectRef idx="0">
+            <a:schemeClr val="dk1"/>
+          </a:effectRef>
+          <a:fontRef idx="minor">
+            <a:schemeClr val="tx1"/>
+          </a:fontRef>
+        </p:style>
+      </p:cxnSp>
+      <p:sp>
+        <p:nvSpPr>
+          <p:cNvPr id="53" name="Rectangle 52"/>
+          <p:cNvSpPr/>
+          <p:nvPr/>
+        </p:nvSpPr>
+        <p:spPr>
+          <a:xfrm>
+            <a:off x="2627904" y="3518210"/>
+            <a:ext cx="1080000" cy="648000"/>
+          </a:xfrm>
+          <a:prstGeom prst="rect">
+            <a:avLst/>
+          </a:prstGeom>
+          <a:solidFill>
+            <a:schemeClr val="accent1">
+              <a:lumMod val="20000"/>
+              <a:lumOff val="80000"/>
+            </a:schemeClr>
+          </a:solidFill>
+          <a:ln w="9525">
+            <a:solidFill>
+              <a:schemeClr val="tx1"/>
+            </a:solidFill>
+          </a:ln>
+        </p:spPr>
+        <p:style>
+          <a:lnRef idx="2">
+            <a:schemeClr val="accent1">
+              <a:shade val="50000"/>
+            </a:schemeClr>
+          </a:lnRef>
+          <a:fillRef idx="1">
+            <a:schemeClr val="accent1"/>
+          </a:fillRef>
+          <a:effectRef idx="0">
+            <a:schemeClr val="accent1"/>
+          </a:effectRef>
+          <a:fontRef idx="minor">
+            <a:schemeClr val="lt1"/>
+          </a:fontRef>
+        </p:style>
+        <p:txBody>
+          <a:bodyPr rtlCol="0" anchor="ctr"/>
+          <a:lstStyle/>
+          <a:p>
+            <a:pPr algn="ctr"/>
+            <a:r>
+              <a:rPr lang="en-GB" sz="900" dirty="0" smtClean="0">
+                <a:solidFill>
+                  <a:schemeClr val="tx1"/>
+                </a:solidFill>
+              </a:rPr>
+              <a:t>LOV Robot detects any reference to new vocabs in LOV ones</a:t>
+            </a:r>
+            <a:endParaRPr lang="en-GB" sz="900" dirty="0">
+              <a:solidFill>
+                <a:schemeClr val="tx1"/>
+              </a:solidFill>
+            </a:endParaRPr>
+          </a:p>
+        </p:txBody>
+      </p:sp>
+      <p:cxnSp>
+        <p:nvCxnSpPr>
+          <p:cNvPr id="54" name="Straight Arrow Connector 53"/>
+          <p:cNvCxnSpPr>
+            <a:stCxn id="53" idx="0"/>
+            <a:endCxn id="7" idx="2"/>
+          </p:cNvCxnSpPr>
+          <p:nvPr/>
+        </p:nvCxnSpPr>
+        <p:spPr>
+          <a:xfrm flipH="1" flipV="1">
+            <a:off x="3167784" y="3248920"/>
+            <a:ext cx="120" cy="269290"/>
+          </a:xfrm>
+          <a:prstGeom prst="straightConnector1">
+            <a:avLst/>
+          </a:prstGeom>
+          <a:ln>
+            <a:tailEnd type="triangle"/>
+          </a:ln>
+        </p:spPr>
+        <p:style>
+          <a:lnRef idx="1">
+            <a:schemeClr val="dk1"/>
+          </a:lnRef>
+          <a:fillRef idx="0">
+            <a:schemeClr val="dk1"/>
+          </a:fillRef>
+          <a:effectRef idx="0">
+            <a:schemeClr val="dk1"/>
+          </a:effectRef>
+          <a:fontRef idx="minor">
+            <a:schemeClr val="tx1"/>
+          </a:fontRef>
+        </p:style>
+      </p:cxnSp>
+      <p:sp>
+        <p:nvSpPr>
+          <p:cNvPr id="57" name="Cylindre 91"/>
+          <p:cNvSpPr/>
+          <p:nvPr/>
+        </p:nvSpPr>
+        <p:spPr>
+          <a:xfrm>
+            <a:off x="2771740" y="4789911"/>
+            <a:ext cx="792088" cy="571504"/>
+          </a:xfrm>
+          <a:prstGeom prst="can">
+            <a:avLst/>
+          </a:prstGeom>
+        </p:spPr>
+        <p:style>
+          <a:lnRef idx="1">
+            <a:schemeClr val="accent5"/>
+          </a:lnRef>
+          <a:fillRef idx="2">
+            <a:schemeClr val="accent5"/>
+          </a:fillRef>
+          <a:effectRef idx="1">
+            <a:schemeClr val="accent5"/>
+          </a:effectRef>
+          <a:fontRef idx="minor">
+            <a:schemeClr val="dk1"/>
+          </a:fontRef>
+        </p:style>
+        <p:txBody>
+          <a:bodyPr rtlCol="0" anchor="t"/>
+          <a:lstStyle/>
+          <a:p>
+            <a:pPr algn="ctr"/>
+            <a:r>
+              <a:rPr lang="fr-FR" sz="1100" b="1" dirty="0" smtClean="0"/>
+              <a:t>LOV Catalogue</a:t>
+            </a:r>
+          </a:p>
+        </p:txBody>
+      </p:sp>
+      <p:cxnSp>
+        <p:nvCxnSpPr>
+          <p:cNvPr id="58" name="Straight Arrow Connector 57"/>
+          <p:cNvCxnSpPr>
+            <a:stCxn id="49" idx="1"/>
+            <a:endCxn id="57" idx="3"/>
+          </p:cNvCxnSpPr>
+          <p:nvPr/>
+        </p:nvCxnSpPr>
+        <p:spPr>
+          <a:xfrm rot="10800000">
+            <a:off x="3167784" y="5361416"/>
+            <a:ext cx="756144" cy="497745"/>
+          </a:xfrm>
+          <a:prstGeom prst="bentConnector2">
+            <a:avLst/>
+          </a:prstGeom>
+          <a:ln>
+            <a:tailEnd type="triangle"/>
+          </a:ln>
+        </p:spPr>
+        <p:style>
+          <a:lnRef idx="1">
+            <a:schemeClr val="dk1"/>
+          </a:lnRef>
+          <a:fillRef idx="0">
+            <a:schemeClr val="dk1"/>
+          </a:fillRef>
+          <a:effectRef idx="0">
+            <a:schemeClr val="dk1"/>
+          </a:effectRef>
+          <a:fontRef idx="minor">
+            <a:schemeClr val="tx1"/>
+          </a:fontRef>
+        </p:style>
+      </p:cxnSp>
+      <p:cxnSp>
+        <p:nvCxnSpPr>
+          <p:cNvPr id="61" name="Straight Arrow Connector 60"/>
+          <p:cNvCxnSpPr>
+            <a:stCxn id="57" idx="1"/>
+            <a:endCxn id="53" idx="2"/>
+          </p:cNvCxnSpPr>
+          <p:nvPr/>
+        </p:nvCxnSpPr>
+        <p:spPr>
+          <a:xfrm flipV="1">
+            <a:off x="3167784" y="4166210"/>
+            <a:ext cx="120" cy="623701"/>
+          </a:xfrm>
+          <a:prstGeom prst="straightConnector1">
+            <a:avLst/>
+          </a:prstGeom>
+          <a:ln>
+            <a:tailEnd type="triangle"/>
+          </a:ln>
+        </p:spPr>
+        <p:style>
+          <a:lnRef idx="1">
+            <a:schemeClr val="dk1"/>
+          </a:lnRef>
+          <a:fillRef idx="0">
+            <a:schemeClr val="dk1"/>
+          </a:fillRef>
+          <a:effectRef idx="0">
+            <a:schemeClr val="dk1"/>
+          </a:effectRef>
+          <a:fontRef idx="minor">
+            <a:schemeClr val="tx1"/>
+          </a:fontRef>
+        </p:style>
+      </p:cxnSp>
+      <p:cxnSp>
+        <p:nvCxnSpPr>
+          <p:cNvPr id="64" name="Straight Arrow Connector 14"/>
+          <p:cNvCxnSpPr>
+            <a:stCxn id="49" idx="3"/>
+            <a:endCxn id="12" idx="2"/>
+          </p:cNvCxnSpPr>
+          <p:nvPr/>
+        </p:nvCxnSpPr>
+        <p:spPr>
+          <a:xfrm flipV="1">
+            <a:off x="5003928" y="3988950"/>
+            <a:ext cx="576184" cy="1870210"/>
+          </a:xfrm>
+          <a:prstGeom prst="bentConnector2">
+            <a:avLst/>
+          </a:prstGeom>
+          <a:ln>
+            <a:tailEnd type="triangle"/>
+          </a:ln>
+        </p:spPr>
+        <p:style>
+          <a:lnRef idx="1">
+            <a:schemeClr val="dk1"/>
+          </a:lnRef>
+          <a:fillRef idx="0">
+            <a:schemeClr val="dk1"/>
+          </a:fillRef>
+          <a:effectRef idx="0">
+            <a:schemeClr val="dk1"/>
+          </a:effectRef>
+          <a:fontRef idx="minor">
+            <a:schemeClr val="tx1"/>
+          </a:fontRef>
+        </p:style>
+      </p:cxnSp>
+    </p:spTree>
+    <p:extLst>
+      <p:ext uri="{BB962C8B-B14F-4D97-AF65-F5344CB8AC3E}">
+        <p14:creationId xmlns:p14="http://schemas.microsoft.com/office/powerpoint/2010/main" val="919241748"/>
+      </p:ext>
+    </p:extLst>
+  </p:cSld>
+  <p:clrMapOvr>
+    <a:masterClrMapping/>
+  </p:clrMapOvr>
+</p:sld>
+</file>
+
+<file path=ppt/slides/slide6.xml><?xml version="1.0" encoding="utf-8"?>
+<p:sld xmlns:a="http://schemas.openxmlformats.org/drawingml/2006/main" xmlns:r="http://schemas.openxmlformats.org/officeDocument/2006/relationships" xmlns:p="http://schemas.openxmlformats.org/presentationml/2006/main">
+  <p:cSld>
+    <p:spTree>
+      <p:nvGrpSpPr>
+        <p:cNvPr id="1" name=""/>
+        <p:cNvGrpSpPr/>
+        <p:nvPr/>
+      </p:nvGrpSpPr>
+      <p:grpSpPr>
+        <a:xfrm>
+          <a:off x="0" y="0"/>
+          <a:ext cx="0" cy="0"/>
+          <a:chOff x="0" y="0"/>
+          <a:chExt cx="0" cy="0"/>
+        </a:xfrm>
+      </p:grpSpPr>
+      <p:sp>
+        <p:nvSpPr>
+          <p:cNvPr id="2" name="Title 1"/>
+          <p:cNvSpPr>
+            <a:spLocks noGrp="1"/>
+          </p:cNvSpPr>
+          <p:nvPr>
+            <p:ph type="title"/>
+          </p:nvPr>
+        </p:nvSpPr>
+        <p:spPr/>
+        <p:txBody>
+          <a:bodyPr/>
+          <a:lstStyle/>
+          <a:p>
+            <a:r>
+              <a:rPr lang="en-GB" dirty="0" smtClean="0"/>
+              <a:t>Curation Workflow 2 - Reviews</a:t>
+            </a:r>
+            <a:endParaRPr lang="en-GB" dirty="0"/>
+          </a:p>
+        </p:txBody>
+      </p:sp>
+      <p:sp>
+        <p:nvSpPr>
+          <p:cNvPr id="8" name="Rectangle 7"/>
+          <p:cNvSpPr/>
+          <p:nvPr/>
+        </p:nvSpPr>
+        <p:spPr>
+          <a:xfrm>
+            <a:off x="2699792" y="3335507"/>
+            <a:ext cx="1080000" cy="540000"/>
+          </a:xfrm>
+          <a:prstGeom prst="rect">
+            <a:avLst/>
+          </a:prstGeom>
+          <a:solidFill>
+            <a:schemeClr val="accent6">
+              <a:lumMod val="40000"/>
+              <a:lumOff val="60000"/>
+            </a:schemeClr>
+          </a:solidFill>
+          <a:ln w="9525">
+            <a:solidFill>
+              <a:schemeClr val="tx1"/>
+            </a:solidFill>
+          </a:ln>
+        </p:spPr>
+        <p:style>
+          <a:lnRef idx="2">
+            <a:schemeClr val="accent1">
+              <a:shade val="50000"/>
+            </a:schemeClr>
+          </a:lnRef>
+          <a:fillRef idx="1">
+            <a:schemeClr val="accent1"/>
+          </a:fillRef>
+          <a:effectRef idx="0">
+            <a:schemeClr val="accent1"/>
+          </a:effectRef>
+          <a:fontRef idx="minor">
+            <a:schemeClr val="lt1"/>
+          </a:fontRef>
+        </p:style>
+        <p:txBody>
+          <a:bodyPr rtlCol="0" anchor="ctr"/>
+          <a:lstStyle/>
+          <a:p>
+            <a:pPr algn="ctr"/>
+            <a:r>
+              <a:rPr lang="en-GB" sz="900" dirty="0" smtClean="0">
+                <a:solidFill>
+                  <a:schemeClr val="tx1"/>
+                </a:solidFill>
+              </a:rPr>
+              <a:t>Curator updates vocabulary review and metadata if needed</a:t>
+            </a:r>
+            <a:endParaRPr lang="en-GB" sz="900" dirty="0">
+              <a:solidFill>
+                <a:schemeClr val="tx1"/>
+              </a:solidFill>
+            </a:endParaRPr>
+          </a:p>
+        </p:txBody>
+      </p:sp>
+      <p:sp>
+        <p:nvSpPr>
+          <p:cNvPr id="9" name="Flowchart: Decision 8"/>
+          <p:cNvSpPr/>
+          <p:nvPr/>
+        </p:nvSpPr>
+        <p:spPr>
+          <a:xfrm>
+            <a:off x="1483243" y="1691303"/>
+            <a:ext cx="1080000" cy="540000"/>
+          </a:xfrm>
+          <a:prstGeom prst="flowChartDecision">
+            <a:avLst/>
+          </a:prstGeom>
+          <a:solidFill>
+            <a:schemeClr val="bg1"/>
+          </a:solidFill>
+          <a:ln w="9525">
+            <a:solidFill>
+              <a:schemeClr val="tx1"/>
+            </a:solidFill>
+          </a:ln>
+        </p:spPr>
+        <p:style>
+          <a:lnRef idx="2">
+            <a:schemeClr val="accent1">
+              <a:shade val="50000"/>
+            </a:schemeClr>
+          </a:lnRef>
+          <a:fillRef idx="1">
+            <a:schemeClr val="accent1"/>
+          </a:fillRef>
+          <a:effectRef idx="0">
+            <a:schemeClr val="accent1"/>
+          </a:effectRef>
+          <a:fontRef idx="minor">
+            <a:schemeClr val="lt1"/>
+          </a:fontRef>
+        </p:style>
+        <p:txBody>
+          <a:bodyPr rtlCol="0" anchor="ctr"/>
+          <a:lstStyle/>
+          <a:p>
+            <a:pPr algn="ctr"/>
+            <a:r>
+              <a:rPr lang="en-GB" sz="800" dirty="0" smtClean="0">
+                <a:solidFill>
+                  <a:schemeClr val="tx1"/>
+                </a:solidFill>
+              </a:rPr>
+              <a:t>Is review &gt;11m?</a:t>
+            </a:r>
+            <a:endParaRPr lang="en-GB" sz="800" dirty="0">
+              <a:solidFill>
+                <a:schemeClr val="tx1"/>
+              </a:solidFill>
+            </a:endParaRPr>
+          </a:p>
+        </p:txBody>
+      </p:sp>
+      <p:cxnSp>
+        <p:nvCxnSpPr>
+          <p:cNvPr id="14" name="Straight Arrow Connector 13"/>
+          <p:cNvCxnSpPr>
+            <a:stCxn id="9" idx="3"/>
+            <a:endCxn id="51" idx="1"/>
+          </p:cNvCxnSpPr>
+          <p:nvPr/>
+        </p:nvCxnSpPr>
+        <p:spPr>
+          <a:xfrm>
+            <a:off x="2563243" y="1961303"/>
+            <a:ext cx="136669" cy="1484"/>
+          </a:xfrm>
+          <a:prstGeom prst="straightConnector1">
+            <a:avLst/>
+          </a:prstGeom>
+          <a:ln>
+            <a:tailEnd type="triangle"/>
+          </a:ln>
+        </p:spPr>
+        <p:style>
+          <a:lnRef idx="1">
+            <a:schemeClr val="dk1"/>
+          </a:lnRef>
+          <a:fillRef idx="0">
+            <a:schemeClr val="dk1"/>
+          </a:fillRef>
+          <a:effectRef idx="0">
+            <a:schemeClr val="dk1"/>
+          </a:effectRef>
+          <a:fontRef idx="minor">
+            <a:schemeClr val="tx1"/>
+          </a:fontRef>
+        </p:style>
+      </p:cxnSp>
+      <p:sp>
+        <p:nvSpPr>
+          <p:cNvPr id="45" name="TextBox 44"/>
+          <p:cNvSpPr txBox="1"/>
+          <p:nvPr/>
+        </p:nvSpPr>
+        <p:spPr>
+          <a:xfrm>
+            <a:off x="1702321" y="1521010"/>
+            <a:ext cx="320922" cy="215444"/>
+          </a:xfrm>
+          <a:prstGeom prst="rect">
+            <a:avLst/>
+          </a:prstGeom>
+          <a:noFill/>
+        </p:spPr>
+        <p:txBody>
+          <a:bodyPr wrap="none" rtlCol="0">
+            <a:spAutoFit/>
+          </a:bodyPr>
+          <a:lstStyle/>
+          <a:p>
+            <a:r>
+              <a:rPr lang="en-GB" sz="800" b="1" dirty="0" smtClean="0">
+                <a:solidFill>
+                  <a:srgbClr val="FF0000"/>
+                </a:solidFill>
+              </a:rPr>
+              <a:t>NO</a:t>
+            </a:r>
+            <a:endParaRPr lang="en-GB" sz="800" b="1" dirty="0">
+              <a:solidFill>
+                <a:srgbClr val="FF0000"/>
+              </a:solidFill>
+            </a:endParaRPr>
+          </a:p>
+        </p:txBody>
+      </p:sp>
+      <p:sp>
+        <p:nvSpPr>
+          <p:cNvPr id="47" name="TextBox 46"/>
+          <p:cNvSpPr txBox="1"/>
+          <p:nvPr/>
+        </p:nvSpPr>
+        <p:spPr>
+          <a:xfrm>
+            <a:off x="2442988" y="1770870"/>
+            <a:ext cx="335348" cy="215444"/>
+          </a:xfrm>
+          <a:prstGeom prst="rect">
+            <a:avLst/>
+          </a:prstGeom>
+          <a:noFill/>
+        </p:spPr>
+        <p:txBody>
+          <a:bodyPr wrap="none" rtlCol="0">
+            <a:spAutoFit/>
+          </a:bodyPr>
+          <a:lstStyle/>
+          <a:p>
+            <a:r>
+              <a:rPr lang="en-GB" sz="800" b="1" dirty="0" smtClean="0">
+                <a:solidFill>
+                  <a:srgbClr val="FF0000"/>
+                </a:solidFill>
+              </a:rPr>
+              <a:t>YES</a:t>
+            </a:r>
+            <a:endParaRPr lang="en-GB" sz="800" b="1" dirty="0">
+              <a:solidFill>
+                <a:srgbClr val="FF0000"/>
+              </a:solidFill>
+            </a:endParaRPr>
+          </a:p>
+        </p:txBody>
+      </p:sp>
+      <p:sp>
+        <p:nvSpPr>
+          <p:cNvPr id="53" name="Rectangle 52"/>
+          <p:cNvSpPr/>
+          <p:nvPr/>
+        </p:nvSpPr>
+        <p:spPr>
+          <a:xfrm>
+            <a:off x="1483243" y="2442397"/>
+            <a:ext cx="1080000" cy="648000"/>
+          </a:xfrm>
+          <a:prstGeom prst="rect">
+            <a:avLst/>
+          </a:prstGeom>
+          <a:solidFill>
+            <a:schemeClr val="accent1">
+              <a:lumMod val="20000"/>
+              <a:lumOff val="80000"/>
+            </a:schemeClr>
+          </a:solidFill>
+          <a:ln w="9525">
+            <a:solidFill>
+              <a:schemeClr val="tx1"/>
+            </a:solidFill>
+          </a:ln>
+        </p:spPr>
+        <p:style>
+          <a:lnRef idx="2">
+            <a:schemeClr val="accent1">
+              <a:shade val="50000"/>
+            </a:schemeClr>
+          </a:lnRef>
+          <a:fillRef idx="1">
+            <a:schemeClr val="accent1"/>
+          </a:fillRef>
+          <a:effectRef idx="0">
+            <a:schemeClr val="accent1"/>
+          </a:effectRef>
+          <a:fontRef idx="minor">
+            <a:schemeClr val="lt1"/>
+          </a:fontRef>
+        </p:style>
+        <p:txBody>
+          <a:bodyPr rtlCol="0" anchor="ctr"/>
+          <a:lstStyle/>
+          <a:p>
+            <a:pPr algn="ctr"/>
+            <a:r>
+              <a:rPr lang="en-GB" sz="900" dirty="0" smtClean="0">
+                <a:solidFill>
+                  <a:schemeClr val="tx1"/>
+                </a:solidFill>
+              </a:rPr>
+              <a:t>LOV Robot checks if vocabulary review older than 11 months</a:t>
+            </a:r>
+            <a:endParaRPr lang="en-GB" sz="900" dirty="0">
+              <a:solidFill>
+                <a:schemeClr val="tx1"/>
+              </a:solidFill>
+            </a:endParaRPr>
+          </a:p>
+        </p:txBody>
+      </p:sp>
+      <p:sp>
+        <p:nvSpPr>
+          <p:cNvPr id="57" name="Cylindre 91"/>
+          <p:cNvSpPr/>
+          <p:nvPr/>
+        </p:nvSpPr>
+        <p:spPr>
+          <a:xfrm>
+            <a:off x="1627200" y="3323299"/>
+            <a:ext cx="792088" cy="571504"/>
+          </a:xfrm>
+          <a:prstGeom prst="can">
+            <a:avLst/>
+          </a:prstGeom>
+        </p:spPr>
+        <p:style>
+          <a:lnRef idx="1">
+            <a:schemeClr val="accent5"/>
+          </a:lnRef>
+          <a:fillRef idx="2">
+            <a:schemeClr val="accent5"/>
+          </a:fillRef>
+          <a:effectRef idx="1">
+            <a:schemeClr val="accent5"/>
+          </a:effectRef>
+          <a:fontRef idx="minor">
+            <a:schemeClr val="dk1"/>
+          </a:fontRef>
+        </p:style>
+        <p:txBody>
+          <a:bodyPr rtlCol="0" anchor="t"/>
+          <a:lstStyle/>
+          <a:p>
+            <a:pPr algn="ctr"/>
+            <a:r>
+              <a:rPr lang="fr-FR" sz="1100" b="1" dirty="0" smtClean="0"/>
+              <a:t>LOV Catalogue</a:t>
+            </a:r>
+          </a:p>
+        </p:txBody>
+      </p:sp>
+      <p:cxnSp>
+        <p:nvCxnSpPr>
+          <p:cNvPr id="61" name="Straight Arrow Connector 60"/>
+          <p:cNvCxnSpPr>
+            <a:stCxn id="57" idx="1"/>
+            <a:endCxn id="53" idx="2"/>
+          </p:cNvCxnSpPr>
+          <p:nvPr/>
+        </p:nvCxnSpPr>
+        <p:spPr>
+          <a:xfrm flipH="1" flipV="1">
+            <a:off x="2023243" y="3090397"/>
+            <a:ext cx="1" cy="232902"/>
+          </a:xfrm>
+          <a:prstGeom prst="straightConnector1">
+            <a:avLst/>
+          </a:prstGeom>
+          <a:ln>
+            <a:tailEnd type="triangle"/>
+          </a:ln>
+        </p:spPr>
+        <p:style>
+          <a:lnRef idx="1">
+            <a:schemeClr val="dk1"/>
+          </a:lnRef>
+          <a:fillRef idx="0">
+            <a:schemeClr val="dk1"/>
+          </a:fillRef>
+          <a:effectRef idx="0">
+            <a:schemeClr val="dk1"/>
+          </a:effectRef>
+          <a:fontRef idx="minor">
+            <a:schemeClr val="tx1"/>
+          </a:fontRef>
+        </p:style>
+      </p:cxnSp>
+      <p:cxnSp>
+        <p:nvCxnSpPr>
+          <p:cNvPr id="38" name="Straight Arrow Connector 37"/>
+          <p:cNvCxnSpPr>
+            <a:stCxn id="9" idx="0"/>
+            <a:endCxn id="23" idx="4"/>
+          </p:cNvCxnSpPr>
+          <p:nvPr/>
+        </p:nvCxnSpPr>
+        <p:spPr>
+          <a:xfrm flipH="1" flipV="1">
+            <a:off x="2022316" y="1556792"/>
+            <a:ext cx="927" cy="134511"/>
+          </a:xfrm>
+          <a:prstGeom prst="straightConnector1">
+            <a:avLst/>
+          </a:prstGeom>
+          <a:ln>
+            <a:tailEnd type="triangle"/>
+          </a:ln>
+        </p:spPr>
+        <p:style>
+          <a:lnRef idx="1">
+            <a:schemeClr val="dk1"/>
+          </a:lnRef>
+          <a:fillRef idx="0">
+            <a:schemeClr val="dk1"/>
+          </a:fillRef>
+          <a:effectRef idx="0">
+            <a:schemeClr val="dk1"/>
+          </a:effectRef>
+          <a:fontRef idx="minor">
+            <a:schemeClr val="tx1"/>
+          </a:fontRef>
+        </p:style>
+      </p:cxnSp>
+      <p:grpSp>
+        <p:nvGrpSpPr>
+          <p:cNvPr id="86" name="Group 85"/>
+          <p:cNvGrpSpPr/>
+          <p:nvPr/>
+        </p:nvGrpSpPr>
+        <p:grpSpPr>
+          <a:xfrm>
+            <a:off x="1849833" y="1304542"/>
+            <a:ext cx="344966" cy="252250"/>
+            <a:chOff x="1849833" y="1232534"/>
+            <a:chExt cx="344966" cy="252250"/>
+          </a:xfrm>
+        </p:grpSpPr>
+        <p:sp>
+          <p:nvSpPr>
+            <p:cNvPr id="23" name="Oval 22"/>
+            <p:cNvSpPr/>
+            <p:nvPr/>
+          </p:nvSpPr>
+          <p:spPr>
+            <a:xfrm>
+              <a:off x="1891843" y="1232534"/>
+              <a:ext cx="260946" cy="252250"/>
+            </a:xfrm>
+            <a:prstGeom prst="ellipse">
+              <a:avLst/>
+            </a:prstGeom>
+            <a:solidFill>
+              <a:schemeClr val="bg1">
+                <a:lumMod val="65000"/>
+              </a:schemeClr>
+            </a:solidFill>
+            <a:ln w="9525">
+              <a:solidFill>
+                <a:schemeClr val="tx1"/>
+              </a:solidFill>
+            </a:ln>
+          </p:spPr>
+          <p:style>
+            <a:lnRef idx="2">
+              <a:schemeClr val="accent1">
+                <a:shade val="50000"/>
+              </a:schemeClr>
+            </a:lnRef>
+            <a:fillRef idx="1">
+              <a:schemeClr val="accent1"/>
+            </a:fillRef>
+            <a:effectRef idx="0">
+              <a:schemeClr val="accent1"/>
+            </a:effectRef>
+            <a:fontRef idx="minor">
+              <a:schemeClr val="lt1"/>
+            </a:fontRef>
+          </p:style>
+          <p:txBody>
+            <a:bodyPr rtlCol="0" anchor="ctr"/>
+            <a:lstStyle/>
+            <a:p>
+              <a:pPr algn="ctr"/>
+              <a:endParaRPr lang="en-GB" sz="800" dirty="0"/>
+            </a:p>
+          </p:txBody>
+        </p:sp>
+        <p:sp>
+          <p:nvSpPr>
+            <p:cNvPr id="26" name="TextBox 25"/>
+            <p:cNvSpPr txBox="1"/>
+            <p:nvPr/>
+          </p:nvSpPr>
+          <p:spPr>
+            <a:xfrm>
+              <a:off x="1849833" y="1251882"/>
+              <a:ext cx="344966" cy="215444"/>
+            </a:xfrm>
+            <a:prstGeom prst="rect">
+              <a:avLst/>
+            </a:prstGeom>
+            <a:noFill/>
+          </p:spPr>
+          <p:txBody>
+            <a:bodyPr wrap="none" rtlCol="0">
+              <a:spAutoFit/>
+            </a:bodyPr>
+            <a:lstStyle/>
+            <a:p>
+              <a:r>
+                <a:rPr lang="en-GB" sz="800" dirty="0" smtClean="0"/>
+                <a:t>end</a:t>
+              </a:r>
+              <a:endParaRPr lang="en-GB" sz="800" dirty="0"/>
+            </a:p>
+          </p:txBody>
+        </p:sp>
+      </p:grpSp>
+      <p:cxnSp>
+        <p:nvCxnSpPr>
+          <p:cNvPr id="44" name="Straight Arrow Connector 43"/>
+          <p:cNvCxnSpPr>
+            <a:stCxn id="53" idx="0"/>
+            <a:endCxn id="9" idx="2"/>
+          </p:cNvCxnSpPr>
+          <p:nvPr/>
+        </p:nvCxnSpPr>
+        <p:spPr>
+          <a:xfrm flipV="1">
+            <a:off x="2023243" y="2231303"/>
+            <a:ext cx="0" cy="211094"/>
+          </a:xfrm>
+          <a:prstGeom prst="straightConnector1">
+            <a:avLst/>
+          </a:prstGeom>
+          <a:ln>
+            <a:tailEnd type="triangle"/>
+          </a:ln>
+        </p:spPr>
+        <p:style>
+          <a:lnRef idx="1">
+            <a:schemeClr val="dk1"/>
+          </a:lnRef>
+          <a:fillRef idx="0">
+            <a:schemeClr val="dk1"/>
+          </a:fillRef>
+          <a:effectRef idx="0">
+            <a:schemeClr val="dk1"/>
+          </a:effectRef>
+          <a:fontRef idx="minor">
+            <a:schemeClr val="tx1"/>
+          </a:fontRef>
+        </p:style>
+      </p:cxnSp>
+      <p:sp>
+        <p:nvSpPr>
+          <p:cNvPr id="51" name="Flowchart: Punched Tape 50"/>
+          <p:cNvSpPr/>
+          <p:nvPr/>
+        </p:nvSpPr>
+        <p:spPr>
+          <a:xfrm>
+            <a:off x="2699912" y="1692787"/>
+            <a:ext cx="1080000" cy="540000"/>
+          </a:xfrm>
+          <a:prstGeom prst="flowChartPunchedTape">
+            <a:avLst/>
+          </a:prstGeom>
+          <a:solidFill>
+            <a:schemeClr val="accent1">
+              <a:lumMod val="20000"/>
+              <a:lumOff val="80000"/>
+            </a:schemeClr>
+          </a:solidFill>
+          <a:ln w="9525">
+            <a:solidFill>
+              <a:schemeClr val="tx1"/>
+            </a:solidFill>
+          </a:ln>
+        </p:spPr>
+        <p:style>
+          <a:lnRef idx="2">
+            <a:schemeClr val="accent1">
+              <a:shade val="50000"/>
+            </a:schemeClr>
+          </a:lnRef>
+          <a:fillRef idx="1">
+            <a:schemeClr val="accent1"/>
+          </a:fillRef>
+          <a:effectRef idx="0">
+            <a:schemeClr val="accent1"/>
+          </a:effectRef>
+          <a:fontRef idx="minor">
+            <a:schemeClr val="lt1"/>
+          </a:fontRef>
+        </p:style>
+        <p:txBody>
+          <a:bodyPr rtlCol="0" anchor="ctr"/>
+          <a:lstStyle/>
+          <a:p>
+            <a:pPr algn="ctr"/>
+            <a:r>
+              <a:rPr lang="en-GB" sz="900" dirty="0">
+                <a:solidFill>
+                  <a:schemeClr val="tx1"/>
+                </a:solidFill>
+              </a:rPr>
+              <a:t>LOV Robot notifies curator</a:t>
+            </a:r>
+          </a:p>
+        </p:txBody>
+      </p:sp>
+      <p:cxnSp>
+        <p:nvCxnSpPr>
+          <p:cNvPr id="52" name="Straight Arrow Connector 51"/>
+          <p:cNvCxnSpPr>
+            <a:stCxn id="51" idx="2"/>
+            <a:endCxn id="8" idx="0"/>
+          </p:cNvCxnSpPr>
+          <p:nvPr/>
+        </p:nvCxnSpPr>
+        <p:spPr>
+          <a:xfrm flipH="1">
+            <a:off x="3239792" y="2178787"/>
+            <a:ext cx="120" cy="1156720"/>
+          </a:xfrm>
+          <a:prstGeom prst="straightConnector1">
+            <a:avLst/>
+          </a:prstGeom>
+          <a:ln>
+            <a:tailEnd type="triangle"/>
+          </a:ln>
+        </p:spPr>
+        <p:style>
+          <a:lnRef idx="1">
+            <a:schemeClr val="dk1"/>
+          </a:lnRef>
+          <a:fillRef idx="0">
+            <a:schemeClr val="dk1"/>
+          </a:fillRef>
+          <a:effectRef idx="0">
+            <a:schemeClr val="dk1"/>
+          </a:effectRef>
+          <a:fontRef idx="minor">
+            <a:schemeClr val="tx1"/>
+          </a:fontRef>
+        </p:style>
+      </p:cxnSp>
+      <p:sp>
+        <p:nvSpPr>
+          <p:cNvPr id="59" name="Rectangle 58"/>
+          <p:cNvSpPr/>
+          <p:nvPr/>
+        </p:nvSpPr>
+        <p:spPr>
+          <a:xfrm>
+            <a:off x="1482316" y="4142661"/>
+            <a:ext cx="1080000" cy="648000"/>
+          </a:xfrm>
+          <a:prstGeom prst="rect">
+            <a:avLst/>
+          </a:prstGeom>
+          <a:solidFill>
+            <a:schemeClr val="accent1">
+              <a:lumMod val="20000"/>
+              <a:lumOff val="80000"/>
+            </a:schemeClr>
+          </a:solidFill>
+          <a:ln w="9525">
+            <a:solidFill>
+              <a:schemeClr val="tx1"/>
+            </a:solidFill>
+          </a:ln>
+        </p:spPr>
+        <p:style>
+          <a:lnRef idx="2">
+            <a:schemeClr val="accent1">
+              <a:shade val="50000"/>
+            </a:schemeClr>
+          </a:lnRef>
+          <a:fillRef idx="1">
+            <a:schemeClr val="accent1"/>
+          </a:fillRef>
+          <a:effectRef idx="0">
+            <a:schemeClr val="accent1"/>
+          </a:effectRef>
+          <a:fontRef idx="minor">
+            <a:schemeClr val="lt1"/>
+          </a:fontRef>
+        </p:style>
+        <p:txBody>
+          <a:bodyPr rtlCol="0" anchor="ctr"/>
+          <a:lstStyle/>
+          <a:p>
+            <a:pPr algn="ctr"/>
+            <a:r>
+              <a:rPr lang="en-GB" sz="900" dirty="0" smtClean="0">
+                <a:solidFill>
+                  <a:schemeClr val="tx1"/>
+                </a:solidFill>
+              </a:rPr>
+              <a:t>LOV Robot checks daily if vocabulary has changed</a:t>
+            </a:r>
+            <a:endParaRPr lang="en-GB" sz="900" dirty="0">
+              <a:solidFill>
+                <a:schemeClr val="tx1"/>
+              </a:solidFill>
+            </a:endParaRPr>
+          </a:p>
+        </p:txBody>
+      </p:sp>
+      <p:sp>
+        <p:nvSpPr>
+          <p:cNvPr id="60" name="Flowchart: Decision 59"/>
+          <p:cNvSpPr/>
+          <p:nvPr/>
+        </p:nvSpPr>
+        <p:spPr>
+          <a:xfrm>
+            <a:off x="1482316" y="5001755"/>
+            <a:ext cx="1080000" cy="540000"/>
+          </a:xfrm>
+          <a:prstGeom prst="flowChartDecision">
+            <a:avLst/>
+          </a:prstGeom>
+          <a:solidFill>
+            <a:schemeClr val="bg1"/>
+          </a:solidFill>
+          <a:ln w="9525">
+            <a:solidFill>
+              <a:schemeClr val="tx1"/>
+            </a:solidFill>
+          </a:ln>
+        </p:spPr>
+        <p:style>
+          <a:lnRef idx="2">
+            <a:schemeClr val="accent1">
+              <a:shade val="50000"/>
+            </a:schemeClr>
+          </a:lnRef>
+          <a:fillRef idx="1">
+            <a:schemeClr val="accent1"/>
+          </a:fillRef>
+          <a:effectRef idx="0">
+            <a:schemeClr val="accent1"/>
+          </a:effectRef>
+          <a:fontRef idx="minor">
+            <a:schemeClr val="lt1"/>
+          </a:fontRef>
+        </p:style>
+        <p:txBody>
+          <a:bodyPr rtlCol="0" anchor="ctr"/>
+          <a:lstStyle/>
+          <a:p>
+            <a:pPr algn="ctr"/>
+            <a:r>
+              <a:rPr lang="en-GB" sz="800" dirty="0" smtClean="0">
+                <a:solidFill>
+                  <a:schemeClr val="tx1"/>
+                </a:solidFill>
+              </a:rPr>
+              <a:t>Has changed?</a:t>
+            </a:r>
+            <a:endParaRPr lang="en-GB" sz="800" dirty="0">
+              <a:solidFill>
+                <a:schemeClr val="tx1"/>
+              </a:solidFill>
+            </a:endParaRPr>
+          </a:p>
+        </p:txBody>
+      </p:sp>
+      <p:sp>
+        <p:nvSpPr>
+          <p:cNvPr id="62" name="Rectangle 61"/>
+          <p:cNvSpPr/>
+          <p:nvPr/>
+        </p:nvSpPr>
+        <p:spPr>
+          <a:xfrm>
+            <a:off x="2702090" y="4948517"/>
+            <a:ext cx="1080000" cy="648000"/>
+          </a:xfrm>
+          <a:prstGeom prst="rect">
+            <a:avLst/>
+          </a:prstGeom>
+          <a:solidFill>
+            <a:schemeClr val="accent1">
+              <a:lumMod val="20000"/>
+              <a:lumOff val="80000"/>
+            </a:schemeClr>
+          </a:solidFill>
+          <a:ln w="9525">
+            <a:solidFill>
+              <a:schemeClr val="tx1"/>
+            </a:solidFill>
+          </a:ln>
+        </p:spPr>
+        <p:style>
+          <a:lnRef idx="2">
+            <a:schemeClr val="accent1">
+              <a:shade val="50000"/>
+            </a:schemeClr>
+          </a:lnRef>
+          <a:fillRef idx="1">
+            <a:schemeClr val="accent1"/>
+          </a:fillRef>
+          <a:effectRef idx="0">
+            <a:schemeClr val="accent1"/>
+          </a:effectRef>
+          <a:fontRef idx="minor">
+            <a:schemeClr val="lt1"/>
+          </a:fontRef>
+        </p:style>
+        <p:txBody>
+          <a:bodyPr rtlCol="0" anchor="ctr"/>
+          <a:lstStyle/>
+          <a:p>
+            <a:pPr algn="ctr"/>
+            <a:r>
+              <a:rPr lang="en-GB" sz="900" dirty="0" smtClean="0">
+                <a:solidFill>
+                  <a:schemeClr val="tx1"/>
+                </a:solidFill>
+              </a:rPr>
+              <a:t>LOV Robot add the new version and update vocabulary metadata</a:t>
+            </a:r>
+            <a:endParaRPr lang="en-GB" sz="900" dirty="0">
+              <a:solidFill>
+                <a:schemeClr val="tx1"/>
+              </a:solidFill>
+            </a:endParaRPr>
+          </a:p>
+        </p:txBody>
+      </p:sp>
+      <p:cxnSp>
+        <p:nvCxnSpPr>
+          <p:cNvPr id="63" name="Straight Arrow Connector 54"/>
+          <p:cNvCxnSpPr>
+            <a:stCxn id="60" idx="3"/>
+            <a:endCxn id="62" idx="1"/>
+          </p:cNvCxnSpPr>
+          <p:nvPr/>
+        </p:nvCxnSpPr>
+        <p:spPr>
+          <a:xfrm>
+            <a:off x="2562316" y="5271755"/>
+            <a:ext cx="139774" cy="762"/>
+          </a:xfrm>
+          <a:prstGeom prst="straightConnector1">
+            <a:avLst/>
+          </a:prstGeom>
+          <a:ln>
+            <a:tailEnd type="triangle"/>
+          </a:ln>
+        </p:spPr>
+        <p:style>
+          <a:lnRef idx="1">
+            <a:schemeClr val="dk1"/>
+          </a:lnRef>
+          <a:fillRef idx="0">
+            <a:schemeClr val="dk1"/>
+          </a:fillRef>
+          <a:effectRef idx="0">
+            <a:schemeClr val="dk1"/>
+          </a:effectRef>
+          <a:fontRef idx="minor">
+            <a:schemeClr val="tx1"/>
+          </a:fontRef>
+        </p:style>
+      </p:cxnSp>
+      <p:cxnSp>
+        <p:nvCxnSpPr>
+          <p:cNvPr id="65" name="Straight Arrow Connector 54"/>
+          <p:cNvCxnSpPr>
+            <a:stCxn id="59" idx="2"/>
+            <a:endCxn id="60" idx="0"/>
+          </p:cNvCxnSpPr>
+          <p:nvPr/>
+        </p:nvCxnSpPr>
+        <p:spPr>
+          <a:xfrm>
+            <a:off x="2022316" y="4790661"/>
+            <a:ext cx="0" cy="211094"/>
+          </a:xfrm>
+          <a:prstGeom prst="straightConnector1">
+            <a:avLst/>
+          </a:prstGeom>
+          <a:ln>
+            <a:tailEnd type="triangle"/>
+          </a:ln>
+        </p:spPr>
+        <p:style>
+          <a:lnRef idx="1">
+            <a:schemeClr val="dk1"/>
+          </a:lnRef>
+          <a:fillRef idx="0">
+            <a:schemeClr val="dk1"/>
+          </a:fillRef>
+          <a:effectRef idx="0">
+            <a:schemeClr val="dk1"/>
+          </a:effectRef>
+          <a:fontRef idx="minor">
+            <a:schemeClr val="tx1"/>
+          </a:fontRef>
+        </p:style>
+      </p:cxnSp>
+      <p:cxnSp>
+        <p:nvCxnSpPr>
+          <p:cNvPr id="67" name="Straight Arrow Connector 54"/>
+          <p:cNvCxnSpPr>
+            <a:stCxn id="57" idx="3"/>
+            <a:endCxn id="59" idx="0"/>
+          </p:cNvCxnSpPr>
+          <p:nvPr/>
+        </p:nvCxnSpPr>
+        <p:spPr>
+          <a:xfrm flipH="1">
+            <a:off x="2022316" y="3894803"/>
+            <a:ext cx="928" cy="247858"/>
+          </a:xfrm>
+          <a:prstGeom prst="straightConnector1">
+            <a:avLst/>
+          </a:prstGeom>
+          <a:ln>
+            <a:tailEnd type="triangle"/>
+          </a:ln>
+        </p:spPr>
+        <p:style>
+          <a:lnRef idx="1">
+            <a:schemeClr val="dk1"/>
+          </a:lnRef>
+          <a:fillRef idx="0">
+            <a:schemeClr val="dk1"/>
+          </a:fillRef>
+          <a:effectRef idx="0">
+            <a:schemeClr val="dk1"/>
+          </a:effectRef>
+          <a:fontRef idx="minor">
+            <a:schemeClr val="tx1"/>
+          </a:fontRef>
+        </p:style>
+      </p:cxnSp>
+      <p:cxnSp>
+        <p:nvCxnSpPr>
+          <p:cNvPr id="72" name="Straight Arrow Connector 71"/>
+          <p:cNvCxnSpPr>
+            <a:stCxn id="8" idx="1"/>
+            <a:endCxn id="57" idx="4"/>
+          </p:cNvCxnSpPr>
+          <p:nvPr/>
+        </p:nvCxnSpPr>
+        <p:spPr>
+          <a:xfrm flipH="1">
+            <a:off x="2419288" y="3605507"/>
+            <a:ext cx="280504" cy="3544"/>
+          </a:xfrm>
+          <a:prstGeom prst="straightConnector1">
+            <a:avLst/>
+          </a:prstGeom>
+          <a:ln>
+            <a:tailEnd type="triangle"/>
+          </a:ln>
+        </p:spPr>
+        <p:style>
+          <a:lnRef idx="1">
+            <a:schemeClr val="dk1"/>
+          </a:lnRef>
+          <a:fillRef idx="0">
+            <a:schemeClr val="dk1"/>
+          </a:fillRef>
+          <a:effectRef idx="0">
+            <a:schemeClr val="dk1"/>
+          </a:effectRef>
+          <a:fontRef idx="minor">
+            <a:schemeClr val="tx1"/>
+          </a:fontRef>
+        </p:style>
+      </p:cxnSp>
+      <p:cxnSp>
+        <p:nvCxnSpPr>
+          <p:cNvPr id="75" name="Straight Arrow Connector 74"/>
+          <p:cNvCxnSpPr>
+            <a:stCxn id="62" idx="0"/>
+            <a:endCxn id="89" idx="2"/>
+          </p:cNvCxnSpPr>
+          <p:nvPr/>
+        </p:nvCxnSpPr>
+        <p:spPr>
+          <a:xfrm flipH="1" flipV="1">
+            <a:off x="3239792" y="4646725"/>
+            <a:ext cx="2298" cy="301792"/>
+          </a:xfrm>
+          <a:prstGeom prst="straightConnector1">
+            <a:avLst/>
+          </a:prstGeom>
+          <a:ln>
+            <a:tailEnd type="triangle"/>
+          </a:ln>
+        </p:spPr>
+        <p:style>
+          <a:lnRef idx="1">
+            <a:schemeClr val="dk1"/>
+          </a:lnRef>
+          <a:fillRef idx="0">
+            <a:schemeClr val="dk1"/>
+          </a:fillRef>
+          <a:effectRef idx="0">
+            <a:schemeClr val="dk1"/>
+          </a:effectRef>
+          <a:fontRef idx="minor">
+            <a:schemeClr val="tx1"/>
+          </a:fontRef>
+        </p:style>
+      </p:cxnSp>
+      <p:grpSp>
+        <p:nvGrpSpPr>
+          <p:cNvPr id="82" name="Group 81"/>
+          <p:cNvGrpSpPr/>
+          <p:nvPr/>
+        </p:nvGrpSpPr>
+        <p:grpSpPr>
+          <a:xfrm>
+            <a:off x="1849833" y="5649755"/>
+            <a:ext cx="344966" cy="252250"/>
+            <a:chOff x="1858694" y="5688350"/>
+            <a:chExt cx="344966" cy="252250"/>
+          </a:xfrm>
+        </p:grpSpPr>
+        <p:sp>
+          <p:nvSpPr>
+            <p:cNvPr id="80" name="Oval 79"/>
+            <p:cNvSpPr/>
+            <p:nvPr/>
+          </p:nvSpPr>
+          <p:spPr>
+            <a:xfrm>
+              <a:off x="1900704" y="5688350"/>
+              <a:ext cx="260946" cy="252250"/>
+            </a:xfrm>
+            <a:prstGeom prst="ellipse">
+              <a:avLst/>
+            </a:prstGeom>
+            <a:solidFill>
+              <a:schemeClr val="bg1">
+                <a:lumMod val="65000"/>
+              </a:schemeClr>
+            </a:solidFill>
+            <a:ln w="9525">
+              <a:solidFill>
+                <a:schemeClr val="tx1"/>
+              </a:solidFill>
+            </a:ln>
+          </p:spPr>
+          <p:style>
+            <a:lnRef idx="2">
+              <a:schemeClr val="accent1">
+                <a:shade val="50000"/>
+              </a:schemeClr>
+            </a:lnRef>
+            <a:fillRef idx="1">
+              <a:schemeClr val="accent1"/>
+            </a:fillRef>
+            <a:effectRef idx="0">
+              <a:schemeClr val="accent1"/>
+            </a:effectRef>
+            <a:fontRef idx="minor">
+              <a:schemeClr val="lt1"/>
+            </a:fontRef>
+          </p:style>
+          <p:txBody>
+            <a:bodyPr rtlCol="0" anchor="ctr"/>
+            <a:lstStyle/>
+            <a:p>
+              <a:pPr algn="ctr"/>
+              <a:endParaRPr lang="en-GB" sz="800" dirty="0"/>
+            </a:p>
+          </p:txBody>
+        </p:sp>
+        <p:sp>
+          <p:nvSpPr>
+            <p:cNvPr id="81" name="TextBox 80"/>
+            <p:cNvSpPr txBox="1"/>
+            <p:nvPr/>
+          </p:nvSpPr>
+          <p:spPr>
+            <a:xfrm>
+              <a:off x="1858694" y="5707698"/>
+              <a:ext cx="344966" cy="215444"/>
+            </a:xfrm>
+            <a:prstGeom prst="rect">
+              <a:avLst/>
+            </a:prstGeom>
+            <a:noFill/>
+          </p:spPr>
+          <p:txBody>
+            <a:bodyPr wrap="none" rtlCol="0">
+              <a:spAutoFit/>
+            </a:bodyPr>
+            <a:lstStyle/>
+            <a:p>
+              <a:r>
+                <a:rPr lang="en-GB" sz="800" dirty="0" smtClean="0"/>
+                <a:t>end</a:t>
+              </a:r>
+              <a:endParaRPr lang="en-GB" sz="800" dirty="0"/>
+            </a:p>
+          </p:txBody>
+        </p:sp>
+      </p:grpSp>
+      <p:cxnSp>
+        <p:nvCxnSpPr>
+          <p:cNvPr id="83" name="Straight Arrow Connector 82"/>
+          <p:cNvCxnSpPr>
+            <a:stCxn id="60" idx="2"/>
+            <a:endCxn id="80" idx="0"/>
+          </p:cNvCxnSpPr>
+          <p:nvPr/>
+        </p:nvCxnSpPr>
+        <p:spPr>
+          <a:xfrm>
+            <a:off x="2022316" y="5541755"/>
+            <a:ext cx="0" cy="108000"/>
+          </a:xfrm>
+          <a:prstGeom prst="straightConnector1">
+            <a:avLst/>
+          </a:prstGeom>
+          <a:ln>
+            <a:tailEnd type="triangle"/>
+          </a:ln>
+        </p:spPr>
+        <p:style>
+          <a:lnRef idx="1">
+            <a:schemeClr val="dk1"/>
+          </a:lnRef>
+          <a:fillRef idx="0">
+            <a:schemeClr val="dk1"/>
+          </a:fillRef>
+          <a:effectRef idx="0">
+            <a:schemeClr val="dk1"/>
+          </a:effectRef>
+          <a:fontRef idx="minor">
+            <a:schemeClr val="tx1"/>
+          </a:fontRef>
+        </p:style>
+      </p:cxnSp>
+      <p:sp>
+        <p:nvSpPr>
+          <p:cNvPr id="87" name="TextBox 86"/>
+          <p:cNvSpPr txBox="1"/>
+          <p:nvPr/>
+        </p:nvSpPr>
+        <p:spPr>
+          <a:xfrm>
+            <a:off x="1717545" y="5484064"/>
+            <a:ext cx="320922" cy="215444"/>
+          </a:xfrm>
+          <a:prstGeom prst="rect">
+            <a:avLst/>
+          </a:prstGeom>
+          <a:noFill/>
+        </p:spPr>
+        <p:txBody>
+          <a:bodyPr wrap="none" rtlCol="0">
+            <a:spAutoFit/>
+          </a:bodyPr>
+          <a:lstStyle/>
+          <a:p>
+            <a:r>
+              <a:rPr lang="en-GB" sz="800" b="1" dirty="0" smtClean="0">
+                <a:solidFill>
+                  <a:srgbClr val="FF0000"/>
+                </a:solidFill>
+              </a:rPr>
+              <a:t>NO</a:t>
+            </a:r>
+            <a:endParaRPr lang="en-GB" sz="800" b="1" dirty="0">
+              <a:solidFill>
+                <a:srgbClr val="FF0000"/>
+              </a:solidFill>
+            </a:endParaRPr>
+          </a:p>
+        </p:txBody>
+      </p:sp>
+      <p:sp>
+        <p:nvSpPr>
+          <p:cNvPr id="88" name="TextBox 87"/>
+          <p:cNvSpPr txBox="1"/>
+          <p:nvPr/>
+        </p:nvSpPr>
+        <p:spPr>
+          <a:xfrm>
+            <a:off x="2437222" y="5080374"/>
+            <a:ext cx="335348" cy="215444"/>
+          </a:xfrm>
+          <a:prstGeom prst="rect">
+            <a:avLst/>
+          </a:prstGeom>
+          <a:noFill/>
+        </p:spPr>
+        <p:txBody>
+          <a:bodyPr wrap="none" rtlCol="0">
+            <a:spAutoFit/>
+          </a:bodyPr>
+          <a:lstStyle/>
+          <a:p>
+            <a:r>
+              <a:rPr lang="en-GB" sz="800" b="1" dirty="0" smtClean="0">
+                <a:solidFill>
+                  <a:srgbClr val="FF0000"/>
+                </a:solidFill>
+              </a:rPr>
+              <a:t>YES</a:t>
+            </a:r>
+            <a:endParaRPr lang="en-GB" sz="800" b="1" dirty="0">
+              <a:solidFill>
+                <a:srgbClr val="FF0000"/>
+              </a:solidFill>
+            </a:endParaRPr>
+          </a:p>
+        </p:txBody>
+      </p:sp>
+      <p:sp>
+        <p:nvSpPr>
+          <p:cNvPr id="89" name="Flowchart: Punched Tape 88"/>
+          <p:cNvSpPr/>
+          <p:nvPr/>
+        </p:nvSpPr>
+        <p:spPr>
+          <a:xfrm>
+            <a:off x="2699792" y="4160725"/>
+            <a:ext cx="1080000" cy="540000"/>
+          </a:xfrm>
+          <a:prstGeom prst="flowChartPunchedTape">
+            <a:avLst/>
+          </a:prstGeom>
+          <a:solidFill>
+            <a:schemeClr val="accent1">
+              <a:lumMod val="20000"/>
+              <a:lumOff val="80000"/>
+            </a:schemeClr>
+          </a:solidFill>
+          <a:ln w="9525">
+            <a:solidFill>
+              <a:schemeClr val="tx1"/>
+            </a:solidFill>
+          </a:ln>
+        </p:spPr>
+        <p:style>
+          <a:lnRef idx="2">
+            <a:schemeClr val="accent1">
+              <a:shade val="50000"/>
+            </a:schemeClr>
+          </a:lnRef>
+          <a:fillRef idx="1">
+            <a:schemeClr val="accent1"/>
+          </a:fillRef>
+          <a:effectRef idx="0">
+            <a:schemeClr val="accent1"/>
+          </a:effectRef>
+          <a:fontRef idx="minor">
+            <a:schemeClr val="lt1"/>
+          </a:fontRef>
+        </p:style>
+        <p:txBody>
+          <a:bodyPr rtlCol="0" anchor="ctr"/>
+          <a:lstStyle/>
+          <a:p>
+            <a:pPr algn="ctr"/>
+            <a:r>
+              <a:rPr lang="en-GB" sz="900" dirty="0">
+                <a:solidFill>
+                  <a:schemeClr val="tx1"/>
+                </a:solidFill>
+              </a:rPr>
+              <a:t>LOV Robot notifies curator</a:t>
+            </a:r>
+          </a:p>
+        </p:txBody>
+      </p:sp>
+      <p:cxnSp>
+        <p:nvCxnSpPr>
+          <p:cNvPr id="92" name="Straight Arrow Connector 91"/>
+          <p:cNvCxnSpPr>
+            <a:stCxn id="89" idx="0"/>
+            <a:endCxn id="8" idx="2"/>
+          </p:cNvCxnSpPr>
+          <p:nvPr/>
+        </p:nvCxnSpPr>
+        <p:spPr>
+          <a:xfrm flipV="1">
+            <a:off x="3239792" y="3875507"/>
+            <a:ext cx="0" cy="339218"/>
+          </a:xfrm>
+          <a:prstGeom prst="straightConnector1">
+            <a:avLst/>
+          </a:prstGeom>
+          <a:ln>
+            <a:tailEnd type="triangle"/>
+          </a:ln>
+        </p:spPr>
+        <p:style>
+          <a:lnRef idx="1">
+            <a:schemeClr val="dk1"/>
+          </a:lnRef>
+          <a:fillRef idx="0">
+            <a:schemeClr val="dk1"/>
+          </a:fillRef>
+          <a:effectRef idx="0">
+            <a:schemeClr val="dk1"/>
+          </a:effectRef>
+          <a:fontRef idx="minor">
+            <a:schemeClr val="tx1"/>
+          </a:fontRef>
+        </p:style>
+      </p:cxnSp>
+    </p:spTree>
+    <p:extLst>
+      <p:ext uri="{BB962C8B-B14F-4D97-AF65-F5344CB8AC3E}">
+        <p14:creationId xmlns:p14="http://schemas.microsoft.com/office/powerpoint/2010/main" val="620047751"/>
+      </p:ext>
+    </p:extLst>
+  </p:cSld>
+  <p:clrMapOvr>
+    <a:masterClrMapping/>
+  </p:clrMapOvr>
+</p:sld>
+</file>
+
+<file path=ppt/slides/slide7.xml><?xml version="1.0" encoding="utf-8"?>
+<p:sld xmlns:a="http://schemas.openxmlformats.org/drawingml/2006/main" xmlns:r="http://schemas.openxmlformats.org/officeDocument/2006/relationships" xmlns:p="http://schemas.openxmlformats.org/presentationml/2006/main">
+  <p:cSld>
+    <p:spTree>
+      <p:nvGrpSpPr>
+        <p:cNvPr id="1" name=""/>
+        <p:cNvGrpSpPr/>
+        <p:nvPr/>
+      </p:nvGrpSpPr>
+      <p:grpSpPr>
+        <a:xfrm>
+          <a:off x="0" y="0"/>
+          <a:ext cx="0" cy="0"/>
+          <a:chOff x="0" y="0"/>
+          <a:chExt cx="0" cy="0"/>
+        </a:xfrm>
+      </p:grpSpPr>
+      <p:sp>
+        <p:nvSpPr>
           <p:cNvPr id="4" name="Slide Number Placeholder 3"/>
           <p:cNvSpPr>
             <a:spLocks noGrp="1"/>
@@ -9307,7 +12108,7 @@
               <a:pPr>
                 <a:defRPr/>
               </a:pPr>
-              <a:t>5</a:t>
+              <a:t>7</a:t>
             </a:fld>
             <a:endParaRPr lang="de-DE" altLang="ja-JP"/>
           </a:p>

</xml_diff>

<commit_message>
Final update of flow charts to be vector based. Update of inter-vocab relationship section
</commit_message>
<xml_diff>
--- a/1 First Review/LOV.pptx
+++ b/1 First Review/LOV.pptx
@@ -214,7 +214,7 @@
           <a:p>
             <a:fld id="{29CB55F6-373B-4E47-BA05-6C58FA55415D}" type="datetimeFigureOut">
               <a:rPr lang="en-GB" smtClean="0"/>
-              <a:t>25/05/2015</a:t>
+              <a:t>17/06/2015</a:t>
             </a:fld>
             <a:endParaRPr lang="en-GB"/>
           </a:p>
@@ -868,7 +868,7 @@
             <a:fld id="{2A017CCA-B3A6-42C9-8558-E7F32D7F76FB}" type="datetimeFigureOut">
               <a:rPr lang="fr-FR" smtClean="0"/>
               <a:pPr/>
-              <a:t>25/05/2015</a:t>
+              <a:t>17/06/2015</a:t>
             </a:fld>
             <a:endParaRPr lang="fr-FR"/>
           </a:p>
@@ -1035,7 +1035,7 @@
             <a:fld id="{2A017CCA-B3A6-42C9-8558-E7F32D7F76FB}" type="datetimeFigureOut">
               <a:rPr lang="fr-FR" smtClean="0"/>
               <a:pPr/>
-              <a:t>25/05/2015</a:t>
+              <a:t>17/06/2015</a:t>
             </a:fld>
             <a:endParaRPr lang="fr-FR"/>
           </a:p>
@@ -1212,7 +1212,7 @@
             <a:fld id="{2A017CCA-B3A6-42C9-8558-E7F32D7F76FB}" type="datetimeFigureOut">
               <a:rPr lang="fr-FR" smtClean="0"/>
               <a:pPr/>
-              <a:t>25/05/2015</a:t>
+              <a:t>17/06/2015</a:t>
             </a:fld>
             <a:endParaRPr lang="fr-FR"/>
           </a:p>
@@ -1379,7 +1379,7 @@
             <a:fld id="{2A017CCA-B3A6-42C9-8558-E7F32D7F76FB}" type="datetimeFigureOut">
               <a:rPr lang="fr-FR" smtClean="0"/>
               <a:pPr/>
-              <a:t>25/05/2015</a:t>
+              <a:t>17/06/2015</a:t>
             </a:fld>
             <a:endParaRPr lang="fr-FR"/>
           </a:p>
@@ -1622,7 +1622,7 @@
             <a:fld id="{2A017CCA-B3A6-42C9-8558-E7F32D7F76FB}" type="datetimeFigureOut">
               <a:rPr lang="fr-FR" smtClean="0"/>
               <a:pPr/>
-              <a:t>25/05/2015</a:t>
+              <a:t>17/06/2015</a:t>
             </a:fld>
             <a:endParaRPr lang="fr-FR"/>
           </a:p>
@@ -1907,7 +1907,7 @@
             <a:fld id="{2A017CCA-B3A6-42C9-8558-E7F32D7F76FB}" type="datetimeFigureOut">
               <a:rPr lang="fr-FR" smtClean="0"/>
               <a:pPr/>
-              <a:t>25/05/2015</a:t>
+              <a:t>17/06/2015</a:t>
             </a:fld>
             <a:endParaRPr lang="fr-FR"/>
           </a:p>
@@ -2326,7 +2326,7 @@
             <a:fld id="{2A017CCA-B3A6-42C9-8558-E7F32D7F76FB}" type="datetimeFigureOut">
               <a:rPr lang="fr-FR" smtClean="0"/>
               <a:pPr/>
-              <a:t>25/05/2015</a:t>
+              <a:t>17/06/2015</a:t>
             </a:fld>
             <a:endParaRPr lang="fr-FR"/>
           </a:p>
@@ -2441,7 +2441,7 @@
             <a:fld id="{2A017CCA-B3A6-42C9-8558-E7F32D7F76FB}" type="datetimeFigureOut">
               <a:rPr lang="fr-FR" smtClean="0"/>
               <a:pPr/>
-              <a:t>25/05/2015</a:t>
+              <a:t>17/06/2015</a:t>
             </a:fld>
             <a:endParaRPr lang="fr-FR"/>
           </a:p>
@@ -2533,7 +2533,7 @@
             <a:fld id="{2A017CCA-B3A6-42C9-8558-E7F32D7F76FB}" type="datetimeFigureOut">
               <a:rPr lang="fr-FR" smtClean="0"/>
               <a:pPr/>
-              <a:t>25/05/2015</a:t>
+              <a:t>17/06/2015</a:t>
             </a:fld>
             <a:endParaRPr lang="fr-FR"/>
           </a:p>
@@ -2807,7 +2807,7 @@
             <a:fld id="{2A017CCA-B3A6-42C9-8558-E7F32D7F76FB}" type="datetimeFigureOut">
               <a:rPr lang="fr-FR" smtClean="0"/>
               <a:pPr/>
-              <a:t>25/05/2015</a:t>
+              <a:t>17/06/2015</a:t>
             </a:fld>
             <a:endParaRPr lang="fr-FR"/>
           </a:p>
@@ -3057,7 +3057,7 @@
             <a:fld id="{2A017CCA-B3A6-42C9-8558-E7F32D7F76FB}" type="datetimeFigureOut">
               <a:rPr lang="fr-FR" smtClean="0"/>
               <a:pPr/>
-              <a:t>25/05/2015</a:t>
+              <a:t>17/06/2015</a:t>
             </a:fld>
             <a:endParaRPr lang="fr-FR"/>
           </a:p>
@@ -3267,7 +3267,7 @@
             <a:fld id="{2A017CCA-B3A6-42C9-8558-E7F32D7F76FB}" type="datetimeFigureOut">
               <a:rPr lang="fr-FR" smtClean="0"/>
               <a:pPr/>
-              <a:t>25/05/2015</a:t>
+              <a:t>17/06/2015</a:t>
             </a:fld>
             <a:endParaRPr lang="fr-FR"/>
           </a:p>
@@ -8058,7 +8058,7 @@
         </p:nvCxnSpPr>
         <p:spPr>
           <a:xfrm>
-            <a:off x="1347731" y="4653136"/>
+            <a:off x="51554" y="3037929"/>
             <a:ext cx="4572032" cy="0"/>
           </a:xfrm>
           <a:prstGeom prst="line">
@@ -8091,7 +8091,7 @@
         </p:nvSpPr>
         <p:spPr>
           <a:xfrm>
-            <a:off x="1475689" y="1700808"/>
+            <a:off x="179512" y="85601"/>
             <a:ext cx="1152128" cy="792088"/>
           </a:xfrm>
           <a:prstGeom prst="cloud">
@@ -8149,7 +8149,7 @@
         </p:blipFill>
         <p:spPr bwMode="auto">
           <a:xfrm>
-            <a:off x="3684610" y="1619656"/>
+            <a:off x="2388433" y="4449"/>
             <a:ext cx="792088" cy="681196"/>
           </a:xfrm>
           <a:prstGeom prst="rect">
@@ -8175,7 +8175,7 @@
         </p:nvSpPr>
         <p:spPr>
           <a:xfrm>
-            <a:off x="3229235" y="2200443"/>
+            <a:off x="1933058" y="585236"/>
             <a:ext cx="1702838" cy="369332"/>
           </a:xfrm>
           <a:prstGeom prst="rect">
@@ -8205,7 +8205,7 @@
         </p:nvSpPr>
         <p:spPr>
           <a:xfrm>
-            <a:off x="2114859" y="2996952"/>
+            <a:off x="818682" y="1381745"/>
             <a:ext cx="3312368" cy="357190"/>
           </a:xfrm>
           <a:prstGeom prst="rect">
@@ -8247,7 +8247,7 @@
         </p:nvSpPr>
         <p:spPr>
           <a:xfrm>
-            <a:off x="3675708" y="2567754"/>
+            <a:off x="2379531" y="952547"/>
             <a:ext cx="1751519" cy="357190"/>
           </a:xfrm>
           <a:prstGeom prst="rect">
@@ -8289,7 +8289,7 @@
         </p:nvSpPr>
         <p:spPr>
           <a:xfrm>
-            <a:off x="1463829" y="3545676"/>
+            <a:off x="167652" y="1930469"/>
             <a:ext cx="1296144" cy="944289"/>
           </a:xfrm>
           <a:prstGeom prst="rect">
@@ -8338,7 +8338,7 @@
         </p:nvSpPr>
         <p:spPr>
           <a:xfrm>
-            <a:off x="2831981" y="3545676"/>
+            <a:off x="1535804" y="1930469"/>
             <a:ext cx="1224136" cy="944289"/>
           </a:xfrm>
           <a:prstGeom prst="rect">
@@ -8379,7 +8379,7 @@
         </p:nvSpPr>
         <p:spPr>
           <a:xfrm>
-            <a:off x="4128125" y="3545676"/>
+            <a:off x="2831948" y="1930469"/>
             <a:ext cx="1292197" cy="944289"/>
           </a:xfrm>
           <a:prstGeom prst="rect">
@@ -8420,7 +8420,7 @@
         </p:nvSpPr>
         <p:spPr>
           <a:xfrm>
-            <a:off x="1470733" y="4748007"/>
+            <a:off x="174556" y="3132800"/>
             <a:ext cx="792088" cy="571504"/>
           </a:xfrm>
           <a:prstGeom prst="can">
@@ -8461,7 +8461,7 @@
         </p:nvSpPr>
         <p:spPr>
           <a:xfrm>
-            <a:off x="2370833" y="4759098"/>
+            <a:off x="1074656" y="3143891"/>
             <a:ext cx="792088" cy="571504"/>
           </a:xfrm>
           <a:prstGeom prst="can">
@@ -8502,7 +8502,7 @@
         </p:nvSpPr>
         <p:spPr>
           <a:xfrm>
-            <a:off x="3251694" y="4760003"/>
+            <a:off x="1955517" y="3144796"/>
             <a:ext cx="792088" cy="571504"/>
           </a:xfrm>
           <a:prstGeom prst="can">
@@ -8543,7 +8543,7 @@
         </p:nvGrpSpPr>
         <p:grpSpPr>
           <a:xfrm>
-            <a:off x="4841069" y="4748007"/>
+            <a:off x="3544892" y="3132800"/>
             <a:ext cx="595035" cy="571504"/>
             <a:chOff x="5736779" y="3000372"/>
             <a:chExt cx="595035" cy="571504"/>
@@ -8634,7 +8634,7 @@
         </p:nvGrpSpPr>
         <p:grpSpPr>
           <a:xfrm>
-            <a:off x="4123364" y="4703925"/>
+            <a:off x="2827187" y="3088718"/>
             <a:ext cx="650859" cy="628703"/>
             <a:chOff x="4128287" y="1191056"/>
             <a:chExt cx="650859" cy="628703"/>
@@ -8771,7 +8771,7 @@
         </p:nvCxnSpPr>
         <p:spPr>
           <a:xfrm>
-            <a:off x="1347731" y="3456618"/>
+            <a:off x="51554" y="1841411"/>
             <a:ext cx="4572032" cy="0"/>
           </a:xfrm>
           <a:prstGeom prst="line">
@@ -8804,7 +8804,7 @@
         </p:nvSpPr>
         <p:spPr>
           <a:xfrm rot="16200000">
-            <a:off x="4823477" y="2318392"/>
+            <a:off x="3527300" y="703185"/>
             <a:ext cx="1512168" cy="276999"/>
           </a:xfrm>
           <a:prstGeom prst="rect">
@@ -8834,7 +8834,7 @@
         </p:nvSpPr>
         <p:spPr>
           <a:xfrm rot="16200000">
-            <a:off x="5000288" y="3885352"/>
+            <a:off x="3704111" y="2270145"/>
             <a:ext cx="1150620" cy="276999"/>
           </a:xfrm>
           <a:prstGeom prst="rect">
@@ -8864,7 +8864,7 @@
         </p:nvSpPr>
         <p:spPr>
           <a:xfrm rot="16200000">
-            <a:off x="5141441" y="4938923"/>
+            <a:off x="3845264" y="3323716"/>
             <a:ext cx="848572" cy="276999"/>
           </a:xfrm>
           <a:prstGeom prst="rect">
@@ -8895,7 +8895,7 @@
         </p:nvSpPr>
         <p:spPr>
           <a:xfrm>
-            <a:off x="2807984" y="4206657"/>
+            <a:off x="1511807" y="2591450"/>
             <a:ext cx="1273105" cy="261610"/>
           </a:xfrm>
           <a:prstGeom prst="rect">
@@ -8926,7 +8926,7 @@
         </p:nvSpPr>
         <p:spPr>
           <a:xfrm>
-            <a:off x="4068794" y="3905716"/>
+            <a:off x="2772617" y="2290509"/>
             <a:ext cx="1393276" cy="600164"/>
           </a:xfrm>
           <a:prstGeom prst="rect">
@@ -8964,7 +8964,7 @@
         </p:nvCxnSpPr>
         <p:spPr>
           <a:xfrm flipH="1">
-            <a:off x="2654451" y="4005064"/>
+            <a:off x="1358274" y="2389857"/>
             <a:ext cx="288000" cy="0"/>
           </a:xfrm>
           <a:prstGeom prst="straightConnector1">
@@ -8998,7 +8998,7 @@
         </p:nvCxnSpPr>
         <p:spPr>
           <a:xfrm>
-            <a:off x="3448002" y="3374808"/>
+            <a:off x="2151825" y="1759601"/>
             <a:ext cx="0" cy="167465"/>
           </a:xfrm>
           <a:prstGeom prst="straightConnector1">
@@ -9032,7 +9032,7 @@
         </p:nvCxnSpPr>
         <p:spPr>
           <a:xfrm>
-            <a:off x="2370833" y="3374808"/>
+            <a:off x="1074656" y="1759601"/>
             <a:ext cx="0" cy="167465"/>
           </a:xfrm>
           <a:prstGeom prst="straightConnector1">
@@ -9066,7 +9066,7 @@
         </p:nvCxnSpPr>
         <p:spPr>
           <a:xfrm>
-            <a:off x="4837137" y="3374808"/>
+            <a:off x="3540960" y="1759601"/>
             <a:ext cx="0" cy="167465"/>
           </a:xfrm>
           <a:prstGeom prst="straightConnector1">
@@ -9100,7 +9100,7 @@
         </p:nvCxnSpPr>
         <p:spPr>
           <a:xfrm>
-            <a:off x="4551467" y="2884979"/>
+            <a:off x="3255290" y="1269772"/>
             <a:ext cx="0" cy="167465"/>
           </a:xfrm>
           <a:prstGeom prst="straightConnector1">
@@ -9134,7 +9134,7 @@
         </p:nvCxnSpPr>
         <p:spPr>
           <a:xfrm>
-            <a:off x="3491880" y="2486042"/>
+            <a:off x="2195703" y="870835"/>
             <a:ext cx="0" cy="497282"/>
           </a:xfrm>
           <a:prstGeom prst="straightConnector1">
@@ -9168,7 +9168,7 @@
         </p:nvCxnSpPr>
         <p:spPr>
           <a:xfrm flipV="1">
-            <a:off x="1877634" y="2628114"/>
+            <a:off x="581457" y="1012907"/>
             <a:ext cx="0" cy="892940"/>
           </a:xfrm>
           <a:prstGeom prst="straightConnector1">
@@ -9202,7 +9202,7 @@
         </p:nvCxnSpPr>
         <p:spPr>
           <a:xfrm>
-            <a:off x="3600402" y="4557679"/>
+            <a:off x="2304225" y="2942472"/>
             <a:ext cx="0" cy="167465"/>
           </a:xfrm>
           <a:prstGeom prst="straightConnector1">
@@ -9236,7 +9236,7 @@
         </p:nvCxnSpPr>
         <p:spPr>
           <a:xfrm>
-            <a:off x="4806572" y="4554791"/>
+            <a:off x="3510395" y="2939584"/>
             <a:ext cx="0" cy="167465"/>
           </a:xfrm>
           <a:prstGeom prst="straightConnector1">
@@ -9270,7 +9270,7 @@
         </p:nvCxnSpPr>
         <p:spPr>
           <a:xfrm>
-            <a:off x="2114859" y="4557679"/>
+            <a:off x="818682" y="2942472"/>
             <a:ext cx="0" cy="167465"/>
           </a:xfrm>
           <a:prstGeom prst="straightConnector1">
@@ -9304,7 +9304,7 @@
         </p:nvCxnSpPr>
         <p:spPr>
           <a:xfrm>
-            <a:off x="4070913" y="2460649"/>
+            <a:off x="2774736" y="845442"/>
             <a:ext cx="0" cy="167465"/>
           </a:xfrm>
           <a:prstGeom prst="straightConnector1">

</xml_diff>

<commit_message>
Update formula and flowcharts
</commit_message>
<xml_diff>
--- a/1 First Review/LOV.pptx
+++ b/1 First Review/LOV.pptx
@@ -5,16 +5,14 @@
     <p:sldMasterId id="2147483648" r:id="rId1"/>
   </p:sldMasterIdLst>
   <p:notesMasterIdLst>
-    <p:notesMasterId r:id="rId9"/>
+    <p:notesMasterId r:id="rId7"/>
   </p:notesMasterIdLst>
   <p:sldIdLst>
     <p:sldId id="256" r:id="rId2"/>
     <p:sldId id="257" r:id="rId3"/>
     <p:sldId id="258" r:id="rId4"/>
     <p:sldId id="259" r:id="rId5"/>
-    <p:sldId id="261" r:id="rId6"/>
-    <p:sldId id="262" r:id="rId7"/>
-    <p:sldId id="260" r:id="rId8"/>
+    <p:sldId id="260" r:id="rId6"/>
   </p:sldIdLst>
   <p:sldSz cx="9144000" cy="6858000" type="screen4x3"/>
   <p:notesSz cx="6858000" cy="9144000"/>
@@ -214,7 +212,7 @@
           <a:p>
             <a:fld id="{29CB55F6-373B-4E47-BA05-6C58FA55415D}" type="datetimeFigureOut">
               <a:rPr lang="en-GB" smtClean="0"/>
-              <a:t>17/06/2015</a:t>
+              <a:t>22/06/2015</a:t>
             </a:fld>
             <a:endParaRPr lang="en-GB"/>
           </a:p>
@@ -526,90 +524,6 @@
           <a:bodyPr/>
           <a:lstStyle/>
           <a:p>
-            <a:endParaRPr lang="en-GB"/>
-          </a:p>
-        </p:txBody>
-      </p:sp>
-      <p:sp>
-        <p:nvSpPr>
-          <p:cNvPr id="4" name="Slide Number Placeholder 3"/>
-          <p:cNvSpPr>
-            <a:spLocks noGrp="1"/>
-          </p:cNvSpPr>
-          <p:nvPr>
-            <p:ph type="sldNum" sz="quarter" idx="10"/>
-          </p:nvPr>
-        </p:nvSpPr>
-        <p:spPr/>
-        <p:txBody>
-          <a:bodyPr/>
-          <a:lstStyle/>
-          <a:p>
-            <a:fld id="{021EE582-E181-4549-9D8F-9BE43EA00A41}" type="slidenum">
-              <a:rPr lang="en-GB" smtClean="0"/>
-              <a:t>6</a:t>
-            </a:fld>
-            <a:endParaRPr lang="en-GB"/>
-          </a:p>
-        </p:txBody>
-      </p:sp>
-    </p:spTree>
-    <p:extLst>
-      <p:ext uri="{BB962C8B-B14F-4D97-AF65-F5344CB8AC3E}">
-        <p14:creationId xmlns:p14="http://schemas.microsoft.com/office/powerpoint/2010/main" val="2542734508"/>
-      </p:ext>
-    </p:extLst>
-  </p:cSld>
-  <p:clrMapOvr>
-    <a:masterClrMapping/>
-  </p:clrMapOvr>
-</p:notes>
-</file>
-
-<file path=ppt/notesSlides/notesSlide2.xml><?xml version="1.0" encoding="utf-8"?>
-<p:notes xmlns:a="http://schemas.openxmlformats.org/drawingml/2006/main" xmlns:r="http://schemas.openxmlformats.org/officeDocument/2006/relationships" xmlns:p="http://schemas.openxmlformats.org/presentationml/2006/main">
-  <p:cSld>
-    <p:spTree>
-      <p:nvGrpSpPr>
-        <p:cNvPr id="1" name=""/>
-        <p:cNvGrpSpPr/>
-        <p:nvPr/>
-      </p:nvGrpSpPr>
-      <p:grpSpPr>
-        <a:xfrm>
-          <a:off x="0" y="0"/>
-          <a:ext cx="0" cy="0"/>
-          <a:chOff x="0" y="0"/>
-          <a:chExt cx="0" cy="0"/>
-        </a:xfrm>
-      </p:grpSpPr>
-      <p:sp>
-        <p:nvSpPr>
-          <p:cNvPr id="2" name="Slide Image Placeholder 1"/>
-          <p:cNvSpPr>
-            <a:spLocks noGrp="1" noRot="1" noChangeAspect="1"/>
-          </p:cNvSpPr>
-          <p:nvPr>
-            <p:ph type="sldImg"/>
-          </p:nvPr>
-        </p:nvSpPr>
-        <p:spPr/>
-      </p:sp>
-      <p:sp>
-        <p:nvSpPr>
-          <p:cNvPr id="3" name="Notes Placeholder 2"/>
-          <p:cNvSpPr>
-            <a:spLocks noGrp="1"/>
-          </p:cNvSpPr>
-          <p:nvPr>
-            <p:ph type="body" idx="1"/>
-          </p:nvPr>
-        </p:nvSpPr>
-        <p:spPr/>
-        <p:txBody>
-          <a:bodyPr/>
-          <a:lstStyle/>
-          <a:p>
             <a:r>
               <a:rPr lang="en-GB" sz="1200" dirty="0" smtClean="0"/>
               <a:t>(page 57 numbered, 50 in the browser)</a:t>
@@ -667,7 +581,7 @@
               <a:pPr>
                 <a:defRPr/>
               </a:pPr>
-              <a:t>7</a:t>
+              <a:t>5</a:t>
             </a:fld>
             <a:endParaRPr lang="en-US" altLang="ja-JP"/>
           </a:p>
@@ -868,7 +782,7 @@
             <a:fld id="{2A017CCA-B3A6-42C9-8558-E7F32D7F76FB}" type="datetimeFigureOut">
               <a:rPr lang="fr-FR" smtClean="0"/>
               <a:pPr/>
-              <a:t>17/06/2015</a:t>
+              <a:t>22/06/2015</a:t>
             </a:fld>
             <a:endParaRPr lang="fr-FR"/>
           </a:p>
@@ -1035,7 +949,7 @@
             <a:fld id="{2A017CCA-B3A6-42C9-8558-E7F32D7F76FB}" type="datetimeFigureOut">
               <a:rPr lang="fr-FR" smtClean="0"/>
               <a:pPr/>
-              <a:t>17/06/2015</a:t>
+              <a:t>22/06/2015</a:t>
             </a:fld>
             <a:endParaRPr lang="fr-FR"/>
           </a:p>
@@ -1212,7 +1126,7 @@
             <a:fld id="{2A017CCA-B3A6-42C9-8558-E7F32D7F76FB}" type="datetimeFigureOut">
               <a:rPr lang="fr-FR" smtClean="0"/>
               <a:pPr/>
-              <a:t>17/06/2015</a:t>
+              <a:t>22/06/2015</a:t>
             </a:fld>
             <a:endParaRPr lang="fr-FR"/>
           </a:p>
@@ -1379,7 +1293,7 @@
             <a:fld id="{2A017CCA-B3A6-42C9-8558-E7F32D7F76FB}" type="datetimeFigureOut">
               <a:rPr lang="fr-FR" smtClean="0"/>
               <a:pPr/>
-              <a:t>17/06/2015</a:t>
+              <a:t>22/06/2015</a:t>
             </a:fld>
             <a:endParaRPr lang="fr-FR"/>
           </a:p>
@@ -1622,7 +1536,7 @@
             <a:fld id="{2A017CCA-B3A6-42C9-8558-E7F32D7F76FB}" type="datetimeFigureOut">
               <a:rPr lang="fr-FR" smtClean="0"/>
               <a:pPr/>
-              <a:t>17/06/2015</a:t>
+              <a:t>22/06/2015</a:t>
             </a:fld>
             <a:endParaRPr lang="fr-FR"/>
           </a:p>
@@ -1907,7 +1821,7 @@
             <a:fld id="{2A017CCA-B3A6-42C9-8558-E7F32D7F76FB}" type="datetimeFigureOut">
               <a:rPr lang="fr-FR" smtClean="0"/>
               <a:pPr/>
-              <a:t>17/06/2015</a:t>
+              <a:t>22/06/2015</a:t>
             </a:fld>
             <a:endParaRPr lang="fr-FR"/>
           </a:p>
@@ -2326,7 +2240,7 @@
             <a:fld id="{2A017CCA-B3A6-42C9-8558-E7F32D7F76FB}" type="datetimeFigureOut">
               <a:rPr lang="fr-FR" smtClean="0"/>
               <a:pPr/>
-              <a:t>17/06/2015</a:t>
+              <a:t>22/06/2015</a:t>
             </a:fld>
             <a:endParaRPr lang="fr-FR"/>
           </a:p>
@@ -2441,7 +2355,7 @@
             <a:fld id="{2A017CCA-B3A6-42C9-8558-E7F32D7F76FB}" type="datetimeFigureOut">
               <a:rPr lang="fr-FR" smtClean="0"/>
               <a:pPr/>
-              <a:t>17/06/2015</a:t>
+              <a:t>22/06/2015</a:t>
             </a:fld>
             <a:endParaRPr lang="fr-FR"/>
           </a:p>
@@ -2533,7 +2447,7 @@
             <a:fld id="{2A017CCA-B3A6-42C9-8558-E7F32D7F76FB}" type="datetimeFigureOut">
               <a:rPr lang="fr-FR" smtClean="0"/>
               <a:pPr/>
-              <a:t>17/06/2015</a:t>
+              <a:t>22/06/2015</a:t>
             </a:fld>
             <a:endParaRPr lang="fr-FR"/>
           </a:p>
@@ -2807,7 +2721,7 @@
             <a:fld id="{2A017CCA-B3A6-42C9-8558-E7F32D7F76FB}" type="datetimeFigureOut">
               <a:rPr lang="fr-FR" smtClean="0"/>
               <a:pPr/>
-              <a:t>17/06/2015</a:t>
+              <a:t>22/06/2015</a:t>
             </a:fld>
             <a:endParaRPr lang="fr-FR"/>
           </a:p>
@@ -3057,7 +2971,7 @@
             <a:fld id="{2A017CCA-B3A6-42C9-8558-E7F32D7F76FB}" type="datetimeFigureOut">
               <a:rPr lang="fr-FR" smtClean="0"/>
               <a:pPr/>
-              <a:t>17/06/2015</a:t>
+              <a:t>22/06/2015</a:t>
             </a:fld>
             <a:endParaRPr lang="fr-FR"/>
           </a:p>
@@ -3267,7 +3181,7 @@
             <a:fld id="{2A017CCA-B3A6-42C9-8558-E7F32D7F76FB}" type="datetimeFigureOut">
               <a:rPr lang="fr-FR" smtClean="0"/>
               <a:pPr/>
-              <a:t>17/06/2015</a:t>
+              <a:t>22/06/2015</a:t>
             </a:fld>
             <a:endParaRPr lang="fr-FR"/>
           </a:p>
@@ -8050,6 +7964,44 @@
           <a:chExt cx="0" cy="0"/>
         </a:xfrm>
       </p:grpSpPr>
+      <p:sp>
+        <p:nvSpPr>
+          <p:cNvPr id="8" name="Rectangle 7"/>
+          <p:cNvSpPr/>
+          <p:nvPr/>
+        </p:nvSpPr>
+        <p:spPr>
+          <a:xfrm>
+            <a:off x="51554" y="3075542"/>
+            <a:ext cx="4088373" cy="828262"/>
+          </a:xfrm>
+          <a:prstGeom prst="rect">
+            <a:avLst/>
+          </a:prstGeom>
+        </p:spPr>
+        <p:style>
+          <a:lnRef idx="1">
+            <a:schemeClr val="accent5"/>
+          </a:lnRef>
+          <a:fillRef idx="2">
+            <a:schemeClr val="accent5"/>
+          </a:fillRef>
+          <a:effectRef idx="1">
+            <a:schemeClr val="accent5"/>
+          </a:effectRef>
+          <a:fontRef idx="minor">
+            <a:schemeClr val="dk1"/>
+          </a:fontRef>
+        </p:style>
+        <p:txBody>
+          <a:bodyPr rtlCol="0" anchor="ctr"/>
+          <a:lstStyle/>
+          <a:p>
+            <a:pPr algn="ctr"/>
+            <a:endParaRPr lang="en-GB"/>
+          </a:p>
+        </p:txBody>
+      </p:sp>
       <p:cxnSp>
         <p:nvCxnSpPr>
           <p:cNvPr id="62" name="Connecteur droit 14"/>
@@ -8420,7 +8372,7 @@
         </p:nvSpPr>
         <p:spPr>
           <a:xfrm>
-            <a:off x="174556" y="3132800"/>
+            <a:off x="174556" y="3247564"/>
             <a:ext cx="792088" cy="571504"/>
           </a:xfrm>
           <a:prstGeom prst="can">
@@ -8428,14 +8380,14 @@
           </a:prstGeom>
         </p:spPr>
         <p:style>
-          <a:lnRef idx="1">
-            <a:schemeClr val="accent5"/>
-          </a:lnRef>
-          <a:fillRef idx="2">
-            <a:schemeClr val="accent5"/>
-          </a:fillRef>
-          <a:effectRef idx="1">
-            <a:schemeClr val="accent5"/>
+          <a:lnRef idx="2">
+            <a:schemeClr val="accent1"/>
+          </a:lnRef>
+          <a:fillRef idx="1">
+            <a:schemeClr val="lt1"/>
+          </a:fillRef>
+          <a:effectRef idx="0">
+            <a:schemeClr val="accent1"/>
           </a:effectRef>
           <a:fontRef idx="minor">
             <a:schemeClr val="dk1"/>
@@ -8461,7 +8413,7 @@
         </p:nvSpPr>
         <p:spPr>
           <a:xfrm>
-            <a:off x="1074656" y="3143891"/>
+            <a:off x="1074656" y="3258655"/>
             <a:ext cx="792088" cy="571504"/>
           </a:xfrm>
           <a:prstGeom prst="can">
@@ -8469,14 +8421,14 @@
           </a:prstGeom>
         </p:spPr>
         <p:style>
-          <a:lnRef idx="1">
-            <a:schemeClr val="accent5"/>
-          </a:lnRef>
-          <a:fillRef idx="2">
-            <a:schemeClr val="accent5"/>
-          </a:fillRef>
-          <a:effectRef idx="1">
-            <a:schemeClr val="accent5"/>
+          <a:lnRef idx="2">
+            <a:schemeClr val="accent1"/>
+          </a:lnRef>
+          <a:fillRef idx="1">
+            <a:schemeClr val="lt1"/>
+          </a:fillRef>
+          <a:effectRef idx="0">
+            <a:schemeClr val="accent1"/>
           </a:effectRef>
           <a:fontRef idx="minor">
             <a:schemeClr val="dk1"/>
@@ -8502,7 +8454,7 @@
         </p:nvSpPr>
         <p:spPr>
           <a:xfrm>
-            <a:off x="1955517" y="3144796"/>
+            <a:off x="1955517" y="3259560"/>
             <a:ext cx="792088" cy="571504"/>
           </a:xfrm>
           <a:prstGeom prst="can">
@@ -8510,14 +8462,14 @@
           </a:prstGeom>
         </p:spPr>
         <p:style>
-          <a:lnRef idx="1">
-            <a:schemeClr val="accent5"/>
-          </a:lnRef>
-          <a:fillRef idx="2">
-            <a:schemeClr val="accent5"/>
-          </a:fillRef>
-          <a:effectRef idx="1">
-            <a:schemeClr val="accent5"/>
+          <a:lnRef idx="2">
+            <a:schemeClr val="accent1"/>
+          </a:lnRef>
+          <a:fillRef idx="1">
+            <a:schemeClr val="lt1"/>
+          </a:fillRef>
+          <a:effectRef idx="0">
+            <a:schemeClr val="accent1"/>
           </a:effectRef>
           <a:fontRef idx="minor">
             <a:schemeClr val="dk1"/>
@@ -8543,7 +8495,7 @@
         </p:nvGrpSpPr>
         <p:grpSpPr>
           <a:xfrm>
-            <a:off x="3544892" y="3132800"/>
+            <a:off x="3544892" y="3247564"/>
             <a:ext cx="595035" cy="571504"/>
             <a:chOff x="5736779" y="3000372"/>
             <a:chExt cx="595035" cy="571504"/>
@@ -8565,14 +8517,14 @@
             </a:prstGeom>
           </p:spPr>
           <p:style>
-            <a:lnRef idx="1">
-              <a:schemeClr val="accent5"/>
+            <a:lnRef idx="2">
+              <a:schemeClr val="accent1"/>
             </a:lnRef>
-            <a:fillRef idx="2">
-              <a:schemeClr val="accent5"/>
+            <a:fillRef idx="1">
+              <a:schemeClr val="lt1"/>
             </a:fillRef>
-            <a:effectRef idx="1">
-              <a:schemeClr val="accent5"/>
+            <a:effectRef idx="0">
+              <a:schemeClr val="accent1"/>
             </a:effectRef>
             <a:fontRef idx="minor">
               <a:schemeClr val="dk1"/>
@@ -8602,7 +8554,24 @@
               <a:avLst/>
             </a:prstGeom>
             <a:noFill/>
+            <a:ln>
+              <a:noFill/>
+            </a:ln>
           </p:spPr>
+          <p:style>
+            <a:lnRef idx="2">
+              <a:schemeClr val="accent1"/>
+            </a:lnRef>
+            <a:fillRef idx="1">
+              <a:schemeClr val="lt1"/>
+            </a:fillRef>
+            <a:effectRef idx="0">
+              <a:schemeClr val="accent1"/>
+            </a:effectRef>
+            <a:fontRef idx="minor">
+              <a:schemeClr val="dk1"/>
+            </a:fontRef>
+          </p:style>
           <p:txBody>
             <a:bodyPr wrap="square" rtlCol="0">
               <a:spAutoFit/>
@@ -8634,7 +8603,7 @@
         </p:nvGrpSpPr>
         <p:grpSpPr>
           <a:xfrm>
-            <a:off x="2827187" y="3088718"/>
+            <a:off x="2827187" y="3203482"/>
             <a:ext cx="650859" cy="628703"/>
             <a:chOff x="4128287" y="1191056"/>
             <a:chExt cx="650859" cy="628703"/>
@@ -8656,14 +8625,14 @@
             </a:prstGeom>
           </p:spPr>
           <p:style>
-            <a:lnRef idx="1">
-              <a:schemeClr val="accent5"/>
+            <a:lnRef idx="2">
+              <a:schemeClr val="accent1"/>
             </a:lnRef>
-            <a:fillRef idx="2">
-              <a:schemeClr val="accent5"/>
+            <a:fillRef idx="1">
+              <a:schemeClr val="lt1"/>
             </a:fillRef>
-            <a:effectRef idx="1">
-              <a:schemeClr val="accent5"/>
+            <a:effectRef idx="0">
+              <a:schemeClr val="accent1"/>
             </a:effectRef>
             <a:fontRef idx="minor">
               <a:schemeClr val="dk1"/>
@@ -8708,14 +8677,14 @@
               </a:prstGeom>
             </p:spPr>
             <p:style>
-              <a:lnRef idx="1">
-                <a:schemeClr val="accent5"/>
+              <a:lnRef idx="2">
+                <a:schemeClr val="accent1"/>
               </a:lnRef>
-              <a:fillRef idx="2">
-                <a:schemeClr val="accent5"/>
+              <a:fillRef idx="1">
+                <a:schemeClr val="lt1"/>
               </a:fillRef>
-              <a:effectRef idx="1">
-                <a:schemeClr val="accent5"/>
+              <a:effectRef idx="0">
+                <a:schemeClr val="accent1"/>
               </a:effectRef>
               <a:fontRef idx="minor">
                 <a:schemeClr val="dk1"/>
@@ -9196,13 +9165,13 @@
       </p:cxnSp>
       <p:cxnSp>
         <p:nvCxnSpPr>
-          <p:cNvPr id="90" name="Connecteur droit avec flèche 150"/>
+          <p:cNvPr id="97" name="Connecteur droit avec flèche 150"/>
           <p:cNvCxnSpPr/>
           <p:nvPr/>
         </p:nvCxnSpPr>
         <p:spPr>
           <a:xfrm>
-            <a:off x="2304225" y="2942472"/>
+            <a:off x="2774736" y="845442"/>
             <a:ext cx="0" cy="167465"/>
           </a:xfrm>
           <a:prstGeom prst="straightConnector1">
@@ -9230,14 +9199,14 @@
       </p:cxnSp>
       <p:cxnSp>
         <p:nvCxnSpPr>
-          <p:cNvPr id="91" name="Connecteur droit avec flèche 150"/>
+          <p:cNvPr id="44" name="Connecteur droit avec flèche 150"/>
           <p:cNvCxnSpPr/>
           <p:nvPr/>
         </p:nvCxnSpPr>
         <p:spPr>
-          <a:xfrm>
-            <a:off x="3510395" y="2939584"/>
-            <a:ext cx="0" cy="167465"/>
+          <a:xfrm flipH="1">
+            <a:off x="3540960" y="2949040"/>
+            <a:ext cx="863" cy="216024"/>
           </a:xfrm>
           <a:prstGeom prst="straightConnector1">
             <a:avLst/>
@@ -9264,14 +9233,14 @@
       </p:cxnSp>
       <p:cxnSp>
         <p:nvCxnSpPr>
-          <p:cNvPr id="96" name="Connecteur droit avec flèche 150"/>
+          <p:cNvPr id="45" name="Connecteur droit avec flèche 150"/>
           <p:cNvCxnSpPr/>
           <p:nvPr/>
         </p:nvCxnSpPr>
         <p:spPr>
-          <a:xfrm>
-            <a:off x="818682" y="2942472"/>
-            <a:ext cx="0" cy="167465"/>
+          <a:xfrm flipH="1">
+            <a:off x="2147009" y="2949040"/>
+            <a:ext cx="863" cy="216024"/>
           </a:xfrm>
           <a:prstGeom prst="straightConnector1">
             <a:avLst/>
@@ -9298,14 +9267,14 @@
       </p:cxnSp>
       <p:cxnSp>
         <p:nvCxnSpPr>
-          <p:cNvPr id="97" name="Connecteur droit avec flèche 150"/>
+          <p:cNvPr id="47" name="Connecteur droit avec flèche 150"/>
           <p:cNvCxnSpPr/>
           <p:nvPr/>
         </p:nvCxnSpPr>
         <p:spPr>
-          <a:xfrm>
-            <a:off x="2774736" y="845442"/>
-            <a:ext cx="0" cy="167465"/>
+          <a:xfrm flipH="1">
+            <a:off x="815724" y="2949040"/>
+            <a:ext cx="863" cy="216024"/>
           </a:xfrm>
           <a:prstGeom prst="straightConnector1">
             <a:avLst/>
@@ -9362,2731 +9331,6 @@
       </p:grpSpPr>
       <p:sp>
         <p:nvSpPr>
-          <p:cNvPr id="2" name="Title 1"/>
-          <p:cNvSpPr>
-            <a:spLocks noGrp="1"/>
-          </p:cNvSpPr>
-          <p:nvPr>
-            <p:ph type="title"/>
-          </p:nvPr>
-        </p:nvSpPr>
-        <p:spPr/>
-        <p:txBody>
-          <a:bodyPr/>
-          <a:lstStyle/>
-          <a:p>
-            <a:r>
-              <a:rPr lang="en-GB" dirty="0" smtClean="0"/>
-              <a:t>Curation Workflow 1 - Suggestion</a:t>
-            </a:r>
-            <a:endParaRPr lang="en-GB" dirty="0"/>
-          </a:p>
-        </p:txBody>
-      </p:sp>
-      <p:sp>
-        <p:nvSpPr>
-          <p:cNvPr id="4" name="Rectangle 3"/>
-          <p:cNvSpPr/>
-          <p:nvPr/>
-        </p:nvSpPr>
-        <p:spPr>
-          <a:xfrm>
-            <a:off x="3923928" y="1556792"/>
-            <a:ext cx="1080000" cy="360000"/>
-          </a:xfrm>
-          <a:prstGeom prst="rect">
-            <a:avLst/>
-          </a:prstGeom>
-          <a:solidFill>
-            <a:schemeClr val="accent1">
-              <a:lumMod val="20000"/>
-              <a:lumOff val="80000"/>
-            </a:schemeClr>
-          </a:solidFill>
-          <a:ln w="9525">
-            <a:solidFill>
-              <a:schemeClr val="tx1"/>
-            </a:solidFill>
-          </a:ln>
-        </p:spPr>
-        <p:style>
-          <a:lnRef idx="2">
-            <a:schemeClr val="accent1">
-              <a:shade val="50000"/>
-            </a:schemeClr>
-          </a:lnRef>
-          <a:fillRef idx="1">
-            <a:schemeClr val="accent1"/>
-          </a:fillRef>
-          <a:effectRef idx="0">
-            <a:schemeClr val="accent1"/>
-          </a:effectRef>
-          <a:fontRef idx="minor">
-            <a:schemeClr val="lt1"/>
-          </a:fontRef>
-        </p:style>
-        <p:txBody>
-          <a:bodyPr rtlCol="0" anchor="ctr"/>
-          <a:lstStyle/>
-          <a:p>
-            <a:pPr algn="ctr"/>
-            <a:r>
-              <a:rPr lang="en-GB" sz="900" dirty="0" smtClean="0">
-                <a:solidFill>
-                  <a:schemeClr val="tx1"/>
-                </a:solidFill>
-              </a:rPr>
-              <a:t>Vocabulary author designs vocabulary </a:t>
-            </a:r>
-            <a:endParaRPr lang="en-GB" sz="900" dirty="0">
-              <a:solidFill>
-                <a:schemeClr val="tx1"/>
-              </a:solidFill>
-            </a:endParaRPr>
-          </a:p>
-        </p:txBody>
-      </p:sp>
-      <p:sp>
-        <p:nvSpPr>
-          <p:cNvPr id="5" name="Rectangle 4"/>
-          <p:cNvSpPr/>
-          <p:nvPr/>
-        </p:nvSpPr>
-        <p:spPr>
-          <a:xfrm>
-            <a:off x="3923928" y="2132856"/>
-            <a:ext cx="1080000" cy="360000"/>
-          </a:xfrm>
-          <a:prstGeom prst="rect">
-            <a:avLst/>
-          </a:prstGeom>
-          <a:solidFill>
-            <a:schemeClr val="accent1">
-              <a:lumMod val="20000"/>
-              <a:lumOff val="80000"/>
-            </a:schemeClr>
-          </a:solidFill>
-          <a:ln w="9525">
-            <a:solidFill>
-              <a:schemeClr val="tx1"/>
-            </a:solidFill>
-          </a:ln>
-        </p:spPr>
-        <p:style>
-          <a:lnRef idx="2">
-            <a:schemeClr val="accent1">
-              <a:shade val="50000"/>
-            </a:schemeClr>
-          </a:lnRef>
-          <a:fillRef idx="1">
-            <a:schemeClr val="accent1"/>
-          </a:fillRef>
-          <a:effectRef idx="0">
-            <a:schemeClr val="accent1"/>
-          </a:effectRef>
-          <a:fontRef idx="minor">
-            <a:schemeClr val="lt1"/>
-          </a:fontRef>
-        </p:style>
-        <p:txBody>
-          <a:bodyPr rtlCol="0" anchor="ctr"/>
-          <a:lstStyle/>
-          <a:p>
-            <a:pPr algn="ctr"/>
-            <a:r>
-              <a:rPr lang="en-GB" sz="900" dirty="0" smtClean="0">
-                <a:solidFill>
-                  <a:schemeClr val="tx1"/>
-                </a:solidFill>
-              </a:rPr>
-              <a:t>Author suggests a vocabulary</a:t>
-            </a:r>
-            <a:endParaRPr lang="en-GB" sz="900" dirty="0">
-              <a:solidFill>
-                <a:schemeClr val="tx1"/>
-              </a:solidFill>
-            </a:endParaRPr>
-          </a:p>
-        </p:txBody>
-      </p:sp>
-      <p:sp>
-        <p:nvSpPr>
-          <p:cNvPr id="7" name="Rectangle 6"/>
-          <p:cNvSpPr/>
-          <p:nvPr/>
-        </p:nvSpPr>
-        <p:spPr>
-          <a:xfrm>
-            <a:off x="2627784" y="2708920"/>
-            <a:ext cx="1080000" cy="540000"/>
-          </a:xfrm>
-          <a:prstGeom prst="rect">
-            <a:avLst/>
-          </a:prstGeom>
-          <a:solidFill>
-            <a:schemeClr val="accent1">
-              <a:lumMod val="20000"/>
-              <a:lumOff val="80000"/>
-            </a:schemeClr>
-          </a:solidFill>
-          <a:ln w="9525">
-            <a:solidFill>
-              <a:schemeClr val="tx1"/>
-            </a:solidFill>
-          </a:ln>
-        </p:spPr>
-        <p:style>
-          <a:lnRef idx="2">
-            <a:schemeClr val="accent1">
-              <a:shade val="50000"/>
-            </a:schemeClr>
-          </a:lnRef>
-          <a:fillRef idx="1">
-            <a:schemeClr val="accent1"/>
-          </a:fillRef>
-          <a:effectRef idx="0">
-            <a:schemeClr val="accent1"/>
-          </a:effectRef>
-          <a:fontRef idx="minor">
-            <a:schemeClr val="lt1"/>
-          </a:fontRef>
-        </p:style>
-        <p:txBody>
-          <a:bodyPr rtlCol="0" anchor="ctr"/>
-          <a:lstStyle/>
-          <a:p>
-            <a:pPr algn="ctr"/>
-            <a:r>
-              <a:rPr lang="en-GB" sz="900" dirty="0" smtClean="0">
-                <a:solidFill>
-                  <a:schemeClr val="tx1"/>
-                </a:solidFill>
-              </a:rPr>
-              <a:t>LOV Robot suggests a vocabulary</a:t>
-            </a:r>
-            <a:endParaRPr lang="en-GB" sz="900" dirty="0">
-              <a:solidFill>
-                <a:schemeClr val="tx1"/>
-              </a:solidFill>
-            </a:endParaRPr>
-          </a:p>
-        </p:txBody>
-      </p:sp>
-      <p:sp>
-        <p:nvSpPr>
-          <p:cNvPr id="8" name="Rectangle 7"/>
-          <p:cNvSpPr/>
-          <p:nvPr/>
-        </p:nvSpPr>
-        <p:spPr>
-          <a:xfrm>
-            <a:off x="3923928" y="2708920"/>
-            <a:ext cx="1080000" cy="540000"/>
-          </a:xfrm>
-          <a:prstGeom prst="rect">
-            <a:avLst/>
-          </a:prstGeom>
-          <a:solidFill>
-            <a:schemeClr val="accent6">
-              <a:lumMod val="40000"/>
-              <a:lumOff val="60000"/>
-            </a:schemeClr>
-          </a:solidFill>
-          <a:ln w="9525">
-            <a:solidFill>
-              <a:schemeClr val="tx1"/>
-            </a:solidFill>
-          </a:ln>
-        </p:spPr>
-        <p:style>
-          <a:lnRef idx="2">
-            <a:schemeClr val="accent1">
-              <a:shade val="50000"/>
-            </a:schemeClr>
-          </a:lnRef>
-          <a:fillRef idx="1">
-            <a:schemeClr val="accent1"/>
-          </a:fillRef>
-          <a:effectRef idx="0">
-            <a:schemeClr val="accent1"/>
-          </a:effectRef>
-          <a:fontRef idx="minor">
-            <a:schemeClr val="lt1"/>
-          </a:fontRef>
-        </p:style>
-        <p:txBody>
-          <a:bodyPr rtlCol="0" anchor="ctr"/>
-          <a:lstStyle/>
-          <a:p>
-            <a:pPr algn="ctr"/>
-            <a:r>
-              <a:rPr lang="en-GB" sz="900" dirty="0" smtClean="0">
-                <a:solidFill>
-                  <a:schemeClr val="tx1"/>
-                </a:solidFill>
-              </a:rPr>
-              <a:t>Curator looks if the vocabulary is a good fit for LOV</a:t>
-            </a:r>
-            <a:endParaRPr lang="en-GB" sz="900" dirty="0">
-              <a:solidFill>
-                <a:schemeClr val="tx1"/>
-              </a:solidFill>
-            </a:endParaRPr>
-          </a:p>
-        </p:txBody>
-      </p:sp>
-      <p:sp>
-        <p:nvSpPr>
-          <p:cNvPr id="9" name="Flowchart: Decision 8"/>
-          <p:cNvSpPr/>
-          <p:nvPr/>
-        </p:nvSpPr>
-        <p:spPr>
-          <a:xfrm>
-            <a:off x="3923928" y="3429000"/>
-            <a:ext cx="1080000" cy="540000"/>
-          </a:xfrm>
-          <a:prstGeom prst="flowChartDecision">
-            <a:avLst/>
-          </a:prstGeom>
-          <a:solidFill>
-            <a:schemeClr val="bg1"/>
-          </a:solidFill>
-          <a:ln w="9525">
-            <a:solidFill>
-              <a:schemeClr val="tx1"/>
-            </a:solidFill>
-          </a:ln>
-        </p:spPr>
-        <p:style>
-          <a:lnRef idx="2">
-            <a:schemeClr val="accent1">
-              <a:shade val="50000"/>
-            </a:schemeClr>
-          </a:lnRef>
-          <a:fillRef idx="1">
-            <a:schemeClr val="accent1"/>
-          </a:fillRef>
-          <a:effectRef idx="0">
-            <a:schemeClr val="accent1"/>
-          </a:effectRef>
-          <a:fontRef idx="minor">
-            <a:schemeClr val="lt1"/>
-          </a:fontRef>
-        </p:style>
-        <p:txBody>
-          <a:bodyPr rtlCol="0" anchor="ctr"/>
-          <a:lstStyle/>
-          <a:p>
-            <a:pPr algn="ctr"/>
-            <a:r>
-              <a:rPr lang="en-GB" sz="800" dirty="0" smtClean="0">
-                <a:solidFill>
-                  <a:schemeClr val="tx1"/>
-                </a:solidFill>
-              </a:rPr>
-              <a:t>Is a good fit?</a:t>
-            </a:r>
-            <a:endParaRPr lang="en-GB" sz="800" dirty="0">
-              <a:solidFill>
-                <a:schemeClr val="tx1"/>
-              </a:solidFill>
-            </a:endParaRPr>
-          </a:p>
-        </p:txBody>
-      </p:sp>
-      <p:sp>
-        <p:nvSpPr>
-          <p:cNvPr id="10" name="Rectangle 9"/>
-          <p:cNvSpPr/>
-          <p:nvPr/>
-        </p:nvSpPr>
-        <p:spPr>
-          <a:xfrm>
-            <a:off x="3923928" y="4149080"/>
-            <a:ext cx="1080000" cy="540000"/>
-          </a:xfrm>
-          <a:prstGeom prst="rect">
-            <a:avLst/>
-          </a:prstGeom>
-          <a:solidFill>
-            <a:schemeClr val="accent6">
-              <a:lumMod val="40000"/>
-              <a:lumOff val="60000"/>
-            </a:schemeClr>
-          </a:solidFill>
-          <a:ln w="9525">
-            <a:solidFill>
-              <a:schemeClr val="tx1"/>
-            </a:solidFill>
-          </a:ln>
-        </p:spPr>
-        <p:style>
-          <a:lnRef idx="2">
-            <a:schemeClr val="accent1">
-              <a:shade val="50000"/>
-            </a:schemeClr>
-          </a:lnRef>
-          <a:fillRef idx="1">
-            <a:schemeClr val="accent1"/>
-          </a:fillRef>
-          <a:effectRef idx="0">
-            <a:schemeClr val="accent1"/>
-          </a:effectRef>
-          <a:fontRef idx="minor">
-            <a:schemeClr val="lt1"/>
-          </a:fontRef>
-        </p:style>
-        <p:txBody>
-          <a:bodyPr rtlCol="0" anchor="ctr"/>
-          <a:lstStyle/>
-          <a:p>
-            <a:pPr algn="ctr"/>
-            <a:r>
-              <a:rPr lang="en-GB" sz="900" dirty="0" smtClean="0">
-                <a:solidFill>
-                  <a:schemeClr val="tx1"/>
-                </a:solidFill>
-              </a:rPr>
-              <a:t>Curator looks if the vocabulary meets LOV quality</a:t>
-            </a:r>
-            <a:endParaRPr lang="en-GB" sz="900" dirty="0">
-              <a:solidFill>
-                <a:schemeClr val="tx1"/>
-              </a:solidFill>
-            </a:endParaRPr>
-          </a:p>
-        </p:txBody>
-      </p:sp>
-      <p:sp>
-        <p:nvSpPr>
-          <p:cNvPr id="11" name="Flowchart: Decision 10"/>
-          <p:cNvSpPr/>
-          <p:nvPr/>
-        </p:nvSpPr>
-        <p:spPr>
-          <a:xfrm>
-            <a:off x="3923928" y="4869160"/>
-            <a:ext cx="1080000" cy="540000"/>
-          </a:xfrm>
-          <a:prstGeom prst="flowChartDecision">
-            <a:avLst/>
-          </a:prstGeom>
-          <a:solidFill>
-            <a:schemeClr val="bg1"/>
-          </a:solidFill>
-          <a:ln w="9525">
-            <a:solidFill>
-              <a:schemeClr val="tx1"/>
-            </a:solidFill>
-          </a:ln>
-        </p:spPr>
-        <p:style>
-          <a:lnRef idx="2">
-            <a:schemeClr val="accent1">
-              <a:shade val="50000"/>
-            </a:schemeClr>
-          </a:lnRef>
-          <a:fillRef idx="1">
-            <a:schemeClr val="accent1"/>
-          </a:fillRef>
-          <a:effectRef idx="0">
-            <a:schemeClr val="accent1"/>
-          </a:effectRef>
-          <a:fontRef idx="minor">
-            <a:schemeClr val="lt1"/>
-          </a:fontRef>
-        </p:style>
-        <p:txBody>
-          <a:bodyPr rtlCol="0" anchor="ctr"/>
-          <a:lstStyle/>
-          <a:p>
-            <a:pPr algn="ctr"/>
-            <a:r>
-              <a:rPr lang="en-GB" sz="800" dirty="0">
-                <a:solidFill>
-                  <a:schemeClr val="tx1"/>
-                </a:solidFill>
-              </a:rPr>
-              <a:t>Does meet quality?</a:t>
-            </a:r>
-          </a:p>
-        </p:txBody>
-      </p:sp>
-      <p:sp>
-        <p:nvSpPr>
-          <p:cNvPr id="12" name="Flowchart: Punched Tape 11"/>
-          <p:cNvSpPr/>
-          <p:nvPr/>
-        </p:nvSpPr>
-        <p:spPr>
-          <a:xfrm>
-            <a:off x="5148064" y="3340950"/>
-            <a:ext cx="864096" cy="720000"/>
-          </a:xfrm>
-          <a:prstGeom prst="flowChartPunchedTape">
-            <a:avLst/>
-          </a:prstGeom>
-          <a:solidFill>
-            <a:schemeClr val="accent6">
-              <a:lumMod val="40000"/>
-              <a:lumOff val="60000"/>
-            </a:schemeClr>
-          </a:solidFill>
-          <a:ln w="9525">
-            <a:solidFill>
-              <a:schemeClr val="tx1"/>
-            </a:solidFill>
-          </a:ln>
-        </p:spPr>
-        <p:style>
-          <a:lnRef idx="2">
-            <a:schemeClr val="accent1">
-              <a:shade val="50000"/>
-            </a:schemeClr>
-          </a:lnRef>
-          <a:fillRef idx="1">
-            <a:schemeClr val="accent1"/>
-          </a:fillRef>
-          <a:effectRef idx="0">
-            <a:schemeClr val="accent1"/>
-          </a:effectRef>
-          <a:fontRef idx="minor">
-            <a:schemeClr val="lt1"/>
-          </a:fontRef>
-        </p:style>
-        <p:txBody>
-          <a:bodyPr rtlCol="0" anchor="ctr"/>
-          <a:lstStyle/>
-          <a:p>
-            <a:pPr algn="ctr"/>
-            <a:r>
-              <a:rPr lang="en-GB" sz="900" dirty="0" smtClean="0">
-                <a:solidFill>
-                  <a:schemeClr val="tx1"/>
-                </a:solidFill>
-              </a:rPr>
-              <a:t>Curator sends an email to the Author  </a:t>
-            </a:r>
-            <a:endParaRPr lang="en-GB" sz="900" dirty="0">
-              <a:solidFill>
-                <a:schemeClr val="tx1"/>
-              </a:solidFill>
-            </a:endParaRPr>
-          </a:p>
-        </p:txBody>
-      </p:sp>
-      <p:cxnSp>
-        <p:nvCxnSpPr>
-          <p:cNvPr id="14" name="Straight Arrow Connector 13"/>
-          <p:cNvCxnSpPr>
-            <a:stCxn id="9" idx="3"/>
-            <a:endCxn id="12" idx="1"/>
-          </p:cNvCxnSpPr>
-          <p:nvPr/>
-        </p:nvCxnSpPr>
-        <p:spPr>
-          <a:xfrm>
-            <a:off x="5003928" y="3699000"/>
-            <a:ext cx="144136" cy="1950"/>
-          </a:xfrm>
-          <a:prstGeom prst="straightConnector1">
-            <a:avLst/>
-          </a:prstGeom>
-          <a:ln>
-            <a:tailEnd type="triangle"/>
-          </a:ln>
-        </p:spPr>
-        <p:style>
-          <a:lnRef idx="1">
-            <a:schemeClr val="dk1"/>
-          </a:lnRef>
-          <a:fillRef idx="0">
-            <a:schemeClr val="dk1"/>
-          </a:fillRef>
-          <a:effectRef idx="0">
-            <a:schemeClr val="dk1"/>
-          </a:effectRef>
-          <a:fontRef idx="minor">
-            <a:schemeClr val="tx1"/>
-          </a:fontRef>
-        </p:style>
-      </p:cxnSp>
-      <p:cxnSp>
-        <p:nvCxnSpPr>
-          <p:cNvPr id="15" name="Straight Arrow Connector 14"/>
-          <p:cNvCxnSpPr>
-            <a:stCxn id="11" idx="3"/>
-            <a:endCxn id="12" idx="2"/>
-          </p:cNvCxnSpPr>
-          <p:nvPr/>
-        </p:nvCxnSpPr>
-        <p:spPr>
-          <a:xfrm flipV="1">
-            <a:off x="5003928" y="3988950"/>
-            <a:ext cx="576184" cy="1150210"/>
-          </a:xfrm>
-          <a:prstGeom prst="bentConnector2">
-            <a:avLst/>
-          </a:prstGeom>
-          <a:ln>
-            <a:tailEnd type="triangle"/>
-          </a:ln>
-        </p:spPr>
-        <p:style>
-          <a:lnRef idx="1">
-            <a:schemeClr val="dk1"/>
-          </a:lnRef>
-          <a:fillRef idx="0">
-            <a:schemeClr val="dk1"/>
-          </a:fillRef>
-          <a:effectRef idx="0">
-            <a:schemeClr val="dk1"/>
-          </a:effectRef>
-          <a:fontRef idx="minor">
-            <a:schemeClr val="tx1"/>
-          </a:fontRef>
-        </p:style>
-      </p:cxnSp>
-      <p:cxnSp>
-        <p:nvCxnSpPr>
-          <p:cNvPr id="18" name="Straight Arrow Connector 14"/>
-          <p:cNvCxnSpPr>
-            <a:stCxn id="12" idx="0"/>
-            <a:endCxn id="4" idx="3"/>
-          </p:cNvCxnSpPr>
-          <p:nvPr/>
-        </p:nvCxnSpPr>
-        <p:spPr>
-          <a:xfrm rot="16200000" flipV="1">
-            <a:off x="4453941" y="2286779"/>
-            <a:ext cx="1676158" cy="576184"/>
-          </a:xfrm>
-          <a:prstGeom prst="bentConnector2">
-            <a:avLst/>
-          </a:prstGeom>
-          <a:ln>
-            <a:tailEnd type="triangle"/>
-          </a:ln>
-        </p:spPr>
-        <p:style>
-          <a:lnRef idx="1">
-            <a:schemeClr val="dk1"/>
-          </a:lnRef>
-          <a:fillRef idx="0">
-            <a:schemeClr val="dk1"/>
-          </a:fillRef>
-          <a:effectRef idx="0">
-            <a:schemeClr val="dk1"/>
-          </a:effectRef>
-          <a:fontRef idx="minor">
-            <a:schemeClr val="tx1"/>
-          </a:fontRef>
-        </p:style>
-      </p:cxnSp>
-      <p:cxnSp>
-        <p:nvCxnSpPr>
-          <p:cNvPr id="21" name="Straight Arrow Connector 20"/>
-          <p:cNvCxnSpPr>
-            <a:stCxn id="4" idx="2"/>
-            <a:endCxn id="5" idx="0"/>
-          </p:cNvCxnSpPr>
-          <p:nvPr/>
-        </p:nvCxnSpPr>
-        <p:spPr>
-          <a:xfrm>
-            <a:off x="4463928" y="1916792"/>
-            <a:ext cx="0" cy="216064"/>
-          </a:xfrm>
-          <a:prstGeom prst="straightConnector1">
-            <a:avLst/>
-          </a:prstGeom>
-          <a:ln>
-            <a:tailEnd type="triangle"/>
-          </a:ln>
-        </p:spPr>
-        <p:style>
-          <a:lnRef idx="1">
-            <a:schemeClr val="dk1"/>
-          </a:lnRef>
-          <a:fillRef idx="0">
-            <a:schemeClr val="dk1"/>
-          </a:fillRef>
-          <a:effectRef idx="0">
-            <a:schemeClr val="dk1"/>
-          </a:effectRef>
-          <a:fontRef idx="minor">
-            <a:schemeClr val="tx1"/>
-          </a:fontRef>
-        </p:style>
-      </p:cxnSp>
-      <p:cxnSp>
-        <p:nvCxnSpPr>
-          <p:cNvPr id="24" name="Straight Arrow Connector 23"/>
-          <p:cNvCxnSpPr>
-            <a:stCxn id="5" idx="2"/>
-            <a:endCxn id="8" idx="0"/>
-          </p:cNvCxnSpPr>
-          <p:nvPr/>
-        </p:nvCxnSpPr>
-        <p:spPr>
-          <a:xfrm>
-            <a:off x="4463928" y="2492856"/>
-            <a:ext cx="0" cy="216064"/>
-          </a:xfrm>
-          <a:prstGeom prst="straightConnector1">
-            <a:avLst/>
-          </a:prstGeom>
-          <a:ln>
-            <a:tailEnd type="triangle"/>
-          </a:ln>
-        </p:spPr>
-        <p:style>
-          <a:lnRef idx="1">
-            <a:schemeClr val="dk1"/>
-          </a:lnRef>
-          <a:fillRef idx="0">
-            <a:schemeClr val="dk1"/>
-          </a:fillRef>
-          <a:effectRef idx="0">
-            <a:schemeClr val="dk1"/>
-          </a:effectRef>
-          <a:fontRef idx="minor">
-            <a:schemeClr val="tx1"/>
-          </a:fontRef>
-        </p:style>
-      </p:cxnSp>
-      <p:cxnSp>
-        <p:nvCxnSpPr>
-          <p:cNvPr id="27" name="Straight Arrow Connector 26"/>
-          <p:cNvCxnSpPr>
-            <a:stCxn id="8" idx="2"/>
-            <a:endCxn id="9" idx="0"/>
-          </p:cNvCxnSpPr>
-          <p:nvPr/>
-        </p:nvCxnSpPr>
-        <p:spPr>
-          <a:xfrm>
-            <a:off x="4463928" y="3248920"/>
-            <a:ext cx="0" cy="180080"/>
-          </a:xfrm>
-          <a:prstGeom prst="straightConnector1">
-            <a:avLst/>
-          </a:prstGeom>
-          <a:ln>
-            <a:tailEnd type="triangle"/>
-          </a:ln>
-        </p:spPr>
-        <p:style>
-          <a:lnRef idx="1">
-            <a:schemeClr val="dk1"/>
-          </a:lnRef>
-          <a:fillRef idx="0">
-            <a:schemeClr val="dk1"/>
-          </a:fillRef>
-          <a:effectRef idx="0">
-            <a:schemeClr val="dk1"/>
-          </a:effectRef>
-          <a:fontRef idx="minor">
-            <a:schemeClr val="tx1"/>
-          </a:fontRef>
-        </p:style>
-      </p:cxnSp>
-      <p:cxnSp>
-        <p:nvCxnSpPr>
-          <p:cNvPr id="30" name="Straight Arrow Connector 29"/>
-          <p:cNvCxnSpPr>
-            <a:stCxn id="9" idx="2"/>
-            <a:endCxn id="10" idx="0"/>
-          </p:cNvCxnSpPr>
-          <p:nvPr/>
-        </p:nvCxnSpPr>
-        <p:spPr>
-          <a:xfrm>
-            <a:off x="4463928" y="3969000"/>
-            <a:ext cx="0" cy="180080"/>
-          </a:xfrm>
-          <a:prstGeom prst="straightConnector1">
-            <a:avLst/>
-          </a:prstGeom>
-          <a:ln>
-            <a:tailEnd type="triangle"/>
-          </a:ln>
-        </p:spPr>
-        <p:style>
-          <a:lnRef idx="1">
-            <a:schemeClr val="dk1"/>
-          </a:lnRef>
-          <a:fillRef idx="0">
-            <a:schemeClr val="dk1"/>
-          </a:fillRef>
-          <a:effectRef idx="0">
-            <a:schemeClr val="dk1"/>
-          </a:effectRef>
-          <a:fontRef idx="minor">
-            <a:schemeClr val="tx1"/>
-          </a:fontRef>
-        </p:style>
-      </p:cxnSp>
-      <p:cxnSp>
-        <p:nvCxnSpPr>
-          <p:cNvPr id="33" name="Straight Arrow Connector 32"/>
-          <p:cNvCxnSpPr>
-            <a:stCxn id="10" idx="2"/>
-            <a:endCxn id="11" idx="0"/>
-          </p:cNvCxnSpPr>
-          <p:nvPr/>
-        </p:nvCxnSpPr>
-        <p:spPr>
-          <a:xfrm>
-            <a:off x="4463928" y="4689080"/>
-            <a:ext cx="0" cy="180080"/>
-          </a:xfrm>
-          <a:prstGeom prst="straightConnector1">
-            <a:avLst/>
-          </a:prstGeom>
-          <a:ln>
-            <a:tailEnd type="triangle"/>
-          </a:ln>
-        </p:spPr>
-        <p:style>
-          <a:lnRef idx="1">
-            <a:schemeClr val="dk1"/>
-          </a:lnRef>
-          <a:fillRef idx="0">
-            <a:schemeClr val="dk1"/>
-          </a:fillRef>
-          <a:effectRef idx="0">
-            <a:schemeClr val="dk1"/>
-          </a:effectRef>
-          <a:fontRef idx="minor">
-            <a:schemeClr val="tx1"/>
-          </a:fontRef>
-        </p:style>
-      </p:cxnSp>
-      <p:cxnSp>
-        <p:nvCxnSpPr>
-          <p:cNvPr id="36" name="Straight Arrow Connector 35"/>
-          <p:cNvCxnSpPr>
-            <a:stCxn id="7" idx="3"/>
-            <a:endCxn id="8" idx="1"/>
-          </p:cNvCxnSpPr>
-          <p:nvPr/>
-        </p:nvCxnSpPr>
-        <p:spPr>
-          <a:xfrm>
-            <a:off x="3707784" y="2978920"/>
-            <a:ext cx="216144" cy="0"/>
-          </a:xfrm>
-          <a:prstGeom prst="straightConnector1">
-            <a:avLst/>
-          </a:prstGeom>
-          <a:ln>
-            <a:tailEnd type="triangle"/>
-          </a:ln>
-        </p:spPr>
-        <p:style>
-          <a:lnRef idx="1">
-            <a:schemeClr val="dk1"/>
-          </a:lnRef>
-          <a:fillRef idx="0">
-            <a:schemeClr val="dk1"/>
-          </a:fillRef>
-          <a:effectRef idx="0">
-            <a:schemeClr val="dk1"/>
-          </a:effectRef>
-          <a:fontRef idx="minor">
-            <a:schemeClr val="tx1"/>
-          </a:fontRef>
-        </p:style>
-      </p:cxnSp>
-      <p:sp>
-        <p:nvSpPr>
-          <p:cNvPr id="45" name="TextBox 44"/>
-          <p:cNvSpPr txBox="1"/>
-          <p:nvPr/>
-        </p:nvSpPr>
-        <p:spPr>
-          <a:xfrm>
-            <a:off x="4918589" y="3518210"/>
-            <a:ext cx="320922" cy="215444"/>
-          </a:xfrm>
-          <a:prstGeom prst="rect">
-            <a:avLst/>
-          </a:prstGeom>
-          <a:noFill/>
-        </p:spPr>
-        <p:txBody>
-          <a:bodyPr wrap="none" rtlCol="0">
-            <a:spAutoFit/>
-          </a:bodyPr>
-          <a:lstStyle/>
-          <a:p>
-            <a:r>
-              <a:rPr lang="en-GB" sz="800" b="1" dirty="0" smtClean="0">
-                <a:solidFill>
-                  <a:srgbClr val="FF0000"/>
-                </a:solidFill>
-              </a:rPr>
-              <a:t>NO</a:t>
-            </a:r>
-            <a:endParaRPr lang="en-GB" sz="800" b="1" dirty="0">
-              <a:solidFill>
-                <a:srgbClr val="FF0000"/>
-              </a:solidFill>
-            </a:endParaRPr>
-          </a:p>
-        </p:txBody>
-      </p:sp>
-      <p:sp>
-        <p:nvSpPr>
-          <p:cNvPr id="46" name="TextBox 45"/>
-          <p:cNvSpPr txBox="1"/>
-          <p:nvPr/>
-        </p:nvSpPr>
-        <p:spPr>
-          <a:xfrm>
-            <a:off x="4918589" y="4950994"/>
-            <a:ext cx="320922" cy="215444"/>
-          </a:xfrm>
-          <a:prstGeom prst="rect">
-            <a:avLst/>
-          </a:prstGeom>
-          <a:noFill/>
-        </p:spPr>
-        <p:txBody>
-          <a:bodyPr wrap="none" rtlCol="0">
-            <a:spAutoFit/>
-          </a:bodyPr>
-          <a:lstStyle/>
-          <a:p>
-            <a:r>
-              <a:rPr lang="en-GB" sz="800" b="1" dirty="0" smtClean="0">
-                <a:solidFill>
-                  <a:srgbClr val="FF0000"/>
-                </a:solidFill>
-              </a:rPr>
-              <a:t>NO</a:t>
-            </a:r>
-            <a:endParaRPr lang="en-GB" sz="800" b="1" dirty="0">
-              <a:solidFill>
-                <a:srgbClr val="FF0000"/>
-              </a:solidFill>
-            </a:endParaRPr>
-          </a:p>
-        </p:txBody>
-      </p:sp>
-      <p:sp>
-        <p:nvSpPr>
-          <p:cNvPr id="47" name="TextBox 46"/>
-          <p:cNvSpPr txBox="1"/>
-          <p:nvPr/>
-        </p:nvSpPr>
-        <p:spPr>
-          <a:xfrm>
-            <a:off x="4446757" y="3928321"/>
-            <a:ext cx="335348" cy="215444"/>
-          </a:xfrm>
-          <a:prstGeom prst="rect">
-            <a:avLst/>
-          </a:prstGeom>
-          <a:noFill/>
-        </p:spPr>
-        <p:txBody>
-          <a:bodyPr wrap="none" rtlCol="0">
-            <a:spAutoFit/>
-          </a:bodyPr>
-          <a:lstStyle/>
-          <a:p>
-            <a:r>
-              <a:rPr lang="en-GB" sz="800" b="1" dirty="0" smtClean="0">
-                <a:solidFill>
-                  <a:srgbClr val="FF0000"/>
-                </a:solidFill>
-              </a:rPr>
-              <a:t>YES</a:t>
-            </a:r>
-            <a:endParaRPr lang="en-GB" sz="800" b="1" dirty="0">
-              <a:solidFill>
-                <a:srgbClr val="FF0000"/>
-              </a:solidFill>
-            </a:endParaRPr>
-          </a:p>
-        </p:txBody>
-      </p:sp>
-      <p:sp>
-        <p:nvSpPr>
-          <p:cNvPr id="48" name="TextBox 47"/>
-          <p:cNvSpPr txBox="1"/>
-          <p:nvPr/>
-        </p:nvSpPr>
-        <p:spPr>
-          <a:xfrm>
-            <a:off x="4446757" y="5385097"/>
-            <a:ext cx="335348" cy="215444"/>
-          </a:xfrm>
-          <a:prstGeom prst="rect">
-            <a:avLst/>
-          </a:prstGeom>
-          <a:noFill/>
-        </p:spPr>
-        <p:txBody>
-          <a:bodyPr wrap="none" rtlCol="0">
-            <a:spAutoFit/>
-          </a:bodyPr>
-          <a:lstStyle/>
-          <a:p>
-            <a:r>
-              <a:rPr lang="en-GB" sz="800" b="1" dirty="0" smtClean="0">
-                <a:solidFill>
-                  <a:srgbClr val="FF0000"/>
-                </a:solidFill>
-              </a:rPr>
-              <a:t>YES</a:t>
-            </a:r>
-            <a:endParaRPr lang="en-GB" sz="800" b="1" dirty="0">
-              <a:solidFill>
-                <a:srgbClr val="FF0000"/>
-              </a:solidFill>
-            </a:endParaRPr>
-          </a:p>
-        </p:txBody>
-      </p:sp>
-      <p:sp>
-        <p:nvSpPr>
-          <p:cNvPr id="49" name="Rectangle 48"/>
-          <p:cNvSpPr/>
-          <p:nvPr/>
-        </p:nvSpPr>
-        <p:spPr>
-          <a:xfrm>
-            <a:off x="3923928" y="5679160"/>
-            <a:ext cx="1080000" cy="360000"/>
-          </a:xfrm>
-          <a:prstGeom prst="rect">
-            <a:avLst/>
-          </a:prstGeom>
-          <a:solidFill>
-            <a:schemeClr val="accent6">
-              <a:lumMod val="40000"/>
-              <a:lumOff val="60000"/>
-            </a:schemeClr>
-          </a:solidFill>
-          <a:ln w="9525">
-            <a:solidFill>
-              <a:schemeClr val="tx1"/>
-            </a:solidFill>
-          </a:ln>
-        </p:spPr>
-        <p:style>
-          <a:lnRef idx="2">
-            <a:schemeClr val="accent1">
-              <a:shade val="50000"/>
-            </a:schemeClr>
-          </a:lnRef>
-          <a:fillRef idx="1">
-            <a:schemeClr val="accent1"/>
-          </a:fillRef>
-          <a:effectRef idx="0">
-            <a:schemeClr val="accent1"/>
-          </a:effectRef>
-          <a:fontRef idx="minor">
-            <a:schemeClr val="lt1"/>
-          </a:fontRef>
-        </p:style>
-        <p:txBody>
-          <a:bodyPr rtlCol="0" anchor="ctr"/>
-          <a:lstStyle/>
-          <a:p>
-            <a:pPr algn="ctr"/>
-            <a:r>
-              <a:rPr lang="en-GB" sz="900" dirty="0" smtClean="0">
-                <a:solidFill>
-                  <a:schemeClr val="tx1"/>
-                </a:solidFill>
-              </a:rPr>
-              <a:t>Curator inserts the vocabulary in LOV</a:t>
-            </a:r>
-            <a:endParaRPr lang="en-GB" sz="900" dirty="0">
-              <a:solidFill>
-                <a:schemeClr val="tx1"/>
-              </a:solidFill>
-            </a:endParaRPr>
-          </a:p>
-        </p:txBody>
-      </p:sp>
-      <p:cxnSp>
-        <p:nvCxnSpPr>
-          <p:cNvPr id="50" name="Straight Arrow Connector 49"/>
-          <p:cNvCxnSpPr>
-            <a:stCxn id="11" idx="2"/>
-            <a:endCxn id="49" idx="0"/>
-          </p:cNvCxnSpPr>
-          <p:nvPr/>
-        </p:nvCxnSpPr>
-        <p:spPr>
-          <a:xfrm>
-            <a:off x="4463928" y="5409160"/>
-            <a:ext cx="0" cy="270000"/>
-          </a:xfrm>
-          <a:prstGeom prst="straightConnector1">
-            <a:avLst/>
-          </a:prstGeom>
-          <a:ln>
-            <a:tailEnd type="triangle"/>
-          </a:ln>
-        </p:spPr>
-        <p:style>
-          <a:lnRef idx="1">
-            <a:schemeClr val="dk1"/>
-          </a:lnRef>
-          <a:fillRef idx="0">
-            <a:schemeClr val="dk1"/>
-          </a:fillRef>
-          <a:effectRef idx="0">
-            <a:schemeClr val="dk1"/>
-          </a:effectRef>
-          <a:fontRef idx="minor">
-            <a:schemeClr val="tx1"/>
-          </a:fontRef>
-        </p:style>
-      </p:cxnSp>
-      <p:sp>
-        <p:nvSpPr>
-          <p:cNvPr id="53" name="Rectangle 52"/>
-          <p:cNvSpPr/>
-          <p:nvPr/>
-        </p:nvSpPr>
-        <p:spPr>
-          <a:xfrm>
-            <a:off x="2627904" y="3518210"/>
-            <a:ext cx="1080000" cy="648000"/>
-          </a:xfrm>
-          <a:prstGeom prst="rect">
-            <a:avLst/>
-          </a:prstGeom>
-          <a:solidFill>
-            <a:schemeClr val="accent1">
-              <a:lumMod val="20000"/>
-              <a:lumOff val="80000"/>
-            </a:schemeClr>
-          </a:solidFill>
-          <a:ln w="9525">
-            <a:solidFill>
-              <a:schemeClr val="tx1"/>
-            </a:solidFill>
-          </a:ln>
-        </p:spPr>
-        <p:style>
-          <a:lnRef idx="2">
-            <a:schemeClr val="accent1">
-              <a:shade val="50000"/>
-            </a:schemeClr>
-          </a:lnRef>
-          <a:fillRef idx="1">
-            <a:schemeClr val="accent1"/>
-          </a:fillRef>
-          <a:effectRef idx="0">
-            <a:schemeClr val="accent1"/>
-          </a:effectRef>
-          <a:fontRef idx="minor">
-            <a:schemeClr val="lt1"/>
-          </a:fontRef>
-        </p:style>
-        <p:txBody>
-          <a:bodyPr rtlCol="0" anchor="ctr"/>
-          <a:lstStyle/>
-          <a:p>
-            <a:pPr algn="ctr"/>
-            <a:r>
-              <a:rPr lang="en-GB" sz="900" dirty="0" smtClean="0">
-                <a:solidFill>
-                  <a:schemeClr val="tx1"/>
-                </a:solidFill>
-              </a:rPr>
-              <a:t>LOV Robot detects any reference to new vocabs in LOV ones</a:t>
-            </a:r>
-            <a:endParaRPr lang="en-GB" sz="900" dirty="0">
-              <a:solidFill>
-                <a:schemeClr val="tx1"/>
-              </a:solidFill>
-            </a:endParaRPr>
-          </a:p>
-        </p:txBody>
-      </p:sp>
-      <p:cxnSp>
-        <p:nvCxnSpPr>
-          <p:cNvPr id="54" name="Straight Arrow Connector 53"/>
-          <p:cNvCxnSpPr>
-            <a:stCxn id="53" idx="0"/>
-            <a:endCxn id="7" idx="2"/>
-          </p:cNvCxnSpPr>
-          <p:nvPr/>
-        </p:nvCxnSpPr>
-        <p:spPr>
-          <a:xfrm flipH="1" flipV="1">
-            <a:off x="3167784" y="3248920"/>
-            <a:ext cx="120" cy="269290"/>
-          </a:xfrm>
-          <a:prstGeom prst="straightConnector1">
-            <a:avLst/>
-          </a:prstGeom>
-          <a:ln>
-            <a:tailEnd type="triangle"/>
-          </a:ln>
-        </p:spPr>
-        <p:style>
-          <a:lnRef idx="1">
-            <a:schemeClr val="dk1"/>
-          </a:lnRef>
-          <a:fillRef idx="0">
-            <a:schemeClr val="dk1"/>
-          </a:fillRef>
-          <a:effectRef idx="0">
-            <a:schemeClr val="dk1"/>
-          </a:effectRef>
-          <a:fontRef idx="minor">
-            <a:schemeClr val="tx1"/>
-          </a:fontRef>
-        </p:style>
-      </p:cxnSp>
-      <p:sp>
-        <p:nvSpPr>
-          <p:cNvPr id="57" name="Cylindre 91"/>
-          <p:cNvSpPr/>
-          <p:nvPr/>
-        </p:nvSpPr>
-        <p:spPr>
-          <a:xfrm>
-            <a:off x="2771740" y="4789911"/>
-            <a:ext cx="792088" cy="571504"/>
-          </a:xfrm>
-          <a:prstGeom prst="can">
-            <a:avLst/>
-          </a:prstGeom>
-        </p:spPr>
-        <p:style>
-          <a:lnRef idx="1">
-            <a:schemeClr val="accent5"/>
-          </a:lnRef>
-          <a:fillRef idx="2">
-            <a:schemeClr val="accent5"/>
-          </a:fillRef>
-          <a:effectRef idx="1">
-            <a:schemeClr val="accent5"/>
-          </a:effectRef>
-          <a:fontRef idx="minor">
-            <a:schemeClr val="dk1"/>
-          </a:fontRef>
-        </p:style>
-        <p:txBody>
-          <a:bodyPr rtlCol="0" anchor="t"/>
-          <a:lstStyle/>
-          <a:p>
-            <a:pPr algn="ctr"/>
-            <a:r>
-              <a:rPr lang="fr-FR" sz="1100" b="1" dirty="0" smtClean="0"/>
-              <a:t>LOV Catalogue</a:t>
-            </a:r>
-          </a:p>
-        </p:txBody>
-      </p:sp>
-      <p:cxnSp>
-        <p:nvCxnSpPr>
-          <p:cNvPr id="58" name="Straight Arrow Connector 57"/>
-          <p:cNvCxnSpPr>
-            <a:stCxn id="49" idx="1"/>
-            <a:endCxn id="57" idx="3"/>
-          </p:cNvCxnSpPr>
-          <p:nvPr/>
-        </p:nvCxnSpPr>
-        <p:spPr>
-          <a:xfrm rot="10800000">
-            <a:off x="3167784" y="5361416"/>
-            <a:ext cx="756144" cy="497745"/>
-          </a:xfrm>
-          <a:prstGeom prst="bentConnector2">
-            <a:avLst/>
-          </a:prstGeom>
-          <a:ln>
-            <a:tailEnd type="triangle"/>
-          </a:ln>
-        </p:spPr>
-        <p:style>
-          <a:lnRef idx="1">
-            <a:schemeClr val="dk1"/>
-          </a:lnRef>
-          <a:fillRef idx="0">
-            <a:schemeClr val="dk1"/>
-          </a:fillRef>
-          <a:effectRef idx="0">
-            <a:schemeClr val="dk1"/>
-          </a:effectRef>
-          <a:fontRef idx="minor">
-            <a:schemeClr val="tx1"/>
-          </a:fontRef>
-        </p:style>
-      </p:cxnSp>
-      <p:cxnSp>
-        <p:nvCxnSpPr>
-          <p:cNvPr id="61" name="Straight Arrow Connector 60"/>
-          <p:cNvCxnSpPr>
-            <a:stCxn id="57" idx="1"/>
-            <a:endCxn id="53" idx="2"/>
-          </p:cNvCxnSpPr>
-          <p:nvPr/>
-        </p:nvCxnSpPr>
-        <p:spPr>
-          <a:xfrm flipV="1">
-            <a:off x="3167784" y="4166210"/>
-            <a:ext cx="120" cy="623701"/>
-          </a:xfrm>
-          <a:prstGeom prst="straightConnector1">
-            <a:avLst/>
-          </a:prstGeom>
-          <a:ln>
-            <a:tailEnd type="triangle"/>
-          </a:ln>
-        </p:spPr>
-        <p:style>
-          <a:lnRef idx="1">
-            <a:schemeClr val="dk1"/>
-          </a:lnRef>
-          <a:fillRef idx="0">
-            <a:schemeClr val="dk1"/>
-          </a:fillRef>
-          <a:effectRef idx="0">
-            <a:schemeClr val="dk1"/>
-          </a:effectRef>
-          <a:fontRef idx="minor">
-            <a:schemeClr val="tx1"/>
-          </a:fontRef>
-        </p:style>
-      </p:cxnSp>
-      <p:cxnSp>
-        <p:nvCxnSpPr>
-          <p:cNvPr id="64" name="Straight Arrow Connector 14"/>
-          <p:cNvCxnSpPr>
-            <a:stCxn id="49" idx="3"/>
-            <a:endCxn id="12" idx="2"/>
-          </p:cNvCxnSpPr>
-          <p:nvPr/>
-        </p:nvCxnSpPr>
-        <p:spPr>
-          <a:xfrm flipV="1">
-            <a:off x="5003928" y="3988950"/>
-            <a:ext cx="576184" cy="1870210"/>
-          </a:xfrm>
-          <a:prstGeom prst="bentConnector2">
-            <a:avLst/>
-          </a:prstGeom>
-          <a:ln>
-            <a:tailEnd type="triangle"/>
-          </a:ln>
-        </p:spPr>
-        <p:style>
-          <a:lnRef idx="1">
-            <a:schemeClr val="dk1"/>
-          </a:lnRef>
-          <a:fillRef idx="0">
-            <a:schemeClr val="dk1"/>
-          </a:fillRef>
-          <a:effectRef idx="0">
-            <a:schemeClr val="dk1"/>
-          </a:effectRef>
-          <a:fontRef idx="minor">
-            <a:schemeClr val="tx1"/>
-          </a:fontRef>
-        </p:style>
-      </p:cxnSp>
-    </p:spTree>
-    <p:extLst>
-      <p:ext uri="{BB962C8B-B14F-4D97-AF65-F5344CB8AC3E}">
-        <p14:creationId xmlns:p14="http://schemas.microsoft.com/office/powerpoint/2010/main" val="919241748"/>
-      </p:ext>
-    </p:extLst>
-  </p:cSld>
-  <p:clrMapOvr>
-    <a:masterClrMapping/>
-  </p:clrMapOvr>
-</p:sld>
-</file>
-
-<file path=ppt/slides/slide6.xml><?xml version="1.0" encoding="utf-8"?>
-<p:sld xmlns:a="http://schemas.openxmlformats.org/drawingml/2006/main" xmlns:r="http://schemas.openxmlformats.org/officeDocument/2006/relationships" xmlns:p="http://schemas.openxmlformats.org/presentationml/2006/main">
-  <p:cSld>
-    <p:spTree>
-      <p:nvGrpSpPr>
-        <p:cNvPr id="1" name=""/>
-        <p:cNvGrpSpPr/>
-        <p:nvPr/>
-      </p:nvGrpSpPr>
-      <p:grpSpPr>
-        <a:xfrm>
-          <a:off x="0" y="0"/>
-          <a:ext cx="0" cy="0"/>
-          <a:chOff x="0" y="0"/>
-          <a:chExt cx="0" cy="0"/>
-        </a:xfrm>
-      </p:grpSpPr>
-      <p:sp>
-        <p:nvSpPr>
-          <p:cNvPr id="2" name="Title 1"/>
-          <p:cNvSpPr>
-            <a:spLocks noGrp="1"/>
-          </p:cNvSpPr>
-          <p:nvPr>
-            <p:ph type="title"/>
-          </p:nvPr>
-        </p:nvSpPr>
-        <p:spPr/>
-        <p:txBody>
-          <a:bodyPr/>
-          <a:lstStyle/>
-          <a:p>
-            <a:r>
-              <a:rPr lang="en-GB" dirty="0" smtClean="0"/>
-              <a:t>Curation Workflow 2 - Reviews</a:t>
-            </a:r>
-            <a:endParaRPr lang="en-GB" dirty="0"/>
-          </a:p>
-        </p:txBody>
-      </p:sp>
-      <p:sp>
-        <p:nvSpPr>
-          <p:cNvPr id="8" name="Rectangle 7"/>
-          <p:cNvSpPr/>
-          <p:nvPr/>
-        </p:nvSpPr>
-        <p:spPr>
-          <a:xfrm>
-            <a:off x="2699792" y="3335507"/>
-            <a:ext cx="1080000" cy="540000"/>
-          </a:xfrm>
-          <a:prstGeom prst="rect">
-            <a:avLst/>
-          </a:prstGeom>
-          <a:solidFill>
-            <a:schemeClr val="accent6">
-              <a:lumMod val="40000"/>
-              <a:lumOff val="60000"/>
-            </a:schemeClr>
-          </a:solidFill>
-          <a:ln w="9525">
-            <a:solidFill>
-              <a:schemeClr val="tx1"/>
-            </a:solidFill>
-          </a:ln>
-        </p:spPr>
-        <p:style>
-          <a:lnRef idx="2">
-            <a:schemeClr val="accent1">
-              <a:shade val="50000"/>
-            </a:schemeClr>
-          </a:lnRef>
-          <a:fillRef idx="1">
-            <a:schemeClr val="accent1"/>
-          </a:fillRef>
-          <a:effectRef idx="0">
-            <a:schemeClr val="accent1"/>
-          </a:effectRef>
-          <a:fontRef idx="minor">
-            <a:schemeClr val="lt1"/>
-          </a:fontRef>
-        </p:style>
-        <p:txBody>
-          <a:bodyPr rtlCol="0" anchor="ctr"/>
-          <a:lstStyle/>
-          <a:p>
-            <a:pPr algn="ctr"/>
-            <a:r>
-              <a:rPr lang="en-GB" sz="900" dirty="0" smtClean="0">
-                <a:solidFill>
-                  <a:schemeClr val="tx1"/>
-                </a:solidFill>
-              </a:rPr>
-              <a:t>Curator updates vocabulary review and metadata if needed</a:t>
-            </a:r>
-            <a:endParaRPr lang="en-GB" sz="900" dirty="0">
-              <a:solidFill>
-                <a:schemeClr val="tx1"/>
-              </a:solidFill>
-            </a:endParaRPr>
-          </a:p>
-        </p:txBody>
-      </p:sp>
-      <p:sp>
-        <p:nvSpPr>
-          <p:cNvPr id="9" name="Flowchart: Decision 8"/>
-          <p:cNvSpPr/>
-          <p:nvPr/>
-        </p:nvSpPr>
-        <p:spPr>
-          <a:xfrm>
-            <a:off x="1483243" y="1691303"/>
-            <a:ext cx="1080000" cy="540000"/>
-          </a:xfrm>
-          <a:prstGeom prst="flowChartDecision">
-            <a:avLst/>
-          </a:prstGeom>
-          <a:solidFill>
-            <a:schemeClr val="bg1"/>
-          </a:solidFill>
-          <a:ln w="9525">
-            <a:solidFill>
-              <a:schemeClr val="tx1"/>
-            </a:solidFill>
-          </a:ln>
-        </p:spPr>
-        <p:style>
-          <a:lnRef idx="2">
-            <a:schemeClr val="accent1">
-              <a:shade val="50000"/>
-            </a:schemeClr>
-          </a:lnRef>
-          <a:fillRef idx="1">
-            <a:schemeClr val="accent1"/>
-          </a:fillRef>
-          <a:effectRef idx="0">
-            <a:schemeClr val="accent1"/>
-          </a:effectRef>
-          <a:fontRef idx="minor">
-            <a:schemeClr val="lt1"/>
-          </a:fontRef>
-        </p:style>
-        <p:txBody>
-          <a:bodyPr rtlCol="0" anchor="ctr"/>
-          <a:lstStyle/>
-          <a:p>
-            <a:pPr algn="ctr"/>
-            <a:r>
-              <a:rPr lang="en-GB" sz="800" dirty="0" smtClean="0">
-                <a:solidFill>
-                  <a:schemeClr val="tx1"/>
-                </a:solidFill>
-              </a:rPr>
-              <a:t>Is review &gt;11m?</a:t>
-            </a:r>
-            <a:endParaRPr lang="en-GB" sz="800" dirty="0">
-              <a:solidFill>
-                <a:schemeClr val="tx1"/>
-              </a:solidFill>
-            </a:endParaRPr>
-          </a:p>
-        </p:txBody>
-      </p:sp>
-      <p:cxnSp>
-        <p:nvCxnSpPr>
-          <p:cNvPr id="14" name="Straight Arrow Connector 13"/>
-          <p:cNvCxnSpPr>
-            <a:stCxn id="9" idx="3"/>
-            <a:endCxn id="51" idx="1"/>
-          </p:cNvCxnSpPr>
-          <p:nvPr/>
-        </p:nvCxnSpPr>
-        <p:spPr>
-          <a:xfrm>
-            <a:off x="2563243" y="1961303"/>
-            <a:ext cx="136669" cy="1484"/>
-          </a:xfrm>
-          <a:prstGeom prst="straightConnector1">
-            <a:avLst/>
-          </a:prstGeom>
-          <a:ln>
-            <a:tailEnd type="triangle"/>
-          </a:ln>
-        </p:spPr>
-        <p:style>
-          <a:lnRef idx="1">
-            <a:schemeClr val="dk1"/>
-          </a:lnRef>
-          <a:fillRef idx="0">
-            <a:schemeClr val="dk1"/>
-          </a:fillRef>
-          <a:effectRef idx="0">
-            <a:schemeClr val="dk1"/>
-          </a:effectRef>
-          <a:fontRef idx="minor">
-            <a:schemeClr val="tx1"/>
-          </a:fontRef>
-        </p:style>
-      </p:cxnSp>
-      <p:sp>
-        <p:nvSpPr>
-          <p:cNvPr id="45" name="TextBox 44"/>
-          <p:cNvSpPr txBox="1"/>
-          <p:nvPr/>
-        </p:nvSpPr>
-        <p:spPr>
-          <a:xfrm>
-            <a:off x="1702321" y="1521010"/>
-            <a:ext cx="320922" cy="215444"/>
-          </a:xfrm>
-          <a:prstGeom prst="rect">
-            <a:avLst/>
-          </a:prstGeom>
-          <a:noFill/>
-        </p:spPr>
-        <p:txBody>
-          <a:bodyPr wrap="none" rtlCol="0">
-            <a:spAutoFit/>
-          </a:bodyPr>
-          <a:lstStyle/>
-          <a:p>
-            <a:r>
-              <a:rPr lang="en-GB" sz="800" b="1" dirty="0" smtClean="0">
-                <a:solidFill>
-                  <a:srgbClr val="FF0000"/>
-                </a:solidFill>
-              </a:rPr>
-              <a:t>NO</a:t>
-            </a:r>
-            <a:endParaRPr lang="en-GB" sz="800" b="1" dirty="0">
-              <a:solidFill>
-                <a:srgbClr val="FF0000"/>
-              </a:solidFill>
-            </a:endParaRPr>
-          </a:p>
-        </p:txBody>
-      </p:sp>
-      <p:sp>
-        <p:nvSpPr>
-          <p:cNvPr id="47" name="TextBox 46"/>
-          <p:cNvSpPr txBox="1"/>
-          <p:nvPr/>
-        </p:nvSpPr>
-        <p:spPr>
-          <a:xfrm>
-            <a:off x="2442988" y="1770870"/>
-            <a:ext cx="335348" cy="215444"/>
-          </a:xfrm>
-          <a:prstGeom prst="rect">
-            <a:avLst/>
-          </a:prstGeom>
-          <a:noFill/>
-        </p:spPr>
-        <p:txBody>
-          <a:bodyPr wrap="none" rtlCol="0">
-            <a:spAutoFit/>
-          </a:bodyPr>
-          <a:lstStyle/>
-          <a:p>
-            <a:r>
-              <a:rPr lang="en-GB" sz="800" b="1" dirty="0" smtClean="0">
-                <a:solidFill>
-                  <a:srgbClr val="FF0000"/>
-                </a:solidFill>
-              </a:rPr>
-              <a:t>YES</a:t>
-            </a:r>
-            <a:endParaRPr lang="en-GB" sz="800" b="1" dirty="0">
-              <a:solidFill>
-                <a:srgbClr val="FF0000"/>
-              </a:solidFill>
-            </a:endParaRPr>
-          </a:p>
-        </p:txBody>
-      </p:sp>
-      <p:sp>
-        <p:nvSpPr>
-          <p:cNvPr id="53" name="Rectangle 52"/>
-          <p:cNvSpPr/>
-          <p:nvPr/>
-        </p:nvSpPr>
-        <p:spPr>
-          <a:xfrm>
-            <a:off x="1483243" y="2442397"/>
-            <a:ext cx="1080000" cy="648000"/>
-          </a:xfrm>
-          <a:prstGeom prst="rect">
-            <a:avLst/>
-          </a:prstGeom>
-          <a:solidFill>
-            <a:schemeClr val="accent1">
-              <a:lumMod val="20000"/>
-              <a:lumOff val="80000"/>
-            </a:schemeClr>
-          </a:solidFill>
-          <a:ln w="9525">
-            <a:solidFill>
-              <a:schemeClr val="tx1"/>
-            </a:solidFill>
-          </a:ln>
-        </p:spPr>
-        <p:style>
-          <a:lnRef idx="2">
-            <a:schemeClr val="accent1">
-              <a:shade val="50000"/>
-            </a:schemeClr>
-          </a:lnRef>
-          <a:fillRef idx="1">
-            <a:schemeClr val="accent1"/>
-          </a:fillRef>
-          <a:effectRef idx="0">
-            <a:schemeClr val="accent1"/>
-          </a:effectRef>
-          <a:fontRef idx="minor">
-            <a:schemeClr val="lt1"/>
-          </a:fontRef>
-        </p:style>
-        <p:txBody>
-          <a:bodyPr rtlCol="0" anchor="ctr"/>
-          <a:lstStyle/>
-          <a:p>
-            <a:pPr algn="ctr"/>
-            <a:r>
-              <a:rPr lang="en-GB" sz="900" dirty="0" smtClean="0">
-                <a:solidFill>
-                  <a:schemeClr val="tx1"/>
-                </a:solidFill>
-              </a:rPr>
-              <a:t>LOV Robot checks if vocabulary review older than 11 months</a:t>
-            </a:r>
-            <a:endParaRPr lang="en-GB" sz="900" dirty="0">
-              <a:solidFill>
-                <a:schemeClr val="tx1"/>
-              </a:solidFill>
-            </a:endParaRPr>
-          </a:p>
-        </p:txBody>
-      </p:sp>
-      <p:sp>
-        <p:nvSpPr>
-          <p:cNvPr id="57" name="Cylindre 91"/>
-          <p:cNvSpPr/>
-          <p:nvPr/>
-        </p:nvSpPr>
-        <p:spPr>
-          <a:xfrm>
-            <a:off x="1627200" y="3323299"/>
-            <a:ext cx="792088" cy="571504"/>
-          </a:xfrm>
-          <a:prstGeom prst="can">
-            <a:avLst/>
-          </a:prstGeom>
-        </p:spPr>
-        <p:style>
-          <a:lnRef idx="1">
-            <a:schemeClr val="accent5"/>
-          </a:lnRef>
-          <a:fillRef idx="2">
-            <a:schemeClr val="accent5"/>
-          </a:fillRef>
-          <a:effectRef idx="1">
-            <a:schemeClr val="accent5"/>
-          </a:effectRef>
-          <a:fontRef idx="minor">
-            <a:schemeClr val="dk1"/>
-          </a:fontRef>
-        </p:style>
-        <p:txBody>
-          <a:bodyPr rtlCol="0" anchor="t"/>
-          <a:lstStyle/>
-          <a:p>
-            <a:pPr algn="ctr"/>
-            <a:r>
-              <a:rPr lang="fr-FR" sz="1100" b="1" dirty="0" smtClean="0"/>
-              <a:t>LOV Catalogue</a:t>
-            </a:r>
-          </a:p>
-        </p:txBody>
-      </p:sp>
-      <p:cxnSp>
-        <p:nvCxnSpPr>
-          <p:cNvPr id="61" name="Straight Arrow Connector 60"/>
-          <p:cNvCxnSpPr>
-            <a:stCxn id="57" idx="1"/>
-            <a:endCxn id="53" idx="2"/>
-          </p:cNvCxnSpPr>
-          <p:nvPr/>
-        </p:nvCxnSpPr>
-        <p:spPr>
-          <a:xfrm flipH="1" flipV="1">
-            <a:off x="2023243" y="3090397"/>
-            <a:ext cx="1" cy="232902"/>
-          </a:xfrm>
-          <a:prstGeom prst="straightConnector1">
-            <a:avLst/>
-          </a:prstGeom>
-          <a:ln>
-            <a:tailEnd type="triangle"/>
-          </a:ln>
-        </p:spPr>
-        <p:style>
-          <a:lnRef idx="1">
-            <a:schemeClr val="dk1"/>
-          </a:lnRef>
-          <a:fillRef idx="0">
-            <a:schemeClr val="dk1"/>
-          </a:fillRef>
-          <a:effectRef idx="0">
-            <a:schemeClr val="dk1"/>
-          </a:effectRef>
-          <a:fontRef idx="minor">
-            <a:schemeClr val="tx1"/>
-          </a:fontRef>
-        </p:style>
-      </p:cxnSp>
-      <p:cxnSp>
-        <p:nvCxnSpPr>
-          <p:cNvPr id="38" name="Straight Arrow Connector 37"/>
-          <p:cNvCxnSpPr>
-            <a:stCxn id="9" idx="0"/>
-            <a:endCxn id="23" idx="4"/>
-          </p:cNvCxnSpPr>
-          <p:nvPr/>
-        </p:nvCxnSpPr>
-        <p:spPr>
-          <a:xfrm flipH="1" flipV="1">
-            <a:off x="2022316" y="1556792"/>
-            <a:ext cx="927" cy="134511"/>
-          </a:xfrm>
-          <a:prstGeom prst="straightConnector1">
-            <a:avLst/>
-          </a:prstGeom>
-          <a:ln>
-            <a:tailEnd type="triangle"/>
-          </a:ln>
-        </p:spPr>
-        <p:style>
-          <a:lnRef idx="1">
-            <a:schemeClr val="dk1"/>
-          </a:lnRef>
-          <a:fillRef idx="0">
-            <a:schemeClr val="dk1"/>
-          </a:fillRef>
-          <a:effectRef idx="0">
-            <a:schemeClr val="dk1"/>
-          </a:effectRef>
-          <a:fontRef idx="minor">
-            <a:schemeClr val="tx1"/>
-          </a:fontRef>
-        </p:style>
-      </p:cxnSp>
-      <p:grpSp>
-        <p:nvGrpSpPr>
-          <p:cNvPr id="86" name="Group 85"/>
-          <p:cNvGrpSpPr/>
-          <p:nvPr/>
-        </p:nvGrpSpPr>
-        <p:grpSpPr>
-          <a:xfrm>
-            <a:off x="1849833" y="1304542"/>
-            <a:ext cx="344966" cy="252250"/>
-            <a:chOff x="1849833" y="1232534"/>
-            <a:chExt cx="344966" cy="252250"/>
-          </a:xfrm>
-        </p:grpSpPr>
-        <p:sp>
-          <p:nvSpPr>
-            <p:cNvPr id="23" name="Oval 22"/>
-            <p:cNvSpPr/>
-            <p:nvPr/>
-          </p:nvSpPr>
-          <p:spPr>
-            <a:xfrm>
-              <a:off x="1891843" y="1232534"/>
-              <a:ext cx="260946" cy="252250"/>
-            </a:xfrm>
-            <a:prstGeom prst="ellipse">
-              <a:avLst/>
-            </a:prstGeom>
-            <a:solidFill>
-              <a:schemeClr val="bg1">
-                <a:lumMod val="65000"/>
-              </a:schemeClr>
-            </a:solidFill>
-            <a:ln w="9525">
-              <a:solidFill>
-                <a:schemeClr val="tx1"/>
-              </a:solidFill>
-            </a:ln>
-          </p:spPr>
-          <p:style>
-            <a:lnRef idx="2">
-              <a:schemeClr val="accent1">
-                <a:shade val="50000"/>
-              </a:schemeClr>
-            </a:lnRef>
-            <a:fillRef idx="1">
-              <a:schemeClr val="accent1"/>
-            </a:fillRef>
-            <a:effectRef idx="0">
-              <a:schemeClr val="accent1"/>
-            </a:effectRef>
-            <a:fontRef idx="minor">
-              <a:schemeClr val="lt1"/>
-            </a:fontRef>
-          </p:style>
-          <p:txBody>
-            <a:bodyPr rtlCol="0" anchor="ctr"/>
-            <a:lstStyle/>
-            <a:p>
-              <a:pPr algn="ctr"/>
-              <a:endParaRPr lang="en-GB" sz="800" dirty="0"/>
-            </a:p>
-          </p:txBody>
-        </p:sp>
-        <p:sp>
-          <p:nvSpPr>
-            <p:cNvPr id="26" name="TextBox 25"/>
-            <p:cNvSpPr txBox="1"/>
-            <p:nvPr/>
-          </p:nvSpPr>
-          <p:spPr>
-            <a:xfrm>
-              <a:off x="1849833" y="1251882"/>
-              <a:ext cx="344966" cy="215444"/>
-            </a:xfrm>
-            <a:prstGeom prst="rect">
-              <a:avLst/>
-            </a:prstGeom>
-            <a:noFill/>
-          </p:spPr>
-          <p:txBody>
-            <a:bodyPr wrap="none" rtlCol="0">
-              <a:spAutoFit/>
-            </a:bodyPr>
-            <a:lstStyle/>
-            <a:p>
-              <a:r>
-                <a:rPr lang="en-GB" sz="800" dirty="0" smtClean="0"/>
-                <a:t>end</a:t>
-              </a:r>
-              <a:endParaRPr lang="en-GB" sz="800" dirty="0"/>
-            </a:p>
-          </p:txBody>
-        </p:sp>
-      </p:grpSp>
-      <p:cxnSp>
-        <p:nvCxnSpPr>
-          <p:cNvPr id="44" name="Straight Arrow Connector 43"/>
-          <p:cNvCxnSpPr>
-            <a:stCxn id="53" idx="0"/>
-            <a:endCxn id="9" idx="2"/>
-          </p:cNvCxnSpPr>
-          <p:nvPr/>
-        </p:nvCxnSpPr>
-        <p:spPr>
-          <a:xfrm flipV="1">
-            <a:off x="2023243" y="2231303"/>
-            <a:ext cx="0" cy="211094"/>
-          </a:xfrm>
-          <a:prstGeom prst="straightConnector1">
-            <a:avLst/>
-          </a:prstGeom>
-          <a:ln>
-            <a:tailEnd type="triangle"/>
-          </a:ln>
-        </p:spPr>
-        <p:style>
-          <a:lnRef idx="1">
-            <a:schemeClr val="dk1"/>
-          </a:lnRef>
-          <a:fillRef idx="0">
-            <a:schemeClr val="dk1"/>
-          </a:fillRef>
-          <a:effectRef idx="0">
-            <a:schemeClr val="dk1"/>
-          </a:effectRef>
-          <a:fontRef idx="minor">
-            <a:schemeClr val="tx1"/>
-          </a:fontRef>
-        </p:style>
-      </p:cxnSp>
-      <p:sp>
-        <p:nvSpPr>
-          <p:cNvPr id="51" name="Flowchart: Punched Tape 50"/>
-          <p:cNvSpPr/>
-          <p:nvPr/>
-        </p:nvSpPr>
-        <p:spPr>
-          <a:xfrm>
-            <a:off x="2699912" y="1692787"/>
-            <a:ext cx="1080000" cy="540000"/>
-          </a:xfrm>
-          <a:prstGeom prst="flowChartPunchedTape">
-            <a:avLst/>
-          </a:prstGeom>
-          <a:solidFill>
-            <a:schemeClr val="accent1">
-              <a:lumMod val="20000"/>
-              <a:lumOff val="80000"/>
-            </a:schemeClr>
-          </a:solidFill>
-          <a:ln w="9525">
-            <a:solidFill>
-              <a:schemeClr val="tx1"/>
-            </a:solidFill>
-          </a:ln>
-        </p:spPr>
-        <p:style>
-          <a:lnRef idx="2">
-            <a:schemeClr val="accent1">
-              <a:shade val="50000"/>
-            </a:schemeClr>
-          </a:lnRef>
-          <a:fillRef idx="1">
-            <a:schemeClr val="accent1"/>
-          </a:fillRef>
-          <a:effectRef idx="0">
-            <a:schemeClr val="accent1"/>
-          </a:effectRef>
-          <a:fontRef idx="minor">
-            <a:schemeClr val="lt1"/>
-          </a:fontRef>
-        </p:style>
-        <p:txBody>
-          <a:bodyPr rtlCol="0" anchor="ctr"/>
-          <a:lstStyle/>
-          <a:p>
-            <a:pPr algn="ctr"/>
-            <a:r>
-              <a:rPr lang="en-GB" sz="900" dirty="0">
-                <a:solidFill>
-                  <a:schemeClr val="tx1"/>
-                </a:solidFill>
-              </a:rPr>
-              <a:t>LOV Robot notifies curator</a:t>
-            </a:r>
-          </a:p>
-        </p:txBody>
-      </p:sp>
-      <p:cxnSp>
-        <p:nvCxnSpPr>
-          <p:cNvPr id="52" name="Straight Arrow Connector 51"/>
-          <p:cNvCxnSpPr>
-            <a:stCxn id="51" idx="2"/>
-            <a:endCxn id="8" idx="0"/>
-          </p:cNvCxnSpPr>
-          <p:nvPr/>
-        </p:nvCxnSpPr>
-        <p:spPr>
-          <a:xfrm flipH="1">
-            <a:off x="3239792" y="2178787"/>
-            <a:ext cx="120" cy="1156720"/>
-          </a:xfrm>
-          <a:prstGeom prst="straightConnector1">
-            <a:avLst/>
-          </a:prstGeom>
-          <a:ln>
-            <a:tailEnd type="triangle"/>
-          </a:ln>
-        </p:spPr>
-        <p:style>
-          <a:lnRef idx="1">
-            <a:schemeClr val="dk1"/>
-          </a:lnRef>
-          <a:fillRef idx="0">
-            <a:schemeClr val="dk1"/>
-          </a:fillRef>
-          <a:effectRef idx="0">
-            <a:schemeClr val="dk1"/>
-          </a:effectRef>
-          <a:fontRef idx="minor">
-            <a:schemeClr val="tx1"/>
-          </a:fontRef>
-        </p:style>
-      </p:cxnSp>
-      <p:sp>
-        <p:nvSpPr>
-          <p:cNvPr id="59" name="Rectangle 58"/>
-          <p:cNvSpPr/>
-          <p:nvPr/>
-        </p:nvSpPr>
-        <p:spPr>
-          <a:xfrm>
-            <a:off x="1482316" y="4142661"/>
-            <a:ext cx="1080000" cy="648000"/>
-          </a:xfrm>
-          <a:prstGeom prst="rect">
-            <a:avLst/>
-          </a:prstGeom>
-          <a:solidFill>
-            <a:schemeClr val="accent1">
-              <a:lumMod val="20000"/>
-              <a:lumOff val="80000"/>
-            </a:schemeClr>
-          </a:solidFill>
-          <a:ln w="9525">
-            <a:solidFill>
-              <a:schemeClr val="tx1"/>
-            </a:solidFill>
-          </a:ln>
-        </p:spPr>
-        <p:style>
-          <a:lnRef idx="2">
-            <a:schemeClr val="accent1">
-              <a:shade val="50000"/>
-            </a:schemeClr>
-          </a:lnRef>
-          <a:fillRef idx="1">
-            <a:schemeClr val="accent1"/>
-          </a:fillRef>
-          <a:effectRef idx="0">
-            <a:schemeClr val="accent1"/>
-          </a:effectRef>
-          <a:fontRef idx="minor">
-            <a:schemeClr val="lt1"/>
-          </a:fontRef>
-        </p:style>
-        <p:txBody>
-          <a:bodyPr rtlCol="0" anchor="ctr"/>
-          <a:lstStyle/>
-          <a:p>
-            <a:pPr algn="ctr"/>
-            <a:r>
-              <a:rPr lang="en-GB" sz="900" dirty="0" smtClean="0">
-                <a:solidFill>
-                  <a:schemeClr val="tx1"/>
-                </a:solidFill>
-              </a:rPr>
-              <a:t>LOV Robot checks daily if vocabulary has changed</a:t>
-            </a:r>
-            <a:endParaRPr lang="en-GB" sz="900" dirty="0">
-              <a:solidFill>
-                <a:schemeClr val="tx1"/>
-              </a:solidFill>
-            </a:endParaRPr>
-          </a:p>
-        </p:txBody>
-      </p:sp>
-      <p:sp>
-        <p:nvSpPr>
-          <p:cNvPr id="60" name="Flowchart: Decision 59"/>
-          <p:cNvSpPr/>
-          <p:nvPr/>
-        </p:nvSpPr>
-        <p:spPr>
-          <a:xfrm>
-            <a:off x="1482316" y="5001755"/>
-            <a:ext cx="1080000" cy="540000"/>
-          </a:xfrm>
-          <a:prstGeom prst="flowChartDecision">
-            <a:avLst/>
-          </a:prstGeom>
-          <a:solidFill>
-            <a:schemeClr val="bg1"/>
-          </a:solidFill>
-          <a:ln w="9525">
-            <a:solidFill>
-              <a:schemeClr val="tx1"/>
-            </a:solidFill>
-          </a:ln>
-        </p:spPr>
-        <p:style>
-          <a:lnRef idx="2">
-            <a:schemeClr val="accent1">
-              <a:shade val="50000"/>
-            </a:schemeClr>
-          </a:lnRef>
-          <a:fillRef idx="1">
-            <a:schemeClr val="accent1"/>
-          </a:fillRef>
-          <a:effectRef idx="0">
-            <a:schemeClr val="accent1"/>
-          </a:effectRef>
-          <a:fontRef idx="minor">
-            <a:schemeClr val="lt1"/>
-          </a:fontRef>
-        </p:style>
-        <p:txBody>
-          <a:bodyPr rtlCol="0" anchor="ctr"/>
-          <a:lstStyle/>
-          <a:p>
-            <a:pPr algn="ctr"/>
-            <a:r>
-              <a:rPr lang="en-GB" sz="800" dirty="0" smtClean="0">
-                <a:solidFill>
-                  <a:schemeClr val="tx1"/>
-                </a:solidFill>
-              </a:rPr>
-              <a:t>Has changed?</a:t>
-            </a:r>
-            <a:endParaRPr lang="en-GB" sz="800" dirty="0">
-              <a:solidFill>
-                <a:schemeClr val="tx1"/>
-              </a:solidFill>
-            </a:endParaRPr>
-          </a:p>
-        </p:txBody>
-      </p:sp>
-      <p:sp>
-        <p:nvSpPr>
-          <p:cNvPr id="62" name="Rectangle 61"/>
-          <p:cNvSpPr/>
-          <p:nvPr/>
-        </p:nvSpPr>
-        <p:spPr>
-          <a:xfrm>
-            <a:off x="2702090" y="4948517"/>
-            <a:ext cx="1080000" cy="648000"/>
-          </a:xfrm>
-          <a:prstGeom prst="rect">
-            <a:avLst/>
-          </a:prstGeom>
-          <a:solidFill>
-            <a:schemeClr val="accent1">
-              <a:lumMod val="20000"/>
-              <a:lumOff val="80000"/>
-            </a:schemeClr>
-          </a:solidFill>
-          <a:ln w="9525">
-            <a:solidFill>
-              <a:schemeClr val="tx1"/>
-            </a:solidFill>
-          </a:ln>
-        </p:spPr>
-        <p:style>
-          <a:lnRef idx="2">
-            <a:schemeClr val="accent1">
-              <a:shade val="50000"/>
-            </a:schemeClr>
-          </a:lnRef>
-          <a:fillRef idx="1">
-            <a:schemeClr val="accent1"/>
-          </a:fillRef>
-          <a:effectRef idx="0">
-            <a:schemeClr val="accent1"/>
-          </a:effectRef>
-          <a:fontRef idx="minor">
-            <a:schemeClr val="lt1"/>
-          </a:fontRef>
-        </p:style>
-        <p:txBody>
-          <a:bodyPr rtlCol="0" anchor="ctr"/>
-          <a:lstStyle/>
-          <a:p>
-            <a:pPr algn="ctr"/>
-            <a:r>
-              <a:rPr lang="en-GB" sz="900" dirty="0" smtClean="0">
-                <a:solidFill>
-                  <a:schemeClr val="tx1"/>
-                </a:solidFill>
-              </a:rPr>
-              <a:t>LOV Robot add the new version and update vocabulary metadata</a:t>
-            </a:r>
-            <a:endParaRPr lang="en-GB" sz="900" dirty="0">
-              <a:solidFill>
-                <a:schemeClr val="tx1"/>
-              </a:solidFill>
-            </a:endParaRPr>
-          </a:p>
-        </p:txBody>
-      </p:sp>
-      <p:cxnSp>
-        <p:nvCxnSpPr>
-          <p:cNvPr id="63" name="Straight Arrow Connector 54"/>
-          <p:cNvCxnSpPr>
-            <a:stCxn id="60" idx="3"/>
-            <a:endCxn id="62" idx="1"/>
-          </p:cNvCxnSpPr>
-          <p:nvPr/>
-        </p:nvCxnSpPr>
-        <p:spPr>
-          <a:xfrm>
-            <a:off x="2562316" y="5271755"/>
-            <a:ext cx="139774" cy="762"/>
-          </a:xfrm>
-          <a:prstGeom prst="straightConnector1">
-            <a:avLst/>
-          </a:prstGeom>
-          <a:ln>
-            <a:tailEnd type="triangle"/>
-          </a:ln>
-        </p:spPr>
-        <p:style>
-          <a:lnRef idx="1">
-            <a:schemeClr val="dk1"/>
-          </a:lnRef>
-          <a:fillRef idx="0">
-            <a:schemeClr val="dk1"/>
-          </a:fillRef>
-          <a:effectRef idx="0">
-            <a:schemeClr val="dk1"/>
-          </a:effectRef>
-          <a:fontRef idx="minor">
-            <a:schemeClr val="tx1"/>
-          </a:fontRef>
-        </p:style>
-      </p:cxnSp>
-      <p:cxnSp>
-        <p:nvCxnSpPr>
-          <p:cNvPr id="65" name="Straight Arrow Connector 54"/>
-          <p:cNvCxnSpPr>
-            <a:stCxn id="59" idx="2"/>
-            <a:endCxn id="60" idx="0"/>
-          </p:cNvCxnSpPr>
-          <p:nvPr/>
-        </p:nvCxnSpPr>
-        <p:spPr>
-          <a:xfrm>
-            <a:off x="2022316" y="4790661"/>
-            <a:ext cx="0" cy="211094"/>
-          </a:xfrm>
-          <a:prstGeom prst="straightConnector1">
-            <a:avLst/>
-          </a:prstGeom>
-          <a:ln>
-            <a:tailEnd type="triangle"/>
-          </a:ln>
-        </p:spPr>
-        <p:style>
-          <a:lnRef idx="1">
-            <a:schemeClr val="dk1"/>
-          </a:lnRef>
-          <a:fillRef idx="0">
-            <a:schemeClr val="dk1"/>
-          </a:fillRef>
-          <a:effectRef idx="0">
-            <a:schemeClr val="dk1"/>
-          </a:effectRef>
-          <a:fontRef idx="minor">
-            <a:schemeClr val="tx1"/>
-          </a:fontRef>
-        </p:style>
-      </p:cxnSp>
-      <p:cxnSp>
-        <p:nvCxnSpPr>
-          <p:cNvPr id="67" name="Straight Arrow Connector 54"/>
-          <p:cNvCxnSpPr>
-            <a:stCxn id="57" idx="3"/>
-            <a:endCxn id="59" idx="0"/>
-          </p:cNvCxnSpPr>
-          <p:nvPr/>
-        </p:nvCxnSpPr>
-        <p:spPr>
-          <a:xfrm flipH="1">
-            <a:off x="2022316" y="3894803"/>
-            <a:ext cx="928" cy="247858"/>
-          </a:xfrm>
-          <a:prstGeom prst="straightConnector1">
-            <a:avLst/>
-          </a:prstGeom>
-          <a:ln>
-            <a:tailEnd type="triangle"/>
-          </a:ln>
-        </p:spPr>
-        <p:style>
-          <a:lnRef idx="1">
-            <a:schemeClr val="dk1"/>
-          </a:lnRef>
-          <a:fillRef idx="0">
-            <a:schemeClr val="dk1"/>
-          </a:fillRef>
-          <a:effectRef idx="0">
-            <a:schemeClr val="dk1"/>
-          </a:effectRef>
-          <a:fontRef idx="minor">
-            <a:schemeClr val="tx1"/>
-          </a:fontRef>
-        </p:style>
-      </p:cxnSp>
-      <p:cxnSp>
-        <p:nvCxnSpPr>
-          <p:cNvPr id="72" name="Straight Arrow Connector 71"/>
-          <p:cNvCxnSpPr>
-            <a:stCxn id="8" idx="1"/>
-            <a:endCxn id="57" idx="4"/>
-          </p:cNvCxnSpPr>
-          <p:nvPr/>
-        </p:nvCxnSpPr>
-        <p:spPr>
-          <a:xfrm flipH="1">
-            <a:off x="2419288" y="3605507"/>
-            <a:ext cx="280504" cy="3544"/>
-          </a:xfrm>
-          <a:prstGeom prst="straightConnector1">
-            <a:avLst/>
-          </a:prstGeom>
-          <a:ln>
-            <a:tailEnd type="triangle"/>
-          </a:ln>
-        </p:spPr>
-        <p:style>
-          <a:lnRef idx="1">
-            <a:schemeClr val="dk1"/>
-          </a:lnRef>
-          <a:fillRef idx="0">
-            <a:schemeClr val="dk1"/>
-          </a:fillRef>
-          <a:effectRef idx="0">
-            <a:schemeClr val="dk1"/>
-          </a:effectRef>
-          <a:fontRef idx="minor">
-            <a:schemeClr val="tx1"/>
-          </a:fontRef>
-        </p:style>
-      </p:cxnSp>
-      <p:cxnSp>
-        <p:nvCxnSpPr>
-          <p:cNvPr id="75" name="Straight Arrow Connector 74"/>
-          <p:cNvCxnSpPr>
-            <a:stCxn id="62" idx="0"/>
-            <a:endCxn id="89" idx="2"/>
-          </p:cNvCxnSpPr>
-          <p:nvPr/>
-        </p:nvCxnSpPr>
-        <p:spPr>
-          <a:xfrm flipH="1" flipV="1">
-            <a:off x="3239792" y="4646725"/>
-            <a:ext cx="2298" cy="301792"/>
-          </a:xfrm>
-          <a:prstGeom prst="straightConnector1">
-            <a:avLst/>
-          </a:prstGeom>
-          <a:ln>
-            <a:tailEnd type="triangle"/>
-          </a:ln>
-        </p:spPr>
-        <p:style>
-          <a:lnRef idx="1">
-            <a:schemeClr val="dk1"/>
-          </a:lnRef>
-          <a:fillRef idx="0">
-            <a:schemeClr val="dk1"/>
-          </a:fillRef>
-          <a:effectRef idx="0">
-            <a:schemeClr val="dk1"/>
-          </a:effectRef>
-          <a:fontRef idx="minor">
-            <a:schemeClr val="tx1"/>
-          </a:fontRef>
-        </p:style>
-      </p:cxnSp>
-      <p:grpSp>
-        <p:nvGrpSpPr>
-          <p:cNvPr id="82" name="Group 81"/>
-          <p:cNvGrpSpPr/>
-          <p:nvPr/>
-        </p:nvGrpSpPr>
-        <p:grpSpPr>
-          <a:xfrm>
-            <a:off x="1849833" y="5649755"/>
-            <a:ext cx="344966" cy="252250"/>
-            <a:chOff x="1858694" y="5688350"/>
-            <a:chExt cx="344966" cy="252250"/>
-          </a:xfrm>
-        </p:grpSpPr>
-        <p:sp>
-          <p:nvSpPr>
-            <p:cNvPr id="80" name="Oval 79"/>
-            <p:cNvSpPr/>
-            <p:nvPr/>
-          </p:nvSpPr>
-          <p:spPr>
-            <a:xfrm>
-              <a:off x="1900704" y="5688350"/>
-              <a:ext cx="260946" cy="252250"/>
-            </a:xfrm>
-            <a:prstGeom prst="ellipse">
-              <a:avLst/>
-            </a:prstGeom>
-            <a:solidFill>
-              <a:schemeClr val="bg1">
-                <a:lumMod val="65000"/>
-              </a:schemeClr>
-            </a:solidFill>
-            <a:ln w="9525">
-              <a:solidFill>
-                <a:schemeClr val="tx1"/>
-              </a:solidFill>
-            </a:ln>
-          </p:spPr>
-          <p:style>
-            <a:lnRef idx="2">
-              <a:schemeClr val="accent1">
-                <a:shade val="50000"/>
-              </a:schemeClr>
-            </a:lnRef>
-            <a:fillRef idx="1">
-              <a:schemeClr val="accent1"/>
-            </a:fillRef>
-            <a:effectRef idx="0">
-              <a:schemeClr val="accent1"/>
-            </a:effectRef>
-            <a:fontRef idx="minor">
-              <a:schemeClr val="lt1"/>
-            </a:fontRef>
-          </p:style>
-          <p:txBody>
-            <a:bodyPr rtlCol="0" anchor="ctr"/>
-            <a:lstStyle/>
-            <a:p>
-              <a:pPr algn="ctr"/>
-              <a:endParaRPr lang="en-GB" sz="800" dirty="0"/>
-            </a:p>
-          </p:txBody>
-        </p:sp>
-        <p:sp>
-          <p:nvSpPr>
-            <p:cNvPr id="81" name="TextBox 80"/>
-            <p:cNvSpPr txBox="1"/>
-            <p:nvPr/>
-          </p:nvSpPr>
-          <p:spPr>
-            <a:xfrm>
-              <a:off x="1858694" y="5707698"/>
-              <a:ext cx="344966" cy="215444"/>
-            </a:xfrm>
-            <a:prstGeom prst="rect">
-              <a:avLst/>
-            </a:prstGeom>
-            <a:noFill/>
-          </p:spPr>
-          <p:txBody>
-            <a:bodyPr wrap="none" rtlCol="0">
-              <a:spAutoFit/>
-            </a:bodyPr>
-            <a:lstStyle/>
-            <a:p>
-              <a:r>
-                <a:rPr lang="en-GB" sz="800" dirty="0" smtClean="0"/>
-                <a:t>end</a:t>
-              </a:r>
-              <a:endParaRPr lang="en-GB" sz="800" dirty="0"/>
-            </a:p>
-          </p:txBody>
-        </p:sp>
-      </p:grpSp>
-      <p:cxnSp>
-        <p:nvCxnSpPr>
-          <p:cNvPr id="83" name="Straight Arrow Connector 82"/>
-          <p:cNvCxnSpPr>
-            <a:stCxn id="60" idx="2"/>
-            <a:endCxn id="80" idx="0"/>
-          </p:cNvCxnSpPr>
-          <p:nvPr/>
-        </p:nvCxnSpPr>
-        <p:spPr>
-          <a:xfrm>
-            <a:off x="2022316" y="5541755"/>
-            <a:ext cx="0" cy="108000"/>
-          </a:xfrm>
-          <a:prstGeom prst="straightConnector1">
-            <a:avLst/>
-          </a:prstGeom>
-          <a:ln>
-            <a:tailEnd type="triangle"/>
-          </a:ln>
-        </p:spPr>
-        <p:style>
-          <a:lnRef idx="1">
-            <a:schemeClr val="dk1"/>
-          </a:lnRef>
-          <a:fillRef idx="0">
-            <a:schemeClr val="dk1"/>
-          </a:fillRef>
-          <a:effectRef idx="0">
-            <a:schemeClr val="dk1"/>
-          </a:effectRef>
-          <a:fontRef idx="minor">
-            <a:schemeClr val="tx1"/>
-          </a:fontRef>
-        </p:style>
-      </p:cxnSp>
-      <p:sp>
-        <p:nvSpPr>
-          <p:cNvPr id="87" name="TextBox 86"/>
-          <p:cNvSpPr txBox="1"/>
-          <p:nvPr/>
-        </p:nvSpPr>
-        <p:spPr>
-          <a:xfrm>
-            <a:off x="1717545" y="5484064"/>
-            <a:ext cx="320922" cy="215444"/>
-          </a:xfrm>
-          <a:prstGeom prst="rect">
-            <a:avLst/>
-          </a:prstGeom>
-          <a:noFill/>
-        </p:spPr>
-        <p:txBody>
-          <a:bodyPr wrap="none" rtlCol="0">
-            <a:spAutoFit/>
-          </a:bodyPr>
-          <a:lstStyle/>
-          <a:p>
-            <a:r>
-              <a:rPr lang="en-GB" sz="800" b="1" dirty="0" smtClean="0">
-                <a:solidFill>
-                  <a:srgbClr val="FF0000"/>
-                </a:solidFill>
-              </a:rPr>
-              <a:t>NO</a:t>
-            </a:r>
-            <a:endParaRPr lang="en-GB" sz="800" b="1" dirty="0">
-              <a:solidFill>
-                <a:srgbClr val="FF0000"/>
-              </a:solidFill>
-            </a:endParaRPr>
-          </a:p>
-        </p:txBody>
-      </p:sp>
-      <p:sp>
-        <p:nvSpPr>
-          <p:cNvPr id="88" name="TextBox 87"/>
-          <p:cNvSpPr txBox="1"/>
-          <p:nvPr/>
-        </p:nvSpPr>
-        <p:spPr>
-          <a:xfrm>
-            <a:off x="2437222" y="5080374"/>
-            <a:ext cx="335348" cy="215444"/>
-          </a:xfrm>
-          <a:prstGeom prst="rect">
-            <a:avLst/>
-          </a:prstGeom>
-          <a:noFill/>
-        </p:spPr>
-        <p:txBody>
-          <a:bodyPr wrap="none" rtlCol="0">
-            <a:spAutoFit/>
-          </a:bodyPr>
-          <a:lstStyle/>
-          <a:p>
-            <a:r>
-              <a:rPr lang="en-GB" sz="800" b="1" dirty="0" smtClean="0">
-                <a:solidFill>
-                  <a:srgbClr val="FF0000"/>
-                </a:solidFill>
-              </a:rPr>
-              <a:t>YES</a:t>
-            </a:r>
-            <a:endParaRPr lang="en-GB" sz="800" b="1" dirty="0">
-              <a:solidFill>
-                <a:srgbClr val="FF0000"/>
-              </a:solidFill>
-            </a:endParaRPr>
-          </a:p>
-        </p:txBody>
-      </p:sp>
-      <p:sp>
-        <p:nvSpPr>
-          <p:cNvPr id="89" name="Flowchart: Punched Tape 88"/>
-          <p:cNvSpPr/>
-          <p:nvPr/>
-        </p:nvSpPr>
-        <p:spPr>
-          <a:xfrm>
-            <a:off x="2699792" y="4160725"/>
-            <a:ext cx="1080000" cy="540000"/>
-          </a:xfrm>
-          <a:prstGeom prst="flowChartPunchedTape">
-            <a:avLst/>
-          </a:prstGeom>
-          <a:solidFill>
-            <a:schemeClr val="accent1">
-              <a:lumMod val="20000"/>
-              <a:lumOff val="80000"/>
-            </a:schemeClr>
-          </a:solidFill>
-          <a:ln w="9525">
-            <a:solidFill>
-              <a:schemeClr val="tx1"/>
-            </a:solidFill>
-          </a:ln>
-        </p:spPr>
-        <p:style>
-          <a:lnRef idx="2">
-            <a:schemeClr val="accent1">
-              <a:shade val="50000"/>
-            </a:schemeClr>
-          </a:lnRef>
-          <a:fillRef idx="1">
-            <a:schemeClr val="accent1"/>
-          </a:fillRef>
-          <a:effectRef idx="0">
-            <a:schemeClr val="accent1"/>
-          </a:effectRef>
-          <a:fontRef idx="minor">
-            <a:schemeClr val="lt1"/>
-          </a:fontRef>
-        </p:style>
-        <p:txBody>
-          <a:bodyPr rtlCol="0" anchor="ctr"/>
-          <a:lstStyle/>
-          <a:p>
-            <a:pPr algn="ctr"/>
-            <a:r>
-              <a:rPr lang="en-GB" sz="900" dirty="0">
-                <a:solidFill>
-                  <a:schemeClr val="tx1"/>
-                </a:solidFill>
-              </a:rPr>
-              <a:t>LOV Robot notifies curator</a:t>
-            </a:r>
-          </a:p>
-        </p:txBody>
-      </p:sp>
-      <p:cxnSp>
-        <p:nvCxnSpPr>
-          <p:cNvPr id="92" name="Straight Arrow Connector 91"/>
-          <p:cNvCxnSpPr>
-            <a:stCxn id="89" idx="0"/>
-            <a:endCxn id="8" idx="2"/>
-          </p:cNvCxnSpPr>
-          <p:nvPr/>
-        </p:nvCxnSpPr>
-        <p:spPr>
-          <a:xfrm flipV="1">
-            <a:off x="3239792" y="3875507"/>
-            <a:ext cx="0" cy="339218"/>
-          </a:xfrm>
-          <a:prstGeom prst="straightConnector1">
-            <a:avLst/>
-          </a:prstGeom>
-          <a:ln>
-            <a:tailEnd type="triangle"/>
-          </a:ln>
-        </p:spPr>
-        <p:style>
-          <a:lnRef idx="1">
-            <a:schemeClr val="dk1"/>
-          </a:lnRef>
-          <a:fillRef idx="0">
-            <a:schemeClr val="dk1"/>
-          </a:fillRef>
-          <a:effectRef idx="0">
-            <a:schemeClr val="dk1"/>
-          </a:effectRef>
-          <a:fontRef idx="minor">
-            <a:schemeClr val="tx1"/>
-          </a:fontRef>
-        </p:style>
-      </p:cxnSp>
-    </p:spTree>
-    <p:extLst>
-      <p:ext uri="{BB962C8B-B14F-4D97-AF65-F5344CB8AC3E}">
-        <p14:creationId xmlns:p14="http://schemas.microsoft.com/office/powerpoint/2010/main" val="620047751"/>
-      </p:ext>
-    </p:extLst>
-  </p:cSld>
-  <p:clrMapOvr>
-    <a:masterClrMapping/>
-  </p:clrMapOvr>
-</p:sld>
-</file>
-
-<file path=ppt/slides/slide7.xml><?xml version="1.0" encoding="utf-8"?>
-<p:sld xmlns:a="http://schemas.openxmlformats.org/drawingml/2006/main" xmlns:r="http://schemas.openxmlformats.org/officeDocument/2006/relationships" xmlns:p="http://schemas.openxmlformats.org/presentationml/2006/main">
-  <p:cSld>
-    <p:spTree>
-      <p:nvGrpSpPr>
-        <p:cNvPr id="1" name=""/>
-        <p:cNvGrpSpPr/>
-        <p:nvPr/>
-      </p:nvGrpSpPr>
-      <p:grpSpPr>
-        <a:xfrm>
-          <a:off x="0" y="0"/>
-          <a:ext cx="0" cy="0"/>
-          <a:chOff x="0" y="0"/>
-          <a:chExt cx="0" cy="0"/>
-        </a:xfrm>
-      </p:grpSpPr>
-      <p:sp>
-        <p:nvSpPr>
           <p:cNvPr id="4" name="Slide Number Placeholder 3"/>
           <p:cNvSpPr>
             <a:spLocks noGrp="1"/>
@@ -12108,7 +9352,7 @@
               <a:pPr>
                 <a:defRPr/>
               </a:pPr>
-              <a:t>7</a:t>
+              <a:t>5</a:t>
             </a:fld>
             <a:endParaRPr lang="de-DE" altLang="ja-JP"/>
           </a:p>

</xml_diff>